<commit_message>
ppt was updated, left comment
</commit_message>
<xml_diff>
--- a/plan/TaskTracingApp.pptx
+++ b/plan/TaskTracingApp.pptx
@@ -2755,7 +2755,7 @@
           <a:p>
             <a:fld id="{5EBE3839-043F-4D6A-BB69-1C2CEF42D310}" type="datetimeFigureOut">
               <a:rPr lang="en-US" smtClean="0"/>
-              <a:t>1/18/2022</a:t>
+              <a:t>2/4/2022</a:t>
             </a:fld>
             <a:endParaRPr lang="en-US"/>
           </a:p>
@@ -3069,6 +3069,132 @@
           <a:p>
             <a:r>
               <a:rPr lang="en-US" dirty="0" smtClean="0"/>
+              <a:t>To do:</a:t>
+            </a:r>
+          </a:p>
+          <a:p>
+            <a:r>
+              <a:rPr lang="en-US" baseline="0" dirty="0" smtClean="0"/>
+              <a:t>Create </a:t>
+            </a:r>
+            <a:r>
+              <a:rPr lang="en-US" baseline="0" dirty="0" smtClean="0"/>
+              <a:t>404 component</a:t>
+            </a:r>
+          </a:p>
+          <a:p>
+            <a:r>
+              <a:rPr lang="en-US" baseline="0" dirty="0" smtClean="0"/>
+              <a:t>Write </a:t>
+            </a:r>
+            <a:r>
+              <a:rPr lang="en-US" b="1" baseline="0" dirty="0" smtClean="0"/>
+              <a:t>test</a:t>
+            </a:r>
+            <a:r>
+              <a:rPr lang="en-US" baseline="0" dirty="0" smtClean="0"/>
+              <a:t> for the change-location </a:t>
+            </a:r>
+            <a:r>
+              <a:rPr lang="en-US" baseline="0" dirty="0" smtClean="0"/>
+              <a:t>comp</a:t>
+            </a:r>
+          </a:p>
+          <a:p>
+            <a:r>
+              <a:rPr lang="en-US" baseline="0" dirty="0" err="1" smtClean="0"/>
+              <a:t>NodeJs</a:t>
+            </a:r>
+            <a:r>
+              <a:rPr lang="en-US" baseline="0" dirty="0" smtClean="0"/>
+              <a:t>: get file path, saving file way</a:t>
+            </a:r>
+            <a:endParaRPr lang="en-US" dirty="0"/>
+          </a:p>
+        </p:txBody>
+      </p:sp>
+      <p:sp>
+        <p:nvSpPr>
+          <p:cNvPr id="4" name="Dia számának helye 3"/>
+          <p:cNvSpPr>
+            <a:spLocks noGrp="1"/>
+          </p:cNvSpPr>
+          <p:nvPr>
+            <p:ph type="sldNum" sz="quarter" idx="10"/>
+          </p:nvPr>
+        </p:nvSpPr>
+        <p:spPr/>
+        <p:txBody>
+          <a:bodyPr/>
+          <a:lstStyle/>
+          <a:p>
+            <a:fld id="{7E7CBEC1-F5FB-4BFE-AF15-5C1A6E9B4F82}" type="slidenum">
+              <a:rPr lang="en-US" smtClean="0"/>
+              <a:t>3</a:t>
+            </a:fld>
+            <a:endParaRPr lang="en-US"/>
+          </a:p>
+        </p:txBody>
+      </p:sp>
+    </p:spTree>
+    <p:extLst>
+      <p:ext uri="{BB962C8B-B14F-4D97-AF65-F5344CB8AC3E}">
+        <p14:creationId xmlns:p14="http://schemas.microsoft.com/office/powerpoint/2010/main" val="1522419581"/>
+      </p:ext>
+    </p:extLst>
+  </p:cSld>
+  <p:clrMapOvr>
+    <a:masterClrMapping/>
+  </p:clrMapOvr>
+</p:notes>
+</file>
+
+<file path=ppt/notesSlides/notesSlide2.xml><?xml version="1.0" encoding="utf-8"?>
+<p:notes xmlns:a="http://schemas.openxmlformats.org/drawingml/2006/main" xmlns:r="http://schemas.openxmlformats.org/officeDocument/2006/relationships" xmlns:p="http://schemas.openxmlformats.org/presentationml/2006/main">
+  <p:cSld>
+    <p:spTree>
+      <p:nvGrpSpPr>
+        <p:cNvPr id="1" name=""/>
+        <p:cNvGrpSpPr/>
+        <p:nvPr/>
+      </p:nvGrpSpPr>
+      <p:grpSpPr>
+        <a:xfrm>
+          <a:off x="0" y="0"/>
+          <a:ext cx="0" cy="0"/>
+          <a:chOff x="0" y="0"/>
+          <a:chExt cx="0" cy="0"/>
+        </a:xfrm>
+      </p:grpSpPr>
+      <p:sp>
+        <p:nvSpPr>
+          <p:cNvPr id="2" name="Diakép helye 1"/>
+          <p:cNvSpPr>
+            <a:spLocks noGrp="1" noRot="1" noChangeAspect="1"/>
+          </p:cNvSpPr>
+          <p:nvPr>
+            <p:ph type="sldImg"/>
+          </p:nvPr>
+        </p:nvSpPr>
+        <p:spPr/>
+      </p:sp>
+      <p:sp>
+        <p:nvSpPr>
+          <p:cNvPr id="3" name="Jegyzetek helye 2"/>
+          <p:cNvSpPr>
+            <a:spLocks noGrp="1"/>
+          </p:cNvSpPr>
+          <p:nvPr>
+            <p:ph type="body" idx="1"/>
+          </p:nvPr>
+        </p:nvSpPr>
+        <p:spPr/>
+        <p:txBody>
+          <a:bodyPr/>
+          <a:lstStyle/>
+          <a:p>
+            <a:r>
+              <a:rPr lang="en-US" dirty="0" smtClean="0"/>
               <a:t>Each</a:t>
             </a:r>
             <a:r>
@@ -3115,7 +3241,7 @@
 </p:notes>
 </file>
 
-<file path=ppt/notesSlides/notesSlide2.xml><?xml version="1.0" encoding="utf-8"?>
+<file path=ppt/notesSlides/notesSlide3.xml><?xml version="1.0" encoding="utf-8"?>
 <p:notes xmlns:a="http://schemas.openxmlformats.org/drawingml/2006/main" xmlns:r="http://schemas.openxmlformats.org/officeDocument/2006/relationships" xmlns:p="http://schemas.openxmlformats.org/presentationml/2006/main">
   <p:cSld>
     <p:spTree>
@@ -3354,7 +3480,7 @@
           <a:p>
             <a:fld id="{8E031A97-C5A4-4558-8890-FA2925244C4F}" type="datetime3">
               <a:rPr lang="en-US" smtClean="0"/>
-              <a:t>18 January 2022</a:t>
+              <a:t>4 February 2022</a:t>
             </a:fld>
             <a:endParaRPr lang="en-US"/>
           </a:p>
@@ -3528,7 +3654,7 @@
           <a:p>
             <a:fld id="{156D25A5-2131-4D11-8DF2-BFE448E0C6C4}" type="datetime3">
               <a:rPr lang="en-US" smtClean="0"/>
-              <a:t>18 January 2022</a:t>
+              <a:t>4 February 2022</a:t>
             </a:fld>
             <a:endParaRPr lang="en-US"/>
           </a:p>
@@ -3712,7 +3838,7 @@
           <a:p>
             <a:fld id="{741DCA71-90D2-471A-B4F6-D63D3144D802}" type="datetime3">
               <a:rPr lang="en-US" smtClean="0"/>
-              <a:t>18 January 2022</a:t>
+              <a:t>4 February 2022</a:t>
             </a:fld>
             <a:endParaRPr lang="en-US"/>
           </a:p>
@@ -3886,7 +4012,7 @@
           <a:p>
             <a:fld id="{859B4CCA-7A49-40BA-AA87-E36D3C1B74CD}" type="datetime3">
               <a:rPr lang="en-US" smtClean="0"/>
-              <a:t>18 January 2022</a:t>
+              <a:t>4 February 2022</a:t>
             </a:fld>
             <a:endParaRPr lang="en-US"/>
           </a:p>
@@ -4136,7 +4262,7 @@
           <a:p>
             <a:fld id="{00C05CC3-8230-4750-BEE6-66D4A1F33F0F}" type="datetime3">
               <a:rPr lang="en-US" smtClean="0"/>
-              <a:t>18 January 2022</a:t>
+              <a:t>4 February 2022</a:t>
             </a:fld>
             <a:endParaRPr lang="en-US"/>
           </a:p>
@@ -4372,7 +4498,7 @@
           <a:p>
             <a:fld id="{3DEBFD87-4EA2-4600-AB37-3AFC3D80519A}" type="datetime3">
               <a:rPr lang="en-US" smtClean="0"/>
-              <a:t>18 January 2022</a:t>
+              <a:t>4 February 2022</a:t>
             </a:fld>
             <a:endParaRPr lang="en-US"/>
           </a:p>
@@ -4743,7 +4869,7 @@
           <a:p>
             <a:fld id="{A72CEC32-E708-4316-8666-BA8BF9722CA0}" type="datetime3">
               <a:rPr lang="en-US" smtClean="0"/>
-              <a:t>18 January 2022</a:t>
+              <a:t>4 February 2022</a:t>
             </a:fld>
             <a:endParaRPr lang="en-US"/>
           </a:p>
@@ -4865,7 +4991,7 @@
           <a:p>
             <a:fld id="{7CF1C314-8D6F-4732-88D4-94FF05CBB104}" type="datetime3">
               <a:rPr lang="en-US" smtClean="0"/>
-              <a:t>18 January 2022</a:t>
+              <a:t>4 February 2022</a:t>
             </a:fld>
             <a:endParaRPr lang="en-US"/>
           </a:p>
@@ -4964,7 +5090,7 @@
           <a:p>
             <a:fld id="{47DA11E4-27AF-4B9F-BEF3-3CA15041E18E}" type="datetime3">
               <a:rPr lang="en-US" smtClean="0"/>
-              <a:t>18 January 2022</a:t>
+              <a:t>4 February 2022</a:t>
             </a:fld>
             <a:endParaRPr lang="en-US"/>
           </a:p>
@@ -5245,7 +5371,7 @@
           <a:p>
             <a:fld id="{E2C02590-7F59-421C-A745-32233A68051D}" type="datetime3">
               <a:rPr lang="en-US" smtClean="0"/>
-              <a:t>18 January 2022</a:t>
+              <a:t>4 February 2022</a:t>
             </a:fld>
             <a:endParaRPr lang="en-US"/>
           </a:p>
@@ -5502,7 +5628,7 @@
           <a:p>
             <a:fld id="{84AF07D1-C31F-46EF-9183-DC77B1A31FFA}" type="datetime3">
               <a:rPr lang="en-US" smtClean="0"/>
-              <a:t>18 January 2022</a:t>
+              <a:t>4 February 2022</a:t>
             </a:fld>
             <a:endParaRPr lang="en-US"/>
           </a:p>
@@ -5724,7 +5850,7 @@
           <a:p>
             <a:fld id="{9D694A8E-69FB-424F-BB61-8EE202972235}" type="datetime3">
               <a:rPr lang="en-US" smtClean="0"/>
-              <a:t>18 January 2022</a:t>
+              <a:t>4 February 2022</a:t>
             </a:fld>
             <a:endParaRPr lang="en-US"/>
           </a:p>
@@ -6201,7 +6327,7 @@
             </a:pPr>
             <a:r>
               <a:rPr lang="en-US" sz="2600" dirty="0" smtClean="0"/>
-              <a:t>Agnular10</a:t>
+              <a:t>Agnular12</a:t>
             </a:r>
           </a:p>
           <a:p>
@@ -6444,7 +6570,7 @@
           <a:p>
             <a:fld id="{EE2F860A-D2E4-4785-9C60-B1A9A50464B3}" type="datetime3">
               <a:rPr lang="en-US" smtClean="0"/>
-              <a:t>18 January 2022</a:t>
+              <a:t>4 February 2022</a:t>
             </a:fld>
             <a:endParaRPr lang="en-US"/>
           </a:p>
@@ -6693,7 +6819,7 @@
           <a:p>
             <a:fld id="{859B4CCA-7A49-40BA-AA87-E36D3C1B74CD}" type="datetime3">
               <a:rPr lang="en-US" smtClean="0"/>
-              <a:t>18 January 2022</a:t>
+              <a:t>4 February 2022</a:t>
             </a:fld>
             <a:endParaRPr lang="en-US"/>
           </a:p>
@@ -7052,7 +7178,7 @@
           <a:p>
             <a:fld id="{A9402B09-ED4A-4B63-89C4-3E1E373D49A6}" type="datetime3">
               <a:rPr lang="en-US" smtClean="0"/>
-              <a:t>18 January 2022</a:t>
+              <a:t>4 February 2022</a:t>
             </a:fld>
             <a:endParaRPr lang="en-US"/>
           </a:p>
@@ -7178,138 +7304,6 @@
       </p:sp>
       <p:sp>
         <p:nvSpPr>
-          <p:cNvPr id="5" name="Téglalap 4"/>
-          <p:cNvSpPr/>
-          <p:nvPr/>
-        </p:nvSpPr>
-        <p:spPr>
-          <a:xfrm>
-            <a:off x="2185516" y="1594428"/>
-            <a:ext cx="3647552" cy="954594"/>
-          </a:xfrm>
-          <a:prstGeom prst="rect">
-            <a:avLst/>
-          </a:prstGeom>
-        </p:spPr>
-        <p:style>
-          <a:lnRef idx="2">
-            <a:schemeClr val="accent1">
-              <a:shade val="50000"/>
-            </a:schemeClr>
-          </a:lnRef>
-          <a:fillRef idx="1">
-            <a:schemeClr val="accent1"/>
-          </a:fillRef>
-          <a:effectRef idx="0">
-            <a:schemeClr val="accent1"/>
-          </a:effectRef>
-          <a:fontRef idx="minor">
-            <a:schemeClr val="lt1"/>
-          </a:fontRef>
-        </p:style>
-        <p:txBody>
-          <a:bodyPr rtlCol="0" anchor="ctr"/>
-          <a:lstStyle/>
-          <a:p>
-            <a:pPr algn="ctr"/>
-            <a:r>
-              <a:rPr lang="en-US" dirty="0" smtClean="0"/>
-              <a:t>Task1</a:t>
-            </a:r>
-            <a:endParaRPr lang="en-US" dirty="0"/>
-          </a:p>
-        </p:txBody>
-      </p:sp>
-      <p:sp>
-        <p:nvSpPr>
-          <p:cNvPr id="6" name="Téglalap 5"/>
-          <p:cNvSpPr/>
-          <p:nvPr/>
-        </p:nvSpPr>
-        <p:spPr>
-          <a:xfrm>
-            <a:off x="2185516" y="2901338"/>
-            <a:ext cx="3647552" cy="954594"/>
-          </a:xfrm>
-          <a:prstGeom prst="rect">
-            <a:avLst/>
-          </a:prstGeom>
-        </p:spPr>
-        <p:style>
-          <a:lnRef idx="2">
-            <a:schemeClr val="accent1">
-              <a:shade val="50000"/>
-            </a:schemeClr>
-          </a:lnRef>
-          <a:fillRef idx="1">
-            <a:schemeClr val="accent1"/>
-          </a:fillRef>
-          <a:effectRef idx="0">
-            <a:schemeClr val="accent1"/>
-          </a:effectRef>
-          <a:fontRef idx="minor">
-            <a:schemeClr val="lt1"/>
-          </a:fontRef>
-        </p:style>
-        <p:txBody>
-          <a:bodyPr rtlCol="0" anchor="ctr"/>
-          <a:lstStyle/>
-          <a:p>
-            <a:pPr algn="ctr"/>
-            <a:r>
-              <a:rPr lang="en-US" dirty="0" smtClean="0"/>
-              <a:t>Task1</a:t>
-            </a:r>
-            <a:endParaRPr lang="en-US" dirty="0"/>
-          </a:p>
-        </p:txBody>
-      </p:sp>
-      <p:sp>
-        <p:nvSpPr>
-          <p:cNvPr id="7" name="Téglalap 6"/>
-          <p:cNvSpPr/>
-          <p:nvPr/>
-        </p:nvSpPr>
-        <p:spPr>
-          <a:xfrm>
-            <a:off x="2185516" y="4208248"/>
-            <a:ext cx="3647552" cy="954594"/>
-          </a:xfrm>
-          <a:prstGeom prst="rect">
-            <a:avLst/>
-          </a:prstGeom>
-        </p:spPr>
-        <p:style>
-          <a:lnRef idx="2">
-            <a:schemeClr val="accent1">
-              <a:shade val="50000"/>
-            </a:schemeClr>
-          </a:lnRef>
-          <a:fillRef idx="1">
-            <a:schemeClr val="accent1"/>
-          </a:fillRef>
-          <a:effectRef idx="0">
-            <a:schemeClr val="accent1"/>
-          </a:effectRef>
-          <a:fontRef idx="minor">
-            <a:schemeClr val="lt1"/>
-          </a:fontRef>
-        </p:style>
-        <p:txBody>
-          <a:bodyPr rtlCol="0" anchor="ctr"/>
-          <a:lstStyle/>
-          <a:p>
-            <a:pPr algn="ctr"/>
-            <a:r>
-              <a:rPr lang="en-US" dirty="0" smtClean="0"/>
-              <a:t>Task1</a:t>
-            </a:r>
-            <a:endParaRPr lang="en-US" dirty="0"/>
-          </a:p>
-        </p:txBody>
-      </p:sp>
-      <p:sp>
-        <p:nvSpPr>
           <p:cNvPr id="8" name="Szövegdoboz 7"/>
           <p:cNvSpPr txBox="1"/>
           <p:nvPr/>
@@ -7346,7 +7340,7 @@
         </p:nvSpPr>
         <p:spPr>
           <a:xfrm>
-            <a:off x="8129115" y="1125952"/>
+            <a:off x="8153400" y="1063988"/>
             <a:ext cx="1165609" cy="468476"/>
           </a:xfrm>
           <a:prstGeom prst="rect">
@@ -7382,109 +7376,227 @@
           </a:p>
         </p:txBody>
       </p:sp>
-      <p:sp>
-        <p:nvSpPr>
-          <p:cNvPr id="13" name="Téglalap 12"/>
-          <p:cNvSpPr/>
+      <p:grpSp>
+        <p:nvGrpSpPr>
+          <p:cNvPr id="11" name="Csoportba foglalás 10"/>
+          <p:cNvGrpSpPr/>
           <p:nvPr/>
-        </p:nvSpPr>
-        <p:spPr>
+        </p:nvGrpSpPr>
+        <p:grpSpPr>
           <a:xfrm>
-            <a:off x="2175466" y="3617282"/>
-            <a:ext cx="3647552" cy="238649"/>
+            <a:off x="1889716" y="3688331"/>
+            <a:ext cx="3657602" cy="954594"/>
+            <a:chOff x="2175466" y="2901338"/>
+            <a:chExt cx="3657602" cy="954594"/>
           </a:xfrm>
-          <a:prstGeom prst="rect">
-            <a:avLst/>
-          </a:prstGeom>
-          <a:gradFill flip="none" rotWithShape="1">
-            <a:gsLst>
-              <a:gs pos="34000">
-                <a:schemeClr val="accent1">
-                  <a:lumMod val="5000"/>
-                  <a:lumOff val="95000"/>
-                </a:schemeClr>
-              </a:gs>
-              <a:gs pos="53000">
-                <a:schemeClr val="accent6">
-                  <a:lumMod val="75000"/>
-                </a:schemeClr>
-              </a:gs>
-            </a:gsLst>
-            <a:path path="circle">
-              <a:fillToRect l="100000" t="100000"/>
-            </a:path>
-            <a:tileRect r="-100000" b="-100000"/>
-          </a:gradFill>
-        </p:spPr>
-        <p:style>
-          <a:lnRef idx="2">
-            <a:schemeClr val="accent1">
-              <a:shade val="50000"/>
-            </a:schemeClr>
-          </a:lnRef>
-          <a:fillRef idx="1">
-            <a:schemeClr val="accent1"/>
-          </a:fillRef>
-          <a:effectRef idx="0">
-            <a:schemeClr val="accent1"/>
-          </a:effectRef>
-          <a:fontRef idx="minor">
-            <a:schemeClr val="lt1"/>
-          </a:fontRef>
-        </p:style>
-        <p:txBody>
-          <a:bodyPr rtlCol="0" anchor="ctr"/>
-          <a:lstStyle/>
-          <a:p>
-            <a:pPr algn="ctr"/>
-            <a:endParaRPr lang="en-US"/>
-          </a:p>
-        </p:txBody>
-      </p:sp>
-      <p:sp>
-        <p:nvSpPr>
-          <p:cNvPr id="14" name="Téglalap 13"/>
-          <p:cNvSpPr/>
+        </p:grpSpPr>
+        <p:sp>
+          <p:nvSpPr>
+            <p:cNvPr id="6" name="Téglalap 5"/>
+            <p:cNvSpPr/>
+            <p:nvPr/>
+          </p:nvSpPr>
+          <p:spPr>
+            <a:xfrm>
+              <a:off x="2185516" y="2901338"/>
+              <a:ext cx="3647552" cy="954594"/>
+            </a:xfrm>
+            <a:prstGeom prst="rect">
+              <a:avLst/>
+            </a:prstGeom>
+          </p:spPr>
+          <p:style>
+            <a:lnRef idx="2">
+              <a:schemeClr val="accent1">
+                <a:shade val="50000"/>
+              </a:schemeClr>
+            </a:lnRef>
+            <a:fillRef idx="1">
+              <a:schemeClr val="accent1"/>
+            </a:fillRef>
+            <a:effectRef idx="0">
+              <a:schemeClr val="accent1"/>
+            </a:effectRef>
+            <a:fontRef idx="minor">
+              <a:schemeClr val="lt1"/>
+            </a:fontRef>
+          </p:style>
+          <p:txBody>
+            <a:bodyPr rtlCol="0" anchor="ctr"/>
+            <a:lstStyle/>
+            <a:p>
+              <a:pPr algn="ctr"/>
+              <a:r>
+                <a:rPr lang="en-US" dirty="0" smtClean="0"/>
+                <a:t>Task1</a:t>
+              </a:r>
+              <a:endParaRPr lang="en-US" dirty="0"/>
+            </a:p>
+          </p:txBody>
+        </p:sp>
+        <p:sp>
+          <p:nvSpPr>
+            <p:cNvPr id="13" name="Téglalap 12"/>
+            <p:cNvSpPr/>
+            <p:nvPr/>
+          </p:nvSpPr>
+          <p:spPr>
+            <a:xfrm>
+              <a:off x="2175466" y="3617282"/>
+              <a:ext cx="3647552" cy="238649"/>
+            </a:xfrm>
+            <a:prstGeom prst="rect">
+              <a:avLst/>
+            </a:prstGeom>
+            <a:gradFill flip="none" rotWithShape="1">
+              <a:gsLst>
+                <a:gs pos="34000">
+                  <a:schemeClr val="accent1">
+                    <a:lumMod val="5000"/>
+                    <a:lumOff val="95000"/>
+                  </a:schemeClr>
+                </a:gs>
+                <a:gs pos="53000">
+                  <a:schemeClr val="accent6">
+                    <a:lumMod val="75000"/>
+                  </a:schemeClr>
+                </a:gs>
+              </a:gsLst>
+              <a:path path="circle">
+                <a:fillToRect l="100000" t="100000"/>
+              </a:path>
+              <a:tileRect r="-100000" b="-100000"/>
+            </a:gradFill>
+          </p:spPr>
+          <p:style>
+            <a:lnRef idx="2">
+              <a:schemeClr val="accent1">
+                <a:shade val="50000"/>
+              </a:schemeClr>
+            </a:lnRef>
+            <a:fillRef idx="1">
+              <a:schemeClr val="accent1"/>
+            </a:fillRef>
+            <a:effectRef idx="0">
+              <a:schemeClr val="accent1"/>
+            </a:effectRef>
+            <a:fontRef idx="minor">
+              <a:schemeClr val="lt1"/>
+            </a:fontRef>
+          </p:style>
+          <p:txBody>
+            <a:bodyPr rtlCol="0" anchor="ctr"/>
+            <a:lstStyle/>
+            <a:p>
+              <a:pPr algn="ctr"/>
+              <a:endParaRPr lang="en-US"/>
+            </a:p>
+          </p:txBody>
+        </p:sp>
+      </p:grpSp>
+      <p:grpSp>
+        <p:nvGrpSpPr>
+          <p:cNvPr id="12" name="Csoportba foglalás 11"/>
+          <p:cNvGrpSpPr/>
           <p:nvPr/>
-        </p:nvSpPr>
-        <p:spPr>
+        </p:nvGrpSpPr>
+        <p:grpSpPr>
           <a:xfrm>
-            <a:off x="2175466" y="4924193"/>
-            <a:ext cx="3647552" cy="238649"/>
+            <a:off x="1889716" y="4912954"/>
+            <a:ext cx="3657602" cy="954594"/>
+            <a:chOff x="2175466" y="4125961"/>
+            <a:chExt cx="3657602" cy="954594"/>
           </a:xfrm>
-          <a:prstGeom prst="rect">
-            <a:avLst/>
-          </a:prstGeom>
-        </p:spPr>
-        <p:style>
-          <a:lnRef idx="2">
-            <a:schemeClr val="accent6">
-              <a:shade val="50000"/>
-            </a:schemeClr>
-          </a:lnRef>
-          <a:fillRef idx="1">
-            <a:schemeClr val="accent6"/>
-          </a:fillRef>
-          <a:effectRef idx="0">
-            <a:schemeClr val="accent6"/>
-          </a:effectRef>
-          <a:fontRef idx="minor">
-            <a:schemeClr val="lt1"/>
-          </a:fontRef>
-        </p:style>
-        <p:txBody>
-          <a:bodyPr rtlCol="0" anchor="ctr"/>
-          <a:lstStyle/>
-          <a:p>
-            <a:pPr algn="ctr"/>
-            <a:r>
-              <a:rPr lang="en-US" dirty="0" smtClean="0"/>
-              <a:t>Completed</a:t>
-            </a:r>
-            <a:endParaRPr lang="en-US" dirty="0"/>
-          </a:p>
-        </p:txBody>
-      </p:sp>
+        </p:grpSpPr>
+        <p:sp>
+          <p:nvSpPr>
+            <p:cNvPr id="7" name="Téglalap 6"/>
+            <p:cNvSpPr/>
+            <p:nvPr/>
+          </p:nvSpPr>
+          <p:spPr>
+            <a:xfrm>
+              <a:off x="2185516" y="4125961"/>
+              <a:ext cx="3647552" cy="954594"/>
+            </a:xfrm>
+            <a:prstGeom prst="rect">
+              <a:avLst/>
+            </a:prstGeom>
+          </p:spPr>
+          <p:style>
+            <a:lnRef idx="2">
+              <a:schemeClr val="accent1">
+                <a:shade val="50000"/>
+              </a:schemeClr>
+            </a:lnRef>
+            <a:fillRef idx="1">
+              <a:schemeClr val="accent1"/>
+            </a:fillRef>
+            <a:effectRef idx="0">
+              <a:schemeClr val="accent1"/>
+            </a:effectRef>
+            <a:fontRef idx="minor">
+              <a:schemeClr val="lt1"/>
+            </a:fontRef>
+          </p:style>
+          <p:txBody>
+            <a:bodyPr rtlCol="0" anchor="ctr"/>
+            <a:lstStyle/>
+            <a:p>
+              <a:pPr algn="ctr"/>
+              <a:r>
+                <a:rPr lang="en-US" dirty="0" smtClean="0"/>
+                <a:t>Task1</a:t>
+              </a:r>
+              <a:endParaRPr lang="en-US" dirty="0"/>
+            </a:p>
+          </p:txBody>
+        </p:sp>
+        <p:sp>
+          <p:nvSpPr>
+            <p:cNvPr id="14" name="Téglalap 13"/>
+            <p:cNvSpPr/>
+            <p:nvPr/>
+          </p:nvSpPr>
+          <p:spPr>
+            <a:xfrm>
+              <a:off x="2175466" y="4836111"/>
+              <a:ext cx="3647552" cy="238649"/>
+            </a:xfrm>
+            <a:prstGeom prst="rect">
+              <a:avLst/>
+            </a:prstGeom>
+          </p:spPr>
+          <p:style>
+            <a:lnRef idx="2">
+              <a:schemeClr val="accent6">
+                <a:shade val="50000"/>
+              </a:schemeClr>
+            </a:lnRef>
+            <a:fillRef idx="1">
+              <a:schemeClr val="accent6"/>
+            </a:fillRef>
+            <a:effectRef idx="0">
+              <a:schemeClr val="accent6"/>
+            </a:effectRef>
+            <a:fontRef idx="minor">
+              <a:schemeClr val="lt1"/>
+            </a:fontRef>
+          </p:style>
+          <p:txBody>
+            <a:bodyPr rtlCol="0" anchor="ctr"/>
+            <a:lstStyle/>
+            <a:p>
+              <a:pPr algn="ctr"/>
+              <a:r>
+                <a:rPr lang="en-US" dirty="0" smtClean="0"/>
+                <a:t>Completed</a:t>
+              </a:r>
+              <a:endParaRPr lang="en-US" dirty="0"/>
+            </a:p>
+          </p:txBody>
+        </p:sp>
+      </p:grpSp>
       <p:sp>
         <p:nvSpPr>
           <p:cNvPr id="17" name="Téglalap 16"/>
@@ -7493,7 +7605,7 @@
         </p:nvSpPr>
         <p:spPr>
           <a:xfrm>
-            <a:off x="9653349" y="1147616"/>
+            <a:off x="9575241" y="1087920"/>
             <a:ext cx="1276141" cy="473199"/>
           </a:xfrm>
           <a:prstGeom prst="rect">
@@ -7577,7 +7689,7 @@
         </p:nvSpPr>
         <p:spPr>
           <a:xfrm>
-            <a:off x="2988009" y="1057445"/>
+            <a:off x="3688578" y="2012088"/>
             <a:ext cx="1547446" cy="369332"/>
           </a:xfrm>
           <a:prstGeom prst="rect">
@@ -7637,11 +7749,7 @@
           <a:p>
             <a:r>
               <a:rPr lang="en-US" dirty="0" smtClean="0"/>
-              <a:t>Finished </a:t>
-            </a:r>
-            <a:r>
-              <a:rPr lang="en-US" dirty="0" smtClean="0"/>
-              <a:t>Tasks</a:t>
+              <a:t>Finished Tasks</a:t>
             </a:r>
             <a:endParaRPr lang="en-US" dirty="0"/>
           </a:p>
@@ -7734,7 +7842,7 @@
           <a:p>
             <a:fld id="{F14D243E-DB4A-407C-AFAE-0BC32BA45E9E}" type="datetime3">
               <a:rPr lang="en-US" smtClean="0"/>
-              <a:t>18 January 2022</a:t>
+              <a:t>4 February 2022</a:t>
             </a:fld>
             <a:endParaRPr lang="en-US"/>
           </a:p>
@@ -7786,50 +7894,109 @@
           </a:p>
         </p:txBody>
       </p:sp>
-      <p:sp>
-        <p:nvSpPr>
-          <p:cNvPr id="2" name="Téglalap 1"/>
-          <p:cNvSpPr/>
+      <p:grpSp>
+        <p:nvGrpSpPr>
+          <p:cNvPr id="10" name="Csoportba foglalás 9"/>
+          <p:cNvGrpSpPr/>
           <p:nvPr/>
-        </p:nvSpPr>
-        <p:spPr>
+        </p:nvGrpSpPr>
+        <p:grpSpPr>
           <a:xfrm>
-            <a:off x="2185516" y="2257425"/>
-            <a:ext cx="3647552" cy="291597"/>
+            <a:off x="1899766" y="2381421"/>
+            <a:ext cx="3647552" cy="954594"/>
+            <a:chOff x="2185516" y="1594428"/>
+            <a:chExt cx="3647552" cy="954594"/>
           </a:xfrm>
-          <a:prstGeom prst="rect">
-            <a:avLst/>
-          </a:prstGeom>
-        </p:spPr>
-        <p:style>
-          <a:lnRef idx="2">
-            <a:schemeClr val="accent5">
-              <a:shade val="50000"/>
-            </a:schemeClr>
-          </a:lnRef>
-          <a:fillRef idx="1">
-            <a:schemeClr val="accent5"/>
-          </a:fillRef>
-          <a:effectRef idx="0">
-            <a:schemeClr val="accent5"/>
-          </a:effectRef>
-          <a:fontRef idx="minor">
-            <a:schemeClr val="lt1"/>
-          </a:fontRef>
-        </p:style>
-        <p:txBody>
-          <a:bodyPr rtlCol="0" anchor="ctr"/>
-          <a:lstStyle/>
-          <a:p>
-            <a:pPr algn="ctr"/>
-            <a:r>
-              <a:rPr lang="en-US" dirty="0" smtClean="0"/>
-              <a:t>Start</a:t>
-            </a:r>
-            <a:endParaRPr lang="en-US" dirty="0"/>
-          </a:p>
-        </p:txBody>
-      </p:sp>
+        </p:grpSpPr>
+        <p:sp>
+          <p:nvSpPr>
+            <p:cNvPr id="5" name="Téglalap 4"/>
+            <p:cNvSpPr/>
+            <p:nvPr/>
+          </p:nvSpPr>
+          <p:spPr>
+            <a:xfrm>
+              <a:off x="2185516" y="1594428"/>
+              <a:ext cx="3647552" cy="954594"/>
+            </a:xfrm>
+            <a:prstGeom prst="rect">
+              <a:avLst/>
+            </a:prstGeom>
+          </p:spPr>
+          <p:style>
+            <a:lnRef idx="2">
+              <a:schemeClr val="accent1">
+                <a:shade val="50000"/>
+              </a:schemeClr>
+            </a:lnRef>
+            <a:fillRef idx="1">
+              <a:schemeClr val="accent1"/>
+            </a:fillRef>
+            <a:effectRef idx="0">
+              <a:schemeClr val="accent1"/>
+            </a:effectRef>
+            <a:fontRef idx="minor">
+              <a:schemeClr val="lt1"/>
+            </a:fontRef>
+          </p:style>
+          <p:txBody>
+            <a:bodyPr rtlCol="0" anchor="ctr"/>
+            <a:lstStyle/>
+            <a:p>
+              <a:pPr algn="ctr"/>
+              <a:r>
+                <a:rPr lang="en-US" dirty="0" smtClean="0"/>
+                <a:t>Task1</a:t>
+              </a:r>
+              <a:endParaRPr lang="en-US" dirty="0"/>
+            </a:p>
+          </p:txBody>
+        </p:sp>
+        <p:sp>
+          <p:nvSpPr>
+            <p:cNvPr id="2" name="Téglalap 1"/>
+            <p:cNvSpPr/>
+            <p:nvPr/>
+          </p:nvSpPr>
+          <p:spPr>
+            <a:xfrm>
+              <a:off x="2185516" y="2257425"/>
+              <a:ext cx="3647552" cy="291597"/>
+            </a:xfrm>
+            <a:prstGeom prst="rect">
+              <a:avLst/>
+            </a:prstGeom>
+          </p:spPr>
+          <p:style>
+            <a:lnRef idx="2">
+              <a:schemeClr val="accent5">
+                <a:shade val="50000"/>
+              </a:schemeClr>
+            </a:lnRef>
+            <a:fillRef idx="1">
+              <a:schemeClr val="accent5"/>
+            </a:fillRef>
+            <a:effectRef idx="0">
+              <a:schemeClr val="accent5"/>
+            </a:effectRef>
+            <a:fontRef idx="minor">
+              <a:schemeClr val="lt1"/>
+            </a:fontRef>
+          </p:style>
+          <p:txBody>
+            <a:bodyPr rtlCol="0" anchor="ctr"/>
+            <a:lstStyle/>
+            <a:p>
+              <a:pPr algn="ctr"/>
+              <a:r>
+                <a:rPr lang="en-US" dirty="0" smtClean="0"/>
+                <a:t>Start</a:t>
+              </a:r>
+              <a:endParaRPr lang="en-US" dirty="0"/>
+            </a:p>
+          </p:txBody>
+        </p:sp>
+      </p:grpSp>
       <p:sp>
         <p:nvSpPr>
           <p:cNvPr id="24" name="Téglalap 23"/>
@@ -7838,8 +8005,8 @@
         </p:nvSpPr>
         <p:spPr>
           <a:xfrm>
-            <a:off x="1557495" y="954870"/>
-            <a:ext cx="6138706" cy="5131254"/>
+            <a:off x="1586945" y="1723221"/>
+            <a:ext cx="6129180" cy="4465309"/>
           </a:xfrm>
           <a:prstGeom prst="rect">
             <a:avLst/>
@@ -7880,7 +8047,7 @@
         </p:nvSpPr>
         <p:spPr>
           <a:xfrm>
-            <a:off x="4696398" y="3200400"/>
+            <a:off x="4368634" y="2674776"/>
             <a:ext cx="1317538" cy="369332"/>
           </a:xfrm>
           <a:prstGeom prst="rect">
@@ -8022,6 +8189,48 @@
               <a:t>Tasks:</a:t>
             </a:r>
             <a:endParaRPr lang="en-US" sz="1600" i="1" dirty="0"/>
+          </a:p>
+        </p:txBody>
+      </p:sp>
+      <p:sp>
+        <p:nvSpPr>
+          <p:cNvPr id="15" name="Téglalap 14"/>
+          <p:cNvSpPr/>
+          <p:nvPr/>
+        </p:nvSpPr>
+        <p:spPr>
+          <a:xfrm>
+            <a:off x="1442250" y="944057"/>
+            <a:ext cx="9625947" cy="708337"/>
+          </a:xfrm>
+          <a:prstGeom prst="rect">
+            <a:avLst/>
+          </a:prstGeom>
+          <a:noFill/>
+          <a:ln w="25400"/>
+        </p:spPr>
+        <p:style>
+          <a:lnRef idx="2">
+            <a:schemeClr val="accent1">
+              <a:shade val="50000"/>
+            </a:schemeClr>
+          </a:lnRef>
+          <a:fillRef idx="1">
+            <a:schemeClr val="accent1"/>
+          </a:fillRef>
+          <a:effectRef idx="0">
+            <a:schemeClr val="accent1"/>
+          </a:effectRef>
+          <a:fontRef idx="minor">
+            <a:schemeClr val="lt1"/>
+          </a:fontRef>
+        </p:style>
+        <p:txBody>
+          <a:bodyPr rtlCol="0" anchor="ctr"/>
+          <a:lstStyle/>
+          <a:p>
+            <a:pPr algn="ctr"/>
+            <a:endParaRPr lang="en-US"/>
           </a:p>
         </p:txBody>
       </p:sp>
@@ -8521,11 +8730,7 @@
           <a:p>
             <a:r>
               <a:rPr lang="en-US" sz="1600" i="1" dirty="0" smtClean="0"/>
-              <a:t>Theme </a:t>
-            </a:r>
-            <a:r>
-              <a:rPr lang="en-US" sz="1600" i="1" dirty="0" smtClean="0"/>
-              <a:t>– skin:</a:t>
+              <a:t>Theme – skin:</a:t>
             </a:r>
             <a:endParaRPr lang="en-US" sz="1600" i="1" dirty="0"/>
           </a:p>
@@ -8709,11 +8914,7 @@
           <a:p>
             <a:r>
               <a:rPr lang="en-US" sz="1600" i="1" dirty="0" smtClean="0"/>
-              <a:t>Tasks </a:t>
-            </a:r>
-            <a:r>
-              <a:rPr lang="en-US" sz="1600" i="1" dirty="0" smtClean="0"/>
-              <a:t>sorting:</a:t>
+              <a:t>Tasks sorting:</a:t>
             </a:r>
             <a:endParaRPr lang="en-US" sz="1600" i="1" dirty="0"/>
           </a:p>
@@ -9865,7 +10066,7 @@
           <a:p>
             <a:fld id="{D1ADE0D0-F6AA-4072-9326-915F27F2EB27}" type="datetime3">
               <a:rPr lang="en-US" smtClean="0"/>
-              <a:t>18 January 2022</a:t>
+              <a:t>4 February 2022</a:t>
             </a:fld>
             <a:endParaRPr lang="en-US" dirty="0"/>
           </a:p>
@@ -10106,7 +10307,7 @@
           <a:p>
             <a:fld id="{C4DDBBDB-B7E6-470C-8F06-93D4F09ACFE1}" type="datetime3">
               <a:rPr lang="en-US" smtClean="0"/>
-              <a:t>18 January 2022</a:t>
+              <a:t>4 February 2022</a:t>
             </a:fld>
             <a:endParaRPr lang="en-US"/>
           </a:p>

</xml_diff>

<commit_message>
powerPoint plan is modified
</commit_message>
<xml_diff>
--- a/plan/TaskTracingApp.pptx
+++ b/plan/TaskTracingApp.pptx
@@ -2755,7 +2755,7 @@
           <a:p>
             <a:fld id="{5EBE3839-043F-4D6A-BB69-1C2CEF42D310}" type="datetimeFigureOut">
               <a:rPr lang="en-US" smtClean="0"/>
-              <a:t>2/15/2022</a:t>
+              <a:t>3/7/2022</a:t>
             </a:fld>
             <a:endParaRPr lang="en-US"/>
           </a:p>
@@ -3438,7 +3438,7 @@
           <a:p>
             <a:fld id="{8E031A97-C5A4-4558-8890-FA2925244C4F}" type="datetime3">
               <a:rPr lang="en-US" smtClean="0"/>
-              <a:t>15 February 2022</a:t>
+              <a:t>7 March 2022</a:t>
             </a:fld>
             <a:endParaRPr lang="en-US"/>
           </a:p>
@@ -3612,7 +3612,7 @@
           <a:p>
             <a:fld id="{156D25A5-2131-4D11-8DF2-BFE448E0C6C4}" type="datetime3">
               <a:rPr lang="en-US" smtClean="0"/>
-              <a:t>15 February 2022</a:t>
+              <a:t>7 March 2022</a:t>
             </a:fld>
             <a:endParaRPr lang="en-US"/>
           </a:p>
@@ -3796,7 +3796,7 @@
           <a:p>
             <a:fld id="{741DCA71-90D2-471A-B4F6-D63D3144D802}" type="datetime3">
               <a:rPr lang="en-US" smtClean="0"/>
-              <a:t>15 February 2022</a:t>
+              <a:t>7 March 2022</a:t>
             </a:fld>
             <a:endParaRPr lang="en-US"/>
           </a:p>
@@ -3970,7 +3970,7 @@
           <a:p>
             <a:fld id="{859B4CCA-7A49-40BA-AA87-E36D3C1B74CD}" type="datetime3">
               <a:rPr lang="en-US" smtClean="0"/>
-              <a:t>15 February 2022</a:t>
+              <a:t>7 March 2022</a:t>
             </a:fld>
             <a:endParaRPr lang="en-US"/>
           </a:p>
@@ -4220,7 +4220,7 @@
           <a:p>
             <a:fld id="{00C05CC3-8230-4750-BEE6-66D4A1F33F0F}" type="datetime3">
               <a:rPr lang="en-US" smtClean="0"/>
-              <a:t>15 February 2022</a:t>
+              <a:t>7 March 2022</a:t>
             </a:fld>
             <a:endParaRPr lang="en-US"/>
           </a:p>
@@ -4456,7 +4456,7 @@
           <a:p>
             <a:fld id="{3DEBFD87-4EA2-4600-AB37-3AFC3D80519A}" type="datetime3">
               <a:rPr lang="en-US" smtClean="0"/>
-              <a:t>15 February 2022</a:t>
+              <a:t>7 March 2022</a:t>
             </a:fld>
             <a:endParaRPr lang="en-US"/>
           </a:p>
@@ -4827,7 +4827,7 @@
           <a:p>
             <a:fld id="{A72CEC32-E708-4316-8666-BA8BF9722CA0}" type="datetime3">
               <a:rPr lang="en-US" smtClean="0"/>
-              <a:t>15 February 2022</a:t>
+              <a:t>7 March 2022</a:t>
             </a:fld>
             <a:endParaRPr lang="en-US"/>
           </a:p>
@@ -4949,7 +4949,7 @@
           <a:p>
             <a:fld id="{7CF1C314-8D6F-4732-88D4-94FF05CBB104}" type="datetime3">
               <a:rPr lang="en-US" smtClean="0"/>
-              <a:t>15 February 2022</a:t>
+              <a:t>7 March 2022</a:t>
             </a:fld>
             <a:endParaRPr lang="en-US"/>
           </a:p>
@@ -5048,7 +5048,7 @@
           <a:p>
             <a:fld id="{47DA11E4-27AF-4B9F-BEF3-3CA15041E18E}" type="datetime3">
               <a:rPr lang="en-US" smtClean="0"/>
-              <a:t>15 February 2022</a:t>
+              <a:t>7 March 2022</a:t>
             </a:fld>
             <a:endParaRPr lang="en-US"/>
           </a:p>
@@ -5329,7 +5329,7 @@
           <a:p>
             <a:fld id="{E2C02590-7F59-421C-A745-32233A68051D}" type="datetime3">
               <a:rPr lang="en-US" smtClean="0"/>
-              <a:t>15 February 2022</a:t>
+              <a:t>7 March 2022</a:t>
             </a:fld>
             <a:endParaRPr lang="en-US"/>
           </a:p>
@@ -5586,7 +5586,7 @@
           <a:p>
             <a:fld id="{84AF07D1-C31F-46EF-9183-DC77B1A31FFA}" type="datetime3">
               <a:rPr lang="en-US" smtClean="0"/>
-              <a:t>15 February 2022</a:t>
+              <a:t>7 March 2022</a:t>
             </a:fld>
             <a:endParaRPr lang="en-US"/>
           </a:p>
@@ -5808,7 +5808,7 @@
           <a:p>
             <a:fld id="{9D694A8E-69FB-424F-BB61-8EE202972235}" type="datetime3">
               <a:rPr lang="en-US" smtClean="0"/>
-              <a:t>15 February 2022</a:t>
+              <a:t>7 March 2022</a:t>
             </a:fld>
             <a:endParaRPr lang="en-US"/>
           </a:p>
@@ -6387,7 +6387,7 @@
         <p:spPr>
           <a:xfrm>
             <a:off x="5689853" y="2447875"/>
-            <a:ext cx="5482971" cy="4801314"/>
+            <a:ext cx="5482971" cy="4431983"/>
           </a:xfrm>
           <a:prstGeom prst="rect">
             <a:avLst/>
@@ -6482,17 +6482,11 @@
             </a:pPr>
             <a:r>
               <a:rPr lang="en-US" sz="2400" dirty="0" smtClean="0"/>
-              <a:t>Achievement?</a:t>
-            </a:r>
-          </a:p>
-          <a:p>
-            <a:pPr marL="285750" indent="-285750">
-              <a:buFont typeface="Arial" panose="020B0604020202020204" pitchFamily="34" charset="0"/>
-              <a:buChar char="•"/>
-            </a:pPr>
+              <a:t>More </a:t>
+            </a:r>
             <a:r>
               <a:rPr lang="en-US" sz="2400" dirty="0" smtClean="0"/>
-              <a:t>More language support?</a:t>
+              <a:t>language support?</a:t>
             </a:r>
           </a:p>
           <a:p>
@@ -6528,7 +6522,7 @@
           <a:p>
             <a:fld id="{EE2F860A-D2E4-4785-9C60-B1A9A50464B3}" type="datetime3">
               <a:rPr lang="en-US" smtClean="0"/>
-              <a:t>15 February 2022</a:t>
+              <a:t>7 March 2022</a:t>
             </a:fld>
             <a:endParaRPr lang="en-US"/>
           </a:p>
@@ -6730,7 +6724,11 @@
             </a:r>
             <a:r>
               <a:rPr lang="en-US" dirty="0" smtClean="0"/>
-              <a:t>: I/O to file (store data)</a:t>
+              <a:t> server: </a:t>
+            </a:r>
+            <a:r>
+              <a:rPr lang="en-US" dirty="0" smtClean="0"/>
+              <a:t>I/O to file (store data)</a:t>
             </a:r>
           </a:p>
           <a:p>
@@ -6777,7 +6775,7 @@
           <a:p>
             <a:fld id="{859B4CCA-7A49-40BA-AA87-E36D3C1B74CD}" type="datetime3">
               <a:rPr lang="en-US" smtClean="0"/>
-              <a:t>15 February 2022</a:t>
+              <a:t>7 March 2022</a:t>
             </a:fld>
             <a:endParaRPr lang="en-US"/>
           </a:p>
@@ -7136,7 +7134,7 @@
           <a:p>
             <a:fld id="{A9402B09-ED4A-4B63-89C4-3E1E373D49A6}" type="datetime3">
               <a:rPr lang="en-US" smtClean="0"/>
-              <a:t>15 February 2022</a:t>
+              <a:t>7 March 2022</a:t>
             </a:fld>
             <a:endParaRPr lang="en-US"/>
           </a:p>
@@ -7800,7 +7798,7 @@
           <a:p>
             <a:fld id="{F14D243E-DB4A-407C-AFAE-0BC32BA45E9E}" type="datetime3">
               <a:rPr lang="en-US" smtClean="0"/>
-              <a:t>15 February 2022</a:t>
+              <a:t>7 March 2022</a:t>
             </a:fld>
             <a:endParaRPr lang="en-US"/>
           </a:p>
@@ -10024,7 +10022,7 @@
           <a:p>
             <a:fld id="{D1ADE0D0-F6AA-4072-9326-915F27F2EB27}" type="datetime3">
               <a:rPr lang="en-US" smtClean="0"/>
-              <a:t>15 February 2022</a:t>
+              <a:t>7 March 2022</a:t>
             </a:fld>
             <a:endParaRPr lang="en-US" dirty="0"/>
           </a:p>
@@ -10265,7 +10263,7 @@
           <a:p>
             <a:fld id="{C4DDBBDB-B7E6-470C-8F06-93D4F09ACFE1}" type="datetime3">
               <a:rPr lang="en-US" smtClean="0"/>
-              <a:t>15 February 2022</a:t>
+              <a:t>7 March 2022</a:t>
             </a:fld>
             <a:endParaRPr lang="en-US"/>
           </a:p>

</xml_diff>

<commit_message>
ppt is sub-task done
</commit_message>
<xml_diff>
--- a/plan/TaskTracingApp.pptx
+++ b/plan/TaskTracingApp.pptx
@@ -2755,7 +2755,7 @@
           <a:p>
             <a:fld id="{5EBE3839-043F-4D6A-BB69-1C2CEF42D310}" type="datetimeFigureOut">
               <a:rPr lang="en-US" smtClean="0"/>
-              <a:t>3/7/2022</a:t>
+              <a:t>3/13/2022</a:t>
             </a:fld>
             <a:endParaRPr lang="en-US"/>
           </a:p>
@@ -3067,6 +3067,37 @@
           <a:bodyPr/>
           <a:lstStyle/>
           <a:p>
+            <a:r>
+              <a:rPr lang="en-US" dirty="0" err="1" smtClean="0"/>
+              <a:t>AlertWindow</a:t>
+            </a:r>
+            <a:r>
+              <a:rPr lang="en-US" dirty="0" smtClean="0"/>
+              <a:t>, with </a:t>
+            </a:r>
+            <a:r>
+              <a:rPr lang="en-US" dirty="0" smtClean="0"/>
+              <a:t>service with test (done)</a:t>
+            </a:r>
+            <a:endParaRPr lang="en-US" dirty="0" smtClean="0"/>
+          </a:p>
+          <a:p>
+            <a:r>
+              <a:rPr lang="en-US" baseline="0" smtClean="0"/>
+              <a:t>Validators </a:t>
+            </a:r>
+            <a:r>
+              <a:rPr lang="en-US" baseline="0" dirty="0" smtClean="0"/>
+              <a:t>test by reactive form, </a:t>
+            </a:r>
+            <a:r>
+              <a:rPr lang="en-US" baseline="0" dirty="0" err="1" smtClean="0"/>
+              <a:t>formGroup</a:t>
+            </a:r>
+            <a:r>
+              <a:rPr lang="en-US" baseline="0" dirty="0" smtClean="0"/>
+              <a:t> (done)</a:t>
+            </a:r>
             <a:endParaRPr lang="en-US" dirty="0" smtClean="0"/>
           </a:p>
         </p:txBody>
@@ -3438,7 +3469,7 @@
           <a:p>
             <a:fld id="{8E031A97-C5A4-4558-8890-FA2925244C4F}" type="datetime3">
               <a:rPr lang="en-US" smtClean="0"/>
-              <a:t>7 March 2022</a:t>
+              <a:t>13 March 2022</a:t>
             </a:fld>
             <a:endParaRPr lang="en-US"/>
           </a:p>
@@ -3612,7 +3643,7 @@
           <a:p>
             <a:fld id="{156D25A5-2131-4D11-8DF2-BFE448E0C6C4}" type="datetime3">
               <a:rPr lang="en-US" smtClean="0"/>
-              <a:t>7 March 2022</a:t>
+              <a:t>13 March 2022</a:t>
             </a:fld>
             <a:endParaRPr lang="en-US"/>
           </a:p>
@@ -3796,7 +3827,7 @@
           <a:p>
             <a:fld id="{741DCA71-90D2-471A-B4F6-D63D3144D802}" type="datetime3">
               <a:rPr lang="en-US" smtClean="0"/>
-              <a:t>7 March 2022</a:t>
+              <a:t>13 March 2022</a:t>
             </a:fld>
             <a:endParaRPr lang="en-US"/>
           </a:p>
@@ -3970,7 +4001,7 @@
           <a:p>
             <a:fld id="{859B4CCA-7A49-40BA-AA87-E36D3C1B74CD}" type="datetime3">
               <a:rPr lang="en-US" smtClean="0"/>
-              <a:t>7 March 2022</a:t>
+              <a:t>13 March 2022</a:t>
             </a:fld>
             <a:endParaRPr lang="en-US"/>
           </a:p>
@@ -4220,7 +4251,7 @@
           <a:p>
             <a:fld id="{00C05CC3-8230-4750-BEE6-66D4A1F33F0F}" type="datetime3">
               <a:rPr lang="en-US" smtClean="0"/>
-              <a:t>7 March 2022</a:t>
+              <a:t>13 March 2022</a:t>
             </a:fld>
             <a:endParaRPr lang="en-US"/>
           </a:p>
@@ -4456,7 +4487,7 @@
           <a:p>
             <a:fld id="{3DEBFD87-4EA2-4600-AB37-3AFC3D80519A}" type="datetime3">
               <a:rPr lang="en-US" smtClean="0"/>
-              <a:t>7 March 2022</a:t>
+              <a:t>13 March 2022</a:t>
             </a:fld>
             <a:endParaRPr lang="en-US"/>
           </a:p>
@@ -4827,7 +4858,7 @@
           <a:p>
             <a:fld id="{A72CEC32-E708-4316-8666-BA8BF9722CA0}" type="datetime3">
               <a:rPr lang="en-US" smtClean="0"/>
-              <a:t>7 March 2022</a:t>
+              <a:t>13 March 2022</a:t>
             </a:fld>
             <a:endParaRPr lang="en-US"/>
           </a:p>
@@ -4949,7 +4980,7 @@
           <a:p>
             <a:fld id="{7CF1C314-8D6F-4732-88D4-94FF05CBB104}" type="datetime3">
               <a:rPr lang="en-US" smtClean="0"/>
-              <a:t>7 March 2022</a:t>
+              <a:t>13 March 2022</a:t>
             </a:fld>
             <a:endParaRPr lang="en-US"/>
           </a:p>
@@ -5048,7 +5079,7 @@
           <a:p>
             <a:fld id="{47DA11E4-27AF-4B9F-BEF3-3CA15041E18E}" type="datetime3">
               <a:rPr lang="en-US" smtClean="0"/>
-              <a:t>7 March 2022</a:t>
+              <a:t>13 March 2022</a:t>
             </a:fld>
             <a:endParaRPr lang="en-US"/>
           </a:p>
@@ -5329,7 +5360,7 @@
           <a:p>
             <a:fld id="{E2C02590-7F59-421C-A745-32233A68051D}" type="datetime3">
               <a:rPr lang="en-US" smtClean="0"/>
-              <a:t>7 March 2022</a:t>
+              <a:t>13 March 2022</a:t>
             </a:fld>
             <a:endParaRPr lang="en-US"/>
           </a:p>
@@ -5586,7 +5617,7 @@
           <a:p>
             <a:fld id="{84AF07D1-C31F-46EF-9183-DC77B1A31FFA}" type="datetime3">
               <a:rPr lang="en-US" smtClean="0"/>
-              <a:t>7 March 2022</a:t>
+              <a:t>13 March 2022</a:t>
             </a:fld>
             <a:endParaRPr lang="en-US"/>
           </a:p>
@@ -5808,7 +5839,7 @@
           <a:p>
             <a:fld id="{9D694A8E-69FB-424F-BB61-8EE202972235}" type="datetime3">
               <a:rPr lang="en-US" smtClean="0"/>
-              <a:t>7 March 2022</a:t>
+              <a:t>13 March 2022</a:t>
             </a:fld>
             <a:endParaRPr lang="en-US"/>
           </a:p>
@@ -6482,11 +6513,7 @@
             </a:pPr>
             <a:r>
               <a:rPr lang="en-US" sz="2400" dirty="0" smtClean="0"/>
-              <a:t>More </a:t>
-            </a:r>
-            <a:r>
-              <a:rPr lang="en-US" sz="2400" dirty="0" smtClean="0"/>
-              <a:t>language support?</a:t>
+              <a:t>More language support?</a:t>
             </a:r>
           </a:p>
           <a:p>
@@ -6522,7 +6549,7 @@
           <a:p>
             <a:fld id="{EE2F860A-D2E4-4785-9C60-B1A9A50464B3}" type="datetime3">
               <a:rPr lang="en-US" smtClean="0"/>
-              <a:t>7 March 2022</a:t>
+              <a:t>13 March 2022</a:t>
             </a:fld>
             <a:endParaRPr lang="en-US"/>
           </a:p>
@@ -6724,11 +6751,7 @@
             </a:r>
             <a:r>
               <a:rPr lang="en-US" dirty="0" smtClean="0"/>
-              <a:t> server: </a:t>
-            </a:r>
-            <a:r>
-              <a:rPr lang="en-US" dirty="0" smtClean="0"/>
-              <a:t>I/O to file (store data)</a:t>
+              <a:t> server: I/O to file (store data)</a:t>
             </a:r>
           </a:p>
           <a:p>
@@ -6775,7 +6798,7 @@
           <a:p>
             <a:fld id="{859B4CCA-7A49-40BA-AA87-E36D3C1B74CD}" type="datetime3">
               <a:rPr lang="en-US" smtClean="0"/>
-              <a:t>7 March 2022</a:t>
+              <a:t>13 March 2022</a:t>
             </a:fld>
             <a:endParaRPr lang="en-US"/>
           </a:p>
@@ -7134,7 +7157,7 @@
           <a:p>
             <a:fld id="{A9402B09-ED4A-4B63-89C4-3E1E373D49A6}" type="datetime3">
               <a:rPr lang="en-US" smtClean="0"/>
-              <a:t>7 March 2022</a:t>
+              <a:t>13 March 2022</a:t>
             </a:fld>
             <a:endParaRPr lang="en-US"/>
           </a:p>
@@ -7798,7 +7821,7 @@
           <a:p>
             <a:fld id="{F14D243E-DB4A-407C-AFAE-0BC32BA45E9E}" type="datetime3">
               <a:rPr lang="en-US" smtClean="0"/>
-              <a:t>7 March 2022</a:t>
+              <a:t>13 March 2022</a:t>
             </a:fld>
             <a:endParaRPr lang="en-US"/>
           </a:p>
@@ -10022,7 +10045,7 @@
           <a:p>
             <a:fld id="{D1ADE0D0-F6AA-4072-9326-915F27F2EB27}" type="datetime3">
               <a:rPr lang="en-US" smtClean="0"/>
-              <a:t>7 March 2022</a:t>
+              <a:t>13 March 2022</a:t>
             </a:fld>
             <a:endParaRPr lang="en-US" dirty="0"/>
           </a:p>
@@ -10263,7 +10286,7 @@
           <a:p>
             <a:fld id="{C4DDBBDB-B7E6-470C-8F06-93D4F09ACFE1}" type="datetime3">
               <a:rPr lang="en-US" smtClean="0"/>
-              <a:t>7 March 2022</a:t>
+              <a:t>13 March 2022</a:t>
             </a:fld>
             <a:endParaRPr lang="en-US"/>
           </a:p>

</xml_diff>

<commit_message>
server plan was added
</commit_message>
<xml_diff>
--- a/plan/TaskTracingApp.pptx
+++ b/plan/TaskTracingApp.pptx
@@ -5,7 +5,7 @@
     <p:sldMasterId id="2147483648" r:id="rId1"/>
   </p:sldMasterIdLst>
   <p:notesMasterIdLst>
-    <p:notesMasterId r:id="rId8"/>
+    <p:notesMasterId r:id="rId10"/>
   </p:notesMasterIdLst>
   <p:sldIdLst>
     <p:sldId id="256" r:id="rId2"/>
@@ -14,6 +14,8 @@
     <p:sldId id="257" r:id="rId5"/>
     <p:sldId id="259" r:id="rId6"/>
     <p:sldId id="258" r:id="rId7"/>
+    <p:sldId id="262" r:id="rId8"/>
+    <p:sldId id="263" r:id="rId9"/>
   </p:sldIdLst>
   <p:sldSz cx="12192000" cy="6858000"/>
   <p:notesSz cx="6858000" cy="9144000"/>
@@ -146,6 +148,7 @@
   </mc:AlternateContent>
   <c:chart>
     <c:title>
+      <c:layout/>
       <c:overlay val="0"/>
       <c:spPr>
         <a:noFill/>
@@ -291,6 +294,7 @@
     </c:plotArea>
     <c:legend>
       <c:legendPos val="b"/>
+      <c:layout/>
       <c:overlay val="0"/>
       <c:spPr>
         <a:noFill/>
@@ -362,6 +366,7 @@
   </mc:AlternateContent>
   <c:chart>
     <c:title>
+      <c:layout/>
       <c:overlay val="0"/>
       <c:spPr>
         <a:noFill/>
@@ -656,6 +661,7 @@
     </c:plotArea>
     <c:legend>
       <c:legendPos val="b"/>
+      <c:layout/>
       <c:overlay val="0"/>
       <c:spPr>
         <a:noFill/>
@@ -727,6 +733,7 @@
   </mc:AlternateContent>
   <c:chart>
     <c:title>
+      <c:layout/>
       <c:overlay val="0"/>
       <c:spPr>
         <a:noFill/>
@@ -2755,7 +2762,7 @@
           <a:p>
             <a:fld id="{5EBE3839-043F-4D6A-BB69-1C2CEF42D310}" type="datetimeFigureOut">
               <a:rPr lang="en-US" smtClean="0"/>
-              <a:t>3/13/2022</a:t>
+              <a:t>4/11/2022</a:t>
             </a:fld>
             <a:endParaRPr lang="en-US"/>
           </a:p>
@@ -3073,13 +3080,8 @@
             </a:r>
             <a:r>
               <a:rPr lang="en-US" dirty="0" smtClean="0"/>
-              <a:t>, with </a:t>
-            </a:r>
-            <a:r>
-              <a:rPr lang="en-US" dirty="0" smtClean="0"/>
-              <a:t>service with test (done)</a:t>
-            </a:r>
-            <a:endParaRPr lang="en-US" dirty="0" smtClean="0"/>
+              <a:t>, with service with test (done)</a:t>
+            </a:r>
           </a:p>
           <a:p>
             <a:r>
@@ -3188,7 +3190,17 @@
             </a:r>
             <a:r>
               <a:rPr lang="en-US" baseline="0" dirty="0" smtClean="0"/>
-              <a:t> menu item: contains the icon and text</a:t>
+              <a:t> menu item: contains the icon and </a:t>
+            </a:r>
+            <a:r>
+              <a:rPr lang="en-US" baseline="0" dirty="0" smtClean="0"/>
+              <a:t>text</a:t>
+            </a:r>
+          </a:p>
+          <a:p>
+            <a:r>
+              <a:rPr lang="en-US" baseline="0" dirty="0" smtClean="0"/>
+              <a:t>Task service, test (done)</a:t>
             </a:r>
             <a:endParaRPr lang="en-US" dirty="0"/>
           </a:p>
@@ -3298,6 +3310,20 @@
               <a:rPr lang="en-US" baseline="0" dirty="0" smtClean="0"/>
               <a:t>)</a:t>
             </a:r>
+          </a:p>
+          <a:p>
+            <a:r>
+              <a:rPr lang="en-US" baseline="0" smtClean="0"/>
+              <a:t>Apply </a:t>
+            </a:r>
+            <a:r>
+              <a:rPr lang="en-US" baseline="0" dirty="0" smtClean="0"/>
+              <a:t>CSP rules on the app, &lt;meta</a:t>
+            </a:r>
+            <a:r>
+              <a:rPr lang="en-US" baseline="0" smtClean="0"/>
+              <a:t>&gt; tag!!!!!!!</a:t>
+            </a:r>
             <a:endParaRPr lang="en-US" dirty="0"/>
           </a:p>
         </p:txBody>
@@ -3329,6 +3355,90 @@
     <p:extLst>
       <p:ext uri="{BB962C8B-B14F-4D97-AF65-F5344CB8AC3E}">
         <p14:creationId xmlns:p14="http://schemas.microsoft.com/office/powerpoint/2010/main" val="2477214928"/>
+      </p:ext>
+    </p:extLst>
+  </p:cSld>
+  <p:clrMapOvr>
+    <a:masterClrMapping/>
+  </p:clrMapOvr>
+</p:notes>
+</file>
+
+<file path=ppt/notesSlides/notesSlide4.xml><?xml version="1.0" encoding="utf-8"?>
+<p:notes xmlns:a="http://schemas.openxmlformats.org/drawingml/2006/main" xmlns:r="http://schemas.openxmlformats.org/officeDocument/2006/relationships" xmlns:p="http://schemas.openxmlformats.org/presentationml/2006/main">
+  <p:cSld>
+    <p:spTree>
+      <p:nvGrpSpPr>
+        <p:cNvPr id="1" name=""/>
+        <p:cNvGrpSpPr/>
+        <p:nvPr/>
+      </p:nvGrpSpPr>
+      <p:grpSpPr>
+        <a:xfrm>
+          <a:off x="0" y="0"/>
+          <a:ext cx="0" cy="0"/>
+          <a:chOff x="0" y="0"/>
+          <a:chExt cx="0" cy="0"/>
+        </a:xfrm>
+      </p:grpSpPr>
+      <p:sp>
+        <p:nvSpPr>
+          <p:cNvPr id="2" name="Diakép helye 1"/>
+          <p:cNvSpPr>
+            <a:spLocks noGrp="1" noRot="1" noChangeAspect="1"/>
+          </p:cNvSpPr>
+          <p:nvPr>
+            <p:ph type="sldImg"/>
+          </p:nvPr>
+        </p:nvSpPr>
+        <p:spPr/>
+      </p:sp>
+      <p:sp>
+        <p:nvSpPr>
+          <p:cNvPr id="3" name="Jegyzetek helye 2"/>
+          <p:cNvSpPr>
+            <a:spLocks noGrp="1"/>
+          </p:cNvSpPr>
+          <p:nvPr>
+            <p:ph type="body" idx="1"/>
+          </p:nvPr>
+        </p:nvSpPr>
+        <p:spPr/>
+        <p:txBody>
+          <a:bodyPr/>
+          <a:lstStyle/>
+          <a:p>
+            <a:endParaRPr lang="en-US" dirty="0"/>
+          </a:p>
+        </p:txBody>
+      </p:sp>
+      <p:sp>
+        <p:nvSpPr>
+          <p:cNvPr id="4" name="Dia számának helye 3"/>
+          <p:cNvSpPr>
+            <a:spLocks noGrp="1"/>
+          </p:cNvSpPr>
+          <p:nvPr>
+            <p:ph type="sldNum" sz="quarter" idx="10"/>
+          </p:nvPr>
+        </p:nvSpPr>
+        <p:spPr/>
+        <p:txBody>
+          <a:bodyPr/>
+          <a:lstStyle/>
+          <a:p>
+            <a:fld id="{7E7CBEC1-F5FB-4BFE-AF15-5C1A6E9B4F82}" type="slidenum">
+              <a:rPr lang="en-US" smtClean="0"/>
+              <a:t>8</a:t>
+            </a:fld>
+            <a:endParaRPr lang="en-US"/>
+          </a:p>
+        </p:txBody>
+      </p:sp>
+    </p:spTree>
+    <p:extLst>
+      <p:ext uri="{BB962C8B-B14F-4D97-AF65-F5344CB8AC3E}">
+        <p14:creationId xmlns:p14="http://schemas.microsoft.com/office/powerpoint/2010/main" val="3392489084"/>
       </p:ext>
     </p:extLst>
   </p:cSld>
@@ -3469,7 +3579,7 @@
           <a:p>
             <a:fld id="{8E031A97-C5A4-4558-8890-FA2925244C4F}" type="datetime3">
               <a:rPr lang="en-US" smtClean="0"/>
-              <a:t>13 March 2022</a:t>
+              <a:t>11 April 2022</a:t>
             </a:fld>
             <a:endParaRPr lang="en-US"/>
           </a:p>
@@ -3643,7 +3753,7 @@
           <a:p>
             <a:fld id="{156D25A5-2131-4D11-8DF2-BFE448E0C6C4}" type="datetime3">
               <a:rPr lang="en-US" smtClean="0"/>
-              <a:t>13 March 2022</a:t>
+              <a:t>11 April 2022</a:t>
             </a:fld>
             <a:endParaRPr lang="en-US"/>
           </a:p>
@@ -3827,7 +3937,7 @@
           <a:p>
             <a:fld id="{741DCA71-90D2-471A-B4F6-D63D3144D802}" type="datetime3">
               <a:rPr lang="en-US" smtClean="0"/>
-              <a:t>13 March 2022</a:t>
+              <a:t>11 April 2022</a:t>
             </a:fld>
             <a:endParaRPr lang="en-US"/>
           </a:p>
@@ -4001,7 +4111,7 @@
           <a:p>
             <a:fld id="{859B4CCA-7A49-40BA-AA87-E36D3C1B74CD}" type="datetime3">
               <a:rPr lang="en-US" smtClean="0"/>
-              <a:t>13 March 2022</a:t>
+              <a:t>11 April 2022</a:t>
             </a:fld>
             <a:endParaRPr lang="en-US"/>
           </a:p>
@@ -4251,7 +4361,7 @@
           <a:p>
             <a:fld id="{00C05CC3-8230-4750-BEE6-66D4A1F33F0F}" type="datetime3">
               <a:rPr lang="en-US" smtClean="0"/>
-              <a:t>13 March 2022</a:t>
+              <a:t>11 April 2022</a:t>
             </a:fld>
             <a:endParaRPr lang="en-US"/>
           </a:p>
@@ -4487,7 +4597,7 @@
           <a:p>
             <a:fld id="{3DEBFD87-4EA2-4600-AB37-3AFC3D80519A}" type="datetime3">
               <a:rPr lang="en-US" smtClean="0"/>
-              <a:t>13 March 2022</a:t>
+              <a:t>11 April 2022</a:t>
             </a:fld>
             <a:endParaRPr lang="en-US"/>
           </a:p>
@@ -4858,7 +4968,7 @@
           <a:p>
             <a:fld id="{A72CEC32-E708-4316-8666-BA8BF9722CA0}" type="datetime3">
               <a:rPr lang="en-US" smtClean="0"/>
-              <a:t>13 March 2022</a:t>
+              <a:t>11 April 2022</a:t>
             </a:fld>
             <a:endParaRPr lang="en-US"/>
           </a:p>
@@ -4980,7 +5090,7 @@
           <a:p>
             <a:fld id="{7CF1C314-8D6F-4732-88D4-94FF05CBB104}" type="datetime3">
               <a:rPr lang="en-US" smtClean="0"/>
-              <a:t>13 March 2022</a:t>
+              <a:t>11 April 2022</a:t>
             </a:fld>
             <a:endParaRPr lang="en-US"/>
           </a:p>
@@ -5079,7 +5189,7 @@
           <a:p>
             <a:fld id="{47DA11E4-27AF-4B9F-BEF3-3CA15041E18E}" type="datetime3">
               <a:rPr lang="en-US" smtClean="0"/>
-              <a:t>13 March 2022</a:t>
+              <a:t>11 April 2022</a:t>
             </a:fld>
             <a:endParaRPr lang="en-US"/>
           </a:p>
@@ -5360,7 +5470,7 @@
           <a:p>
             <a:fld id="{E2C02590-7F59-421C-A745-32233A68051D}" type="datetime3">
               <a:rPr lang="en-US" smtClean="0"/>
-              <a:t>13 March 2022</a:t>
+              <a:t>11 April 2022</a:t>
             </a:fld>
             <a:endParaRPr lang="en-US"/>
           </a:p>
@@ -5617,7 +5727,7 @@
           <a:p>
             <a:fld id="{84AF07D1-C31F-46EF-9183-DC77B1A31FFA}" type="datetime3">
               <a:rPr lang="en-US" smtClean="0"/>
-              <a:t>13 March 2022</a:t>
+              <a:t>11 April 2022</a:t>
             </a:fld>
             <a:endParaRPr lang="en-US"/>
           </a:p>
@@ -5839,7 +5949,7 @@
           <a:p>
             <a:fld id="{9D694A8E-69FB-424F-BB61-8EE202972235}" type="datetime3">
               <a:rPr lang="en-US" smtClean="0"/>
-              <a:t>13 March 2022</a:t>
+              <a:t>11 April 2022</a:t>
             </a:fld>
             <a:endParaRPr lang="en-US"/>
           </a:p>
@@ -6295,7 +6405,7 @@
         </p:spPr>
         <p:txBody>
           <a:bodyPr>
-            <a:normAutofit fontScale="92500" lnSpcReduction="10000"/>
+            <a:normAutofit fontScale="92500" lnSpcReduction="20000"/>
           </a:bodyPr>
           <a:lstStyle/>
           <a:p>
@@ -6394,8 +6504,27 @@
             </a:r>
             <a:r>
               <a:rPr lang="en-US" sz="2600" dirty="0" smtClean="0"/>
-              <a:t> – state management?</a:t>
-            </a:r>
+              <a:t> – state management</a:t>
+            </a:r>
+            <a:r>
+              <a:rPr lang="en-US" sz="2600" dirty="0" smtClean="0"/>
+              <a:t>?</a:t>
+            </a:r>
+          </a:p>
+          <a:p>
+            <a:pPr marL="342900" indent="-342900" algn="l">
+              <a:buFont typeface="Arial" panose="020B0604020202020204" pitchFamily="34" charset="0"/>
+              <a:buChar char="•"/>
+            </a:pPr>
+            <a:r>
+              <a:rPr lang="en-US" sz="2600" dirty="0" err="1" smtClean="0"/>
+              <a:t>ElectornJs</a:t>
+            </a:r>
+            <a:r>
+              <a:rPr lang="en-US" sz="2600" dirty="0" smtClean="0"/>
+              <a:t>: cross-platform</a:t>
+            </a:r>
+            <a:endParaRPr lang="en-US" sz="2600" dirty="0" smtClean="0"/>
           </a:p>
           <a:p>
             <a:pPr marL="342900" indent="-342900" algn="l">
@@ -6549,7 +6678,7 @@
           <a:p>
             <a:fld id="{EE2F860A-D2E4-4785-9C60-B1A9A50464B3}" type="datetime3">
               <a:rPr lang="en-US" smtClean="0"/>
-              <a:t>13 March 2022</a:t>
+              <a:t>11 April 2022</a:t>
             </a:fld>
             <a:endParaRPr lang="en-US"/>
           </a:p>
@@ -6677,8 +6806,13 @@
             </a:r>
             <a:r>
               <a:rPr lang="en-US" dirty="0"/>
-              <a:t> to open browser app</a:t>
-            </a:r>
+              <a:t> to open browser </a:t>
+            </a:r>
+            <a:r>
+              <a:rPr lang="en-US" dirty="0" smtClean="0"/>
+              <a:t>app??</a:t>
+            </a:r>
+            <a:endParaRPr lang="en-US" dirty="0"/>
           </a:p>
           <a:p>
             <a:r>
@@ -6713,8 +6847,13 @@
             </a:r>
             <a:r>
               <a:rPr lang="en-US" dirty="0" smtClean="0"/>
-              <a:t> – cross platform?</a:t>
-            </a:r>
+              <a:t> – cross </a:t>
+            </a:r>
+            <a:r>
+              <a:rPr lang="en-US" dirty="0" smtClean="0"/>
+              <a:t>platform</a:t>
+            </a:r>
+            <a:endParaRPr lang="en-US" dirty="0" smtClean="0"/>
           </a:p>
           <a:p>
             <a:pPr lvl="1"/>
@@ -6798,7 +6937,7 @@
           <a:p>
             <a:fld id="{859B4CCA-7A49-40BA-AA87-E36D3C1B74CD}" type="datetime3">
               <a:rPr lang="en-US" smtClean="0"/>
-              <a:t>13 March 2022</a:t>
+              <a:t>11 April 2022</a:t>
             </a:fld>
             <a:endParaRPr lang="en-US"/>
           </a:p>
@@ -7157,7 +7296,7 @@
           <a:p>
             <a:fld id="{A9402B09-ED4A-4B63-89C4-3E1E373D49A6}" type="datetime3">
               <a:rPr lang="en-US" smtClean="0"/>
-              <a:t>13 March 2022</a:t>
+              <a:t>11 April 2022</a:t>
             </a:fld>
             <a:endParaRPr lang="en-US"/>
           </a:p>
@@ -7468,7 +7607,11 @@
             <a:lstStyle/>
             <a:p>
               <a:pPr algn="ctr"/>
-              <a:endParaRPr lang="en-US"/>
+              <a:r>
+                <a:rPr lang="en-US" dirty="0" err="1" smtClean="0"/>
+                <a:t>InProgress</a:t>
+              </a:r>
+              <a:endParaRPr lang="en-US" dirty="0"/>
             </a:p>
           </p:txBody>
         </p:sp>
@@ -7821,7 +7964,7 @@
           <a:p>
             <a:fld id="{F14D243E-DB4A-407C-AFAE-0BC32BA45E9E}" type="datetime3">
               <a:rPr lang="en-US" smtClean="0"/>
-              <a:t>13 March 2022</a:t>
+              <a:t>11 April 2022</a:t>
             </a:fld>
             <a:endParaRPr lang="en-US"/>
           </a:p>
@@ -10045,7 +10188,7 @@
           <a:p>
             <a:fld id="{D1ADE0D0-F6AA-4072-9326-915F27F2EB27}" type="datetime3">
               <a:rPr lang="en-US" smtClean="0"/>
-              <a:t>13 March 2022</a:t>
+              <a:t>11 April 2022</a:t>
             </a:fld>
             <a:endParaRPr lang="en-US" dirty="0"/>
           </a:p>
@@ -10286,7 +10429,7 @@
           <a:p>
             <a:fld id="{C4DDBBDB-B7E6-470C-8F06-93D4F09ACFE1}" type="datetime3">
               <a:rPr lang="en-US" smtClean="0"/>
-              <a:t>13 March 2022</a:t>
+              <a:t>11 April 2022</a:t>
             </a:fld>
             <a:endParaRPr lang="en-US"/>
           </a:p>
@@ -10820,6 +10963,470 @@
     <p:extLst>
       <p:ext uri="{BB962C8B-B14F-4D97-AF65-F5344CB8AC3E}">
         <p14:creationId xmlns:p14="http://schemas.microsoft.com/office/powerpoint/2010/main" val="1599387933"/>
+      </p:ext>
+    </p:extLst>
+  </p:cSld>
+  <p:clrMapOvr>
+    <a:masterClrMapping/>
+  </p:clrMapOvr>
+</p:sld>
+</file>
+
+<file path=ppt/slides/slide7.xml><?xml version="1.0" encoding="utf-8"?>
+<p:sld xmlns:a="http://schemas.openxmlformats.org/drawingml/2006/main" xmlns:r="http://schemas.openxmlformats.org/officeDocument/2006/relationships" xmlns:p="http://schemas.openxmlformats.org/presentationml/2006/main">
+  <p:cSld>
+    <p:spTree>
+      <p:nvGrpSpPr>
+        <p:cNvPr id="1" name=""/>
+        <p:cNvGrpSpPr/>
+        <p:nvPr/>
+      </p:nvGrpSpPr>
+      <p:grpSpPr>
+        <a:xfrm>
+          <a:off x="0" y="0"/>
+          <a:ext cx="0" cy="0"/>
+          <a:chOff x="0" y="0"/>
+          <a:chExt cx="0" cy="0"/>
+        </a:xfrm>
+      </p:grpSpPr>
+      <p:sp>
+        <p:nvSpPr>
+          <p:cNvPr id="2" name="Cím 1"/>
+          <p:cNvSpPr>
+            <a:spLocks noGrp="1"/>
+          </p:cNvSpPr>
+          <p:nvPr>
+            <p:ph type="title"/>
+          </p:nvPr>
+        </p:nvSpPr>
+        <p:spPr/>
+        <p:txBody>
+          <a:bodyPr/>
+          <a:lstStyle/>
+          <a:p>
+            <a:r>
+              <a:rPr lang="en-US" dirty="0" smtClean="0"/>
+              <a:t>Server side</a:t>
+            </a:r>
+            <a:endParaRPr lang="en-US" dirty="0"/>
+          </a:p>
+        </p:txBody>
+      </p:sp>
+      <p:sp>
+        <p:nvSpPr>
+          <p:cNvPr id="3" name="Tartalom helye 2"/>
+          <p:cNvSpPr>
+            <a:spLocks noGrp="1"/>
+          </p:cNvSpPr>
+          <p:nvPr>
+            <p:ph idx="1"/>
+          </p:nvPr>
+        </p:nvSpPr>
+        <p:spPr/>
+        <p:txBody>
+          <a:bodyPr/>
+          <a:lstStyle/>
+          <a:p>
+            <a:r>
+              <a:rPr lang="en-US" dirty="0" smtClean="0"/>
+              <a:t>Rest-</a:t>
+            </a:r>
+            <a:r>
+              <a:rPr lang="en-US" dirty="0" err="1" smtClean="0"/>
+              <a:t>api</a:t>
+            </a:r>
+            <a:r>
+              <a:rPr lang="en-US" dirty="0" smtClean="0"/>
+              <a:t>:</a:t>
+            </a:r>
+          </a:p>
+          <a:p>
+            <a:pPr lvl="1"/>
+            <a:r>
+              <a:rPr lang="en-US" dirty="0" smtClean="0"/>
+              <a:t>Task: Get, post, put, delete</a:t>
+            </a:r>
+          </a:p>
+          <a:p>
+            <a:pPr lvl="1"/>
+            <a:r>
+              <a:rPr lang="en-US" dirty="0" smtClean="0"/>
+              <a:t>Path saving(where store task file): get, post,</a:t>
+            </a:r>
+          </a:p>
+          <a:p>
+            <a:pPr lvl="1"/>
+            <a:r>
+              <a:rPr lang="en-US" dirty="0"/>
+              <a:t>Swagger for Task, </a:t>
+            </a:r>
+            <a:r>
+              <a:rPr lang="en-US" dirty="0" smtClean="0"/>
+              <a:t>path</a:t>
+            </a:r>
+          </a:p>
+          <a:p>
+            <a:r>
+              <a:rPr lang="en-US" dirty="0" smtClean="0"/>
+              <a:t>Build on:</a:t>
+            </a:r>
+          </a:p>
+          <a:p>
+            <a:pPr lvl="1"/>
+            <a:r>
+              <a:rPr lang="en-US" dirty="0" err="1" smtClean="0"/>
+              <a:t>Nodejs</a:t>
+            </a:r>
+            <a:r>
+              <a:rPr lang="en-US" dirty="0" smtClean="0"/>
+              <a:t>, express</a:t>
+            </a:r>
+          </a:p>
+          <a:p>
+            <a:pPr lvl="1"/>
+            <a:r>
+              <a:rPr lang="en-US" dirty="0" err="1" smtClean="0"/>
+              <a:t>NestJs</a:t>
+            </a:r>
+            <a:endParaRPr lang="en-US" dirty="0" smtClean="0"/>
+          </a:p>
+          <a:p>
+            <a:pPr lvl="1"/>
+            <a:r>
+              <a:rPr lang="en-US" dirty="0" smtClean="0"/>
+              <a:t>Python, rest-</a:t>
+            </a:r>
+            <a:r>
+              <a:rPr lang="en-US" dirty="0" err="1" smtClean="0"/>
+              <a:t>api</a:t>
+            </a:r>
+            <a:endParaRPr lang="en-US" dirty="0"/>
+          </a:p>
+          <a:p>
+            <a:pPr lvl="1"/>
+            <a:r>
+              <a:rPr lang="en-US" dirty="0" smtClean="0"/>
+              <a:t>Google: firebase, </a:t>
+            </a:r>
+            <a:r>
+              <a:rPr lang="en-US" dirty="0" err="1" smtClean="0"/>
+              <a:t>saas</a:t>
+            </a:r>
+            <a:endParaRPr lang="en-US" dirty="0"/>
+          </a:p>
+        </p:txBody>
+      </p:sp>
+      <p:sp>
+        <p:nvSpPr>
+          <p:cNvPr id="4" name="Dátum helye 3"/>
+          <p:cNvSpPr>
+            <a:spLocks noGrp="1"/>
+          </p:cNvSpPr>
+          <p:nvPr>
+            <p:ph type="dt" sz="half" idx="10"/>
+          </p:nvPr>
+        </p:nvSpPr>
+        <p:spPr/>
+        <p:txBody>
+          <a:bodyPr/>
+          <a:lstStyle/>
+          <a:p>
+            <a:fld id="{859B4CCA-7A49-40BA-AA87-E36D3C1B74CD}" type="datetime3">
+              <a:rPr lang="en-US" smtClean="0"/>
+              <a:t>11 April 2022</a:t>
+            </a:fld>
+            <a:endParaRPr lang="en-US"/>
+          </a:p>
+        </p:txBody>
+      </p:sp>
+      <p:sp>
+        <p:nvSpPr>
+          <p:cNvPr id="5" name="Élőláb helye 4"/>
+          <p:cNvSpPr>
+            <a:spLocks noGrp="1"/>
+          </p:cNvSpPr>
+          <p:nvPr>
+            <p:ph type="ftr" sz="quarter" idx="11"/>
+          </p:nvPr>
+        </p:nvSpPr>
+        <p:spPr/>
+        <p:txBody>
+          <a:bodyPr/>
+          <a:lstStyle/>
+          <a:p>
+            <a:r>
+              <a:rPr lang="en-US" smtClean="0"/>
+              <a:t>Owner: Sára Krisztián</a:t>
+            </a:r>
+            <a:endParaRPr lang="en-US"/>
+          </a:p>
+        </p:txBody>
+      </p:sp>
+      <p:sp>
+        <p:nvSpPr>
+          <p:cNvPr id="6" name="Dia számának helye 5"/>
+          <p:cNvSpPr>
+            <a:spLocks noGrp="1"/>
+          </p:cNvSpPr>
+          <p:nvPr>
+            <p:ph type="sldNum" sz="quarter" idx="12"/>
+          </p:nvPr>
+        </p:nvSpPr>
+        <p:spPr/>
+        <p:txBody>
+          <a:bodyPr/>
+          <a:lstStyle/>
+          <a:p>
+            <a:fld id="{AF73ACC7-EF69-4E47-9365-4FBB8E0C1B41}" type="slidenum">
+              <a:rPr lang="en-US" smtClean="0"/>
+              <a:t>7</a:t>
+            </a:fld>
+            <a:endParaRPr lang="en-US"/>
+          </a:p>
+        </p:txBody>
+      </p:sp>
+    </p:spTree>
+    <p:extLst>
+      <p:ext uri="{BB962C8B-B14F-4D97-AF65-F5344CB8AC3E}">
+        <p14:creationId xmlns:p14="http://schemas.microsoft.com/office/powerpoint/2010/main" val="2643446726"/>
+      </p:ext>
+    </p:extLst>
+  </p:cSld>
+  <p:clrMapOvr>
+    <a:masterClrMapping/>
+  </p:clrMapOvr>
+</p:sld>
+</file>
+
+<file path=ppt/slides/slide8.xml><?xml version="1.0" encoding="utf-8"?>
+<p:sld xmlns:a="http://schemas.openxmlformats.org/drawingml/2006/main" xmlns:r="http://schemas.openxmlformats.org/officeDocument/2006/relationships" xmlns:p="http://schemas.openxmlformats.org/presentationml/2006/main">
+  <p:cSld>
+    <p:spTree>
+      <p:nvGrpSpPr>
+        <p:cNvPr id="1" name=""/>
+        <p:cNvGrpSpPr/>
+        <p:nvPr/>
+      </p:nvGrpSpPr>
+      <p:grpSpPr>
+        <a:xfrm>
+          <a:off x="0" y="0"/>
+          <a:ext cx="0" cy="0"/>
+          <a:chOff x="0" y="0"/>
+          <a:chExt cx="0" cy="0"/>
+        </a:xfrm>
+      </p:grpSpPr>
+      <p:sp>
+        <p:nvSpPr>
+          <p:cNvPr id="2" name="Cím 1"/>
+          <p:cNvSpPr>
+            <a:spLocks noGrp="1"/>
+          </p:cNvSpPr>
+          <p:nvPr>
+            <p:ph type="title"/>
+          </p:nvPr>
+        </p:nvSpPr>
+        <p:spPr/>
+        <p:txBody>
+          <a:bodyPr/>
+          <a:lstStyle/>
+          <a:p>
+            <a:r>
+              <a:rPr lang="en-US" dirty="0" smtClean="0"/>
+              <a:t>Penetration test</a:t>
+            </a:r>
+            <a:endParaRPr lang="en-US" dirty="0"/>
+          </a:p>
+        </p:txBody>
+      </p:sp>
+      <p:sp>
+        <p:nvSpPr>
+          <p:cNvPr id="3" name="Tartalom helye 2"/>
+          <p:cNvSpPr>
+            <a:spLocks noGrp="1"/>
+          </p:cNvSpPr>
+          <p:nvPr>
+            <p:ph idx="1"/>
+          </p:nvPr>
+        </p:nvSpPr>
+        <p:spPr/>
+        <p:txBody>
+          <a:bodyPr/>
+          <a:lstStyle/>
+          <a:p>
+            <a:r>
+              <a:rPr lang="en-US" dirty="0" smtClean="0"/>
+              <a:t>Token authorization to get </a:t>
+            </a:r>
+            <a:r>
+              <a:rPr lang="en-US" dirty="0" err="1" smtClean="0"/>
+              <a:t>api</a:t>
+            </a:r>
+            <a:r>
+              <a:rPr lang="en-US" dirty="0" smtClean="0"/>
+              <a:t>-request</a:t>
+            </a:r>
+          </a:p>
+          <a:p>
+            <a:r>
+              <a:rPr lang="en-US" dirty="0" smtClean="0"/>
+              <a:t>CSP  - Content Security </a:t>
+            </a:r>
+            <a:r>
+              <a:rPr lang="en-US" dirty="0" err="1" smtClean="0"/>
+              <a:t>Policie</a:t>
+            </a:r>
+            <a:r>
+              <a:rPr lang="en-US" dirty="0" smtClean="0"/>
+              <a:t> (</a:t>
+            </a:r>
+            <a:r>
+              <a:rPr lang="en-US" dirty="0" err="1" smtClean="0"/>
+              <a:t>cliens</a:t>
+            </a:r>
+            <a:r>
+              <a:rPr lang="en-US" dirty="0" smtClean="0"/>
+              <a:t>, sever)</a:t>
+            </a:r>
+          </a:p>
+          <a:p>
+            <a:r>
+              <a:rPr lang="en-US" dirty="0" smtClean="0"/>
+              <a:t>Request limit</a:t>
+            </a:r>
+          </a:p>
+          <a:p>
+            <a:pPr lvl="1"/>
+            <a:r>
+              <a:rPr lang="en-US" dirty="0" smtClean="0"/>
+              <a:t>Connection 100 </a:t>
+            </a:r>
+            <a:r>
+              <a:rPr lang="en-US" dirty="0" err="1" smtClean="0"/>
+              <a:t>cliens</a:t>
+            </a:r>
+            <a:r>
+              <a:rPr lang="en-US" dirty="0" smtClean="0"/>
+              <a:t> to the server</a:t>
+            </a:r>
+          </a:p>
+          <a:p>
+            <a:pPr lvl="1"/>
+            <a:r>
+              <a:rPr lang="en-US" dirty="0" smtClean="0"/>
+              <a:t>One request (put, post, get) is recalled for 10 times at 60 sec</a:t>
+            </a:r>
+          </a:p>
+          <a:p>
+            <a:pPr lvl="2"/>
+            <a:r>
+              <a:rPr lang="en-US" dirty="0" smtClean="0"/>
+              <a:t>Request times more then 11 at 60 sec –&gt; forbid the </a:t>
+            </a:r>
+            <a:r>
+              <a:rPr lang="en-US" dirty="0" err="1" smtClean="0"/>
+              <a:t>cliens</a:t>
+            </a:r>
+            <a:r>
+              <a:rPr lang="en-US" dirty="0" smtClean="0"/>
+              <a:t> </a:t>
+            </a:r>
+          </a:p>
+          <a:p>
+            <a:r>
+              <a:rPr lang="en-US" dirty="0" smtClean="0"/>
+              <a:t>Storing data (</a:t>
+            </a:r>
+            <a:r>
+              <a:rPr lang="en-US" dirty="0" err="1" smtClean="0"/>
+              <a:t>anonymus</a:t>
+            </a:r>
+            <a:r>
+              <a:rPr lang="en-US" smtClean="0"/>
+              <a:t>) for 2 days???</a:t>
+            </a:r>
+            <a:endParaRPr lang="en-US" dirty="0" smtClean="0"/>
+          </a:p>
+          <a:p>
+            <a:endParaRPr lang="en-US" dirty="0" smtClean="0"/>
+          </a:p>
+          <a:p>
+            <a:endParaRPr lang="en-US" dirty="0" smtClean="0"/>
+          </a:p>
+        </p:txBody>
+      </p:sp>
+      <p:sp>
+        <p:nvSpPr>
+          <p:cNvPr id="4" name="Dátum helye 3"/>
+          <p:cNvSpPr>
+            <a:spLocks noGrp="1"/>
+          </p:cNvSpPr>
+          <p:nvPr>
+            <p:ph type="dt" sz="half" idx="10"/>
+          </p:nvPr>
+        </p:nvSpPr>
+        <p:spPr/>
+        <p:txBody>
+          <a:bodyPr/>
+          <a:lstStyle/>
+          <a:p>
+            <a:fld id="{859B4CCA-7A49-40BA-AA87-E36D3C1B74CD}" type="datetime3">
+              <a:rPr lang="en-US" smtClean="0"/>
+              <a:t>11 April 2022</a:t>
+            </a:fld>
+            <a:endParaRPr lang="en-US"/>
+          </a:p>
+        </p:txBody>
+      </p:sp>
+      <p:sp>
+        <p:nvSpPr>
+          <p:cNvPr id="5" name="Élőláb helye 4"/>
+          <p:cNvSpPr>
+            <a:spLocks noGrp="1"/>
+          </p:cNvSpPr>
+          <p:nvPr>
+            <p:ph type="ftr" sz="quarter" idx="11"/>
+          </p:nvPr>
+        </p:nvSpPr>
+        <p:spPr/>
+        <p:txBody>
+          <a:bodyPr/>
+          <a:lstStyle/>
+          <a:p>
+            <a:r>
+              <a:rPr lang="en-US" smtClean="0"/>
+              <a:t>Owner: Sára Krisztián</a:t>
+            </a:r>
+            <a:endParaRPr lang="en-US"/>
+          </a:p>
+        </p:txBody>
+      </p:sp>
+      <p:sp>
+        <p:nvSpPr>
+          <p:cNvPr id="6" name="Dia számának helye 5"/>
+          <p:cNvSpPr>
+            <a:spLocks noGrp="1"/>
+          </p:cNvSpPr>
+          <p:nvPr>
+            <p:ph type="sldNum" sz="quarter" idx="12"/>
+          </p:nvPr>
+        </p:nvSpPr>
+        <p:spPr/>
+        <p:txBody>
+          <a:bodyPr/>
+          <a:lstStyle/>
+          <a:p>
+            <a:fld id="{AF73ACC7-EF69-4E47-9365-4FBB8E0C1B41}" type="slidenum">
+              <a:rPr lang="en-US" smtClean="0"/>
+              <a:t>8</a:t>
+            </a:fld>
+            <a:endParaRPr lang="en-US"/>
+          </a:p>
+        </p:txBody>
+      </p:sp>
+    </p:spTree>
+    <p:extLst>
+      <p:ext uri="{BB962C8B-B14F-4D97-AF65-F5344CB8AC3E}">
+        <p14:creationId xmlns:p14="http://schemas.microsoft.com/office/powerpoint/2010/main" val="4152914986"/>
       </p:ext>
     </p:extLst>
   </p:cSld>

</xml_diff>

<commit_message>
ppt plan is saved
</commit_message>
<xml_diff>
--- a/plan/TaskTracingApp.pptx
+++ b/plan/TaskTracingApp.pptx
@@ -148,7 +148,6 @@
   </mc:AlternateContent>
   <c:chart>
     <c:title>
-      <c:layout/>
       <c:overlay val="0"/>
       <c:spPr>
         <a:noFill/>
@@ -294,7 +293,6 @@
     </c:plotArea>
     <c:legend>
       <c:legendPos val="b"/>
-      <c:layout/>
       <c:overlay val="0"/>
       <c:spPr>
         <a:noFill/>
@@ -366,7 +364,6 @@
   </mc:AlternateContent>
   <c:chart>
     <c:title>
-      <c:layout/>
       <c:overlay val="0"/>
       <c:spPr>
         <a:noFill/>
@@ -661,7 +658,6 @@
     </c:plotArea>
     <c:legend>
       <c:legendPos val="b"/>
-      <c:layout/>
       <c:overlay val="0"/>
       <c:spPr>
         <a:noFill/>
@@ -733,7 +729,6 @@
   </mc:AlternateContent>
   <c:chart>
     <c:title>
-      <c:layout/>
       <c:overlay val="0"/>
       <c:spPr>
         <a:noFill/>
@@ -2762,7 +2757,7 @@
           <a:p>
             <a:fld id="{5EBE3839-043F-4D6A-BB69-1C2CEF42D310}" type="datetimeFigureOut">
               <a:rPr lang="en-US" smtClean="0"/>
-              <a:t>4/11/2022</a:t>
+              <a:t>4/17/2022</a:t>
             </a:fld>
             <a:endParaRPr lang="en-US"/>
           </a:p>
@@ -3190,17 +3185,31 @@
             </a:r>
             <a:r>
               <a:rPr lang="en-US" baseline="0" dirty="0" smtClean="0"/>
-              <a:t> menu item: contains the icon and </a:t>
-            </a:r>
+              <a:t> menu item: contains the icon and text</a:t>
+            </a:r>
+          </a:p>
+          <a:p>
             <a:r>
               <a:rPr lang="en-US" baseline="0" dirty="0" smtClean="0"/>
-              <a:t>text</a:t>
-            </a:r>
-          </a:p>
-          <a:p>
+              <a:t>Task </a:t>
+            </a:r>
             <a:r>
               <a:rPr lang="en-US" baseline="0" dirty="0" smtClean="0"/>
-              <a:t>Task service, test (done)</a:t>
+              <a:t>service</a:t>
+            </a:r>
+            <a:r>
+              <a:rPr lang="en-US" baseline="0" dirty="0" smtClean="0"/>
+              <a:t>, test (done</a:t>
+            </a:r>
+            <a:r>
+              <a:rPr lang="en-US" baseline="0" dirty="0" smtClean="0"/>
+              <a:t>)</a:t>
+            </a:r>
+          </a:p>
+          <a:p>
+            <a:r>
+              <a:rPr lang="en-US" baseline="0" dirty="0" smtClean="0"/>
+              <a:t>Task-card selection: highlight with directive</a:t>
             </a:r>
             <a:endParaRPr lang="en-US" dirty="0"/>
           </a:p>
@@ -3579,7 +3588,7 @@
           <a:p>
             <a:fld id="{8E031A97-C5A4-4558-8890-FA2925244C4F}" type="datetime3">
               <a:rPr lang="en-US" smtClean="0"/>
-              <a:t>11 April 2022</a:t>
+              <a:t>17 April 2022</a:t>
             </a:fld>
             <a:endParaRPr lang="en-US"/>
           </a:p>
@@ -3753,7 +3762,7 @@
           <a:p>
             <a:fld id="{156D25A5-2131-4D11-8DF2-BFE448E0C6C4}" type="datetime3">
               <a:rPr lang="en-US" smtClean="0"/>
-              <a:t>11 April 2022</a:t>
+              <a:t>17 April 2022</a:t>
             </a:fld>
             <a:endParaRPr lang="en-US"/>
           </a:p>
@@ -3937,7 +3946,7 @@
           <a:p>
             <a:fld id="{741DCA71-90D2-471A-B4F6-D63D3144D802}" type="datetime3">
               <a:rPr lang="en-US" smtClean="0"/>
-              <a:t>11 April 2022</a:t>
+              <a:t>17 April 2022</a:t>
             </a:fld>
             <a:endParaRPr lang="en-US"/>
           </a:p>
@@ -4111,7 +4120,7 @@
           <a:p>
             <a:fld id="{859B4CCA-7A49-40BA-AA87-E36D3C1B74CD}" type="datetime3">
               <a:rPr lang="en-US" smtClean="0"/>
-              <a:t>11 April 2022</a:t>
+              <a:t>17 April 2022</a:t>
             </a:fld>
             <a:endParaRPr lang="en-US"/>
           </a:p>
@@ -4361,7 +4370,7 @@
           <a:p>
             <a:fld id="{00C05CC3-8230-4750-BEE6-66D4A1F33F0F}" type="datetime3">
               <a:rPr lang="en-US" smtClean="0"/>
-              <a:t>11 April 2022</a:t>
+              <a:t>17 April 2022</a:t>
             </a:fld>
             <a:endParaRPr lang="en-US"/>
           </a:p>
@@ -4597,7 +4606,7 @@
           <a:p>
             <a:fld id="{3DEBFD87-4EA2-4600-AB37-3AFC3D80519A}" type="datetime3">
               <a:rPr lang="en-US" smtClean="0"/>
-              <a:t>11 April 2022</a:t>
+              <a:t>17 April 2022</a:t>
             </a:fld>
             <a:endParaRPr lang="en-US"/>
           </a:p>
@@ -4968,7 +4977,7 @@
           <a:p>
             <a:fld id="{A72CEC32-E708-4316-8666-BA8BF9722CA0}" type="datetime3">
               <a:rPr lang="en-US" smtClean="0"/>
-              <a:t>11 April 2022</a:t>
+              <a:t>17 April 2022</a:t>
             </a:fld>
             <a:endParaRPr lang="en-US"/>
           </a:p>
@@ -5090,7 +5099,7 @@
           <a:p>
             <a:fld id="{7CF1C314-8D6F-4732-88D4-94FF05CBB104}" type="datetime3">
               <a:rPr lang="en-US" smtClean="0"/>
-              <a:t>11 April 2022</a:t>
+              <a:t>17 April 2022</a:t>
             </a:fld>
             <a:endParaRPr lang="en-US"/>
           </a:p>
@@ -5189,7 +5198,7 @@
           <a:p>
             <a:fld id="{47DA11E4-27AF-4B9F-BEF3-3CA15041E18E}" type="datetime3">
               <a:rPr lang="en-US" smtClean="0"/>
-              <a:t>11 April 2022</a:t>
+              <a:t>17 April 2022</a:t>
             </a:fld>
             <a:endParaRPr lang="en-US"/>
           </a:p>
@@ -5470,7 +5479,7 @@
           <a:p>
             <a:fld id="{E2C02590-7F59-421C-A745-32233A68051D}" type="datetime3">
               <a:rPr lang="en-US" smtClean="0"/>
-              <a:t>11 April 2022</a:t>
+              <a:t>17 April 2022</a:t>
             </a:fld>
             <a:endParaRPr lang="en-US"/>
           </a:p>
@@ -5727,7 +5736,7 @@
           <a:p>
             <a:fld id="{84AF07D1-C31F-46EF-9183-DC77B1A31FFA}" type="datetime3">
               <a:rPr lang="en-US" smtClean="0"/>
-              <a:t>11 April 2022</a:t>
+              <a:t>17 April 2022</a:t>
             </a:fld>
             <a:endParaRPr lang="en-US"/>
           </a:p>
@@ -5949,7 +5958,7 @@
           <a:p>
             <a:fld id="{9D694A8E-69FB-424F-BB61-8EE202972235}" type="datetime3">
               <a:rPr lang="en-US" smtClean="0"/>
-              <a:t>11 April 2022</a:t>
+              <a:t>17 April 2022</a:t>
             </a:fld>
             <a:endParaRPr lang="en-US"/>
           </a:p>
@@ -6504,11 +6513,7 @@
             </a:r>
             <a:r>
               <a:rPr lang="en-US" sz="2600" dirty="0" smtClean="0"/>
-              <a:t> – state management</a:t>
-            </a:r>
-            <a:r>
-              <a:rPr lang="en-US" sz="2600" dirty="0" smtClean="0"/>
-              <a:t>?</a:t>
+              <a:t> – state management?</a:t>
             </a:r>
           </a:p>
           <a:p>
@@ -6524,7 +6529,6 @@
               <a:rPr lang="en-US" sz="2600" dirty="0" smtClean="0"/>
               <a:t>: cross-platform</a:t>
             </a:r>
-            <a:endParaRPr lang="en-US" sz="2600" dirty="0" smtClean="0"/>
           </a:p>
           <a:p>
             <a:pPr marL="342900" indent="-342900" algn="l">
@@ -6678,7 +6682,7 @@
           <a:p>
             <a:fld id="{EE2F860A-D2E4-4785-9C60-B1A9A50464B3}" type="datetime3">
               <a:rPr lang="en-US" smtClean="0"/>
-              <a:t>11 April 2022</a:t>
+              <a:t>17 April 2022</a:t>
             </a:fld>
             <a:endParaRPr lang="en-US"/>
           </a:p>
@@ -6847,13 +6851,8 @@
             </a:r>
             <a:r>
               <a:rPr lang="en-US" dirty="0" smtClean="0"/>
-              <a:t> – cross </a:t>
-            </a:r>
-            <a:r>
-              <a:rPr lang="en-US" dirty="0" smtClean="0"/>
-              <a:t>platform</a:t>
-            </a:r>
-            <a:endParaRPr lang="en-US" dirty="0" smtClean="0"/>
+              <a:t> – cross platform</a:t>
+            </a:r>
           </a:p>
           <a:p>
             <a:pPr lvl="1"/>
@@ -6937,7 +6936,7 @@
           <a:p>
             <a:fld id="{859B4CCA-7A49-40BA-AA87-E36D3C1B74CD}" type="datetime3">
               <a:rPr lang="en-US" smtClean="0"/>
-              <a:t>11 April 2022</a:t>
+              <a:t>17 April 2022</a:t>
             </a:fld>
             <a:endParaRPr lang="en-US"/>
           </a:p>
@@ -7296,7 +7295,7 @@
           <a:p>
             <a:fld id="{A9402B09-ED4A-4B63-89C4-3E1E373D49A6}" type="datetime3">
               <a:rPr lang="en-US" smtClean="0"/>
-              <a:t>11 April 2022</a:t>
+              <a:t>17 April 2022</a:t>
             </a:fld>
             <a:endParaRPr lang="en-US"/>
           </a:p>
@@ -7964,7 +7963,7 @@
           <a:p>
             <a:fld id="{F14D243E-DB4A-407C-AFAE-0BC32BA45E9E}" type="datetime3">
               <a:rPr lang="en-US" smtClean="0"/>
-              <a:t>11 April 2022</a:t>
+              <a:t>17 April 2022</a:t>
             </a:fld>
             <a:endParaRPr lang="en-US"/>
           </a:p>
@@ -10188,7 +10187,7 @@
           <a:p>
             <a:fld id="{D1ADE0D0-F6AA-4072-9326-915F27F2EB27}" type="datetime3">
               <a:rPr lang="en-US" smtClean="0"/>
-              <a:t>11 April 2022</a:t>
+              <a:t>17 April 2022</a:t>
             </a:fld>
             <a:endParaRPr lang="en-US" dirty="0"/>
           </a:p>
@@ -10429,7 +10428,7 @@
           <a:p>
             <a:fld id="{C4DDBBDB-B7E6-470C-8F06-93D4F09ACFE1}" type="datetime3">
               <a:rPr lang="en-US" smtClean="0"/>
-              <a:t>11 April 2022</a:t>
+              <a:t>17 April 2022</a:t>
             </a:fld>
             <a:endParaRPr lang="en-US"/>
           </a:p>
@@ -11133,7 +11132,7 @@
           <a:p>
             <a:fld id="{859B4CCA-7A49-40BA-AA87-E36D3C1B74CD}" type="datetime3">
               <a:rPr lang="en-US" smtClean="0"/>
-              <a:t>11 April 2022</a:t>
+              <a:t>17 April 2022</a:t>
             </a:fld>
             <a:endParaRPr lang="en-US"/>
           </a:p>
@@ -11371,7 +11370,7 @@
           <a:p>
             <a:fld id="{859B4CCA-7A49-40BA-AA87-E36D3C1B74CD}" type="datetime3">
               <a:rPr lang="en-US" smtClean="0"/>
-              <a:t>11 April 2022</a:t>
+              <a:t>17 April 2022</a:t>
             </a:fld>
             <a:endParaRPr lang="en-US"/>
           </a:p>

</xml_diff>

<commit_message>
ptt is refresh which task need to be done
</commit_message>
<xml_diff>
--- a/plan/TaskTracingApp.pptx
+++ b/plan/TaskTracingApp.pptx
@@ -2757,7 +2757,7 @@
           <a:p>
             <a:fld id="{5EBE3839-043F-4D6A-BB69-1C2CEF42D310}" type="datetimeFigureOut">
               <a:rPr lang="en-US" smtClean="0"/>
-              <a:t>4/23/2022</a:t>
+              <a:t>4/27/2022</a:t>
             </a:fld>
             <a:endParaRPr lang="en-US"/>
           </a:p>
@@ -3227,28 +3227,13 @@
           <a:p>
             <a:r>
               <a:rPr lang="en-US" baseline="0" dirty="0" smtClean="0"/>
-              <a:t>Saving bug fixed (done</a:t>
-            </a:r>
+              <a:t>Saving bug fixed (done)</a:t>
+            </a:r>
+          </a:p>
+          <a:p>
             <a:r>
               <a:rPr lang="en-US" baseline="0" dirty="0" smtClean="0"/>
-              <a:t>)</a:t>
-            </a:r>
-          </a:p>
-          <a:p>
-            <a:r>
-              <a:rPr lang="en-US" baseline="0" dirty="0" smtClean="0"/>
-              <a:t>Date, </a:t>
-            </a:r>
-            <a:r>
-              <a:rPr lang="en-US" baseline="0" smtClean="0"/>
-              <a:t>status filtering (done)</a:t>
-            </a:r>
-            <a:endParaRPr lang="en-US" baseline="0" dirty="0" smtClean="0"/>
-          </a:p>
-          <a:p>
-            <a:r>
-              <a:rPr lang="en-US" baseline="0" dirty="0" smtClean="0"/>
-              <a:t>Directives test cases</a:t>
+              <a:t>Date, status filtering (done)</a:t>
             </a:r>
           </a:p>
           <a:p>
@@ -3258,6 +3243,136 @@
             </a:r>
           </a:p>
           <a:p>
+            <a:pPr marL="0" marR="0" indent="0" algn="l" defTabSz="914400" rtl="0" eaLnBrk="1" fontAlgn="auto" latinLnBrk="0" hangingPunct="1">
+              <a:lnSpc>
+                <a:spcPct val="100000"/>
+              </a:lnSpc>
+              <a:spcBef>
+                <a:spcPts val="0"/>
+              </a:spcBef>
+              <a:spcAft>
+                <a:spcPts val="0"/>
+              </a:spcAft>
+              <a:buClrTx/>
+              <a:buSzTx/>
+              <a:buFontTx/>
+              <a:buNone/>
+              <a:tabLst/>
+              <a:defRPr/>
+            </a:pPr>
+            <a:r>
+              <a:rPr lang="en-US" baseline="0" dirty="0" smtClean="0"/>
+              <a:t>Highlight directive test</a:t>
+            </a:r>
+          </a:p>
+          <a:p>
+            <a:pPr marL="0" marR="0" indent="0" algn="l" defTabSz="914400" rtl="0" eaLnBrk="1" fontAlgn="auto" latinLnBrk="0" hangingPunct="1">
+              <a:lnSpc>
+                <a:spcPct val="100000"/>
+              </a:lnSpc>
+              <a:spcBef>
+                <a:spcPts val="0"/>
+              </a:spcBef>
+              <a:spcAft>
+                <a:spcPts val="0"/>
+              </a:spcAft>
+              <a:buClrTx/>
+              <a:buSzTx/>
+              <a:buFontTx/>
+              <a:buNone/>
+              <a:tabLst/>
+              <a:defRPr/>
+            </a:pPr>
+            <a:r>
+              <a:rPr lang="en-US" baseline="0" dirty="0" err="1" smtClean="0"/>
+              <a:t>typeExtension</a:t>
+            </a:r>
+            <a:r>
+              <a:rPr lang="en-US" baseline="0" dirty="0" smtClean="0"/>
+              <a:t> test</a:t>
+            </a:r>
+          </a:p>
+          <a:p>
+            <a:pPr marL="0" marR="0" indent="0" algn="l" defTabSz="914400" rtl="0" eaLnBrk="1" fontAlgn="auto" latinLnBrk="0" hangingPunct="1">
+              <a:lnSpc>
+                <a:spcPct val="100000"/>
+              </a:lnSpc>
+              <a:spcBef>
+                <a:spcPts val="0"/>
+              </a:spcBef>
+              <a:spcAft>
+                <a:spcPts val="0"/>
+              </a:spcAft>
+              <a:buClrTx/>
+              <a:buSzTx/>
+              <a:buFontTx/>
+              <a:buNone/>
+              <a:tabLst/>
+              <a:defRPr/>
+            </a:pPr>
+            <a:r>
+              <a:rPr lang="en-US" baseline="0" dirty="0" err="1" smtClean="0"/>
+              <a:t>AlertWindwon</a:t>
+            </a:r>
+            <a:r>
+              <a:rPr lang="en-US" baseline="0" dirty="0" smtClean="0"/>
+              <a:t> comp test</a:t>
+            </a:r>
+          </a:p>
+          <a:p>
+            <a:pPr marL="0" marR="0" indent="0" algn="l" defTabSz="914400" rtl="0" eaLnBrk="1" fontAlgn="auto" latinLnBrk="0" hangingPunct="1">
+              <a:lnSpc>
+                <a:spcPct val="100000"/>
+              </a:lnSpc>
+              <a:spcBef>
+                <a:spcPts val="0"/>
+              </a:spcBef>
+              <a:spcAft>
+                <a:spcPts val="0"/>
+              </a:spcAft>
+              <a:buClrTx/>
+              <a:buSzTx/>
+              <a:buFontTx/>
+              <a:buNone/>
+              <a:tabLst/>
+              <a:defRPr/>
+            </a:pPr>
+            <a:r>
+              <a:rPr lang="en-US" baseline="0" dirty="0" smtClean="0"/>
+              <a:t>Header component test</a:t>
+            </a:r>
+          </a:p>
+          <a:p>
+            <a:pPr marL="0" marR="0" indent="0" algn="l" defTabSz="914400" rtl="0" eaLnBrk="1" fontAlgn="auto" latinLnBrk="0" hangingPunct="1">
+              <a:lnSpc>
+                <a:spcPct val="100000"/>
+              </a:lnSpc>
+              <a:spcBef>
+                <a:spcPts val="0"/>
+              </a:spcBef>
+              <a:spcAft>
+                <a:spcPts val="0"/>
+              </a:spcAft>
+              <a:buClrTx/>
+              <a:buSzTx/>
+              <a:buFontTx/>
+              <a:buNone/>
+              <a:tabLst/>
+              <a:defRPr/>
+            </a:pPr>
+            <a:r>
+              <a:rPr lang="en-US" baseline="0" dirty="0" smtClean="0"/>
+              <a:t>Menu-item comp test</a:t>
+            </a:r>
+          </a:p>
+          <a:p>
+            <a:r>
+              <a:rPr lang="en-US" baseline="0" dirty="0" smtClean="0"/>
+              <a:t>-------------------------------</a:t>
+            </a:r>
+            <a:endParaRPr lang="en-US" baseline="0" dirty="0" smtClean="0"/>
+          </a:p>
+          <a:p>
             <a:r>
               <a:rPr lang="en-US" baseline="0" dirty="0" smtClean="0"/>
               <a:t>Measuring time,</a:t>
@@ -3266,7 +3381,39 @@
           <a:p>
             <a:r>
               <a:rPr lang="en-US" baseline="0" dirty="0" smtClean="0"/>
-              <a:t>Threading – calculate time</a:t>
+              <a:t>Threading – calculate </a:t>
+            </a:r>
+            <a:r>
+              <a:rPr lang="en-US" baseline="0" dirty="0" smtClean="0"/>
+              <a:t>time</a:t>
+            </a:r>
+          </a:p>
+          <a:p>
+            <a:r>
+              <a:rPr lang="en-US" baseline="0" dirty="0" smtClean="0"/>
+              <a:t>Timer test</a:t>
+            </a:r>
+          </a:p>
+          <a:p>
+            <a:r>
+              <a:rPr lang="en-US" baseline="0" dirty="0" smtClean="0"/>
+              <a:t>------------------------------</a:t>
+            </a:r>
+          </a:p>
+          <a:p>
+            <a:r>
+              <a:rPr lang="en-US" dirty="0" smtClean="0"/>
+              <a:t>Task-container test</a:t>
+            </a:r>
+          </a:p>
+          <a:p>
+            <a:r>
+              <a:rPr lang="en-US" dirty="0" smtClean="0"/>
+              <a:t>Task-card</a:t>
+            </a:r>
+            <a:r>
+              <a:rPr lang="en-US" baseline="0" dirty="0" smtClean="0"/>
+              <a:t> test</a:t>
             </a:r>
             <a:endParaRPr lang="en-US" dirty="0"/>
           </a:p>
@@ -3645,7 +3792,7 @@
           <a:p>
             <a:fld id="{8E031A97-C5A4-4558-8890-FA2925244C4F}" type="datetime3">
               <a:rPr lang="en-US" smtClean="0"/>
-              <a:t>23 April 2022</a:t>
+              <a:t>27 April 2022</a:t>
             </a:fld>
             <a:endParaRPr lang="en-US"/>
           </a:p>
@@ -3819,7 +3966,7 @@
           <a:p>
             <a:fld id="{156D25A5-2131-4D11-8DF2-BFE448E0C6C4}" type="datetime3">
               <a:rPr lang="en-US" smtClean="0"/>
-              <a:t>23 April 2022</a:t>
+              <a:t>27 April 2022</a:t>
             </a:fld>
             <a:endParaRPr lang="en-US"/>
           </a:p>
@@ -4003,7 +4150,7 @@
           <a:p>
             <a:fld id="{741DCA71-90D2-471A-B4F6-D63D3144D802}" type="datetime3">
               <a:rPr lang="en-US" smtClean="0"/>
-              <a:t>23 April 2022</a:t>
+              <a:t>27 April 2022</a:t>
             </a:fld>
             <a:endParaRPr lang="en-US"/>
           </a:p>
@@ -4177,7 +4324,7 @@
           <a:p>
             <a:fld id="{859B4CCA-7A49-40BA-AA87-E36D3C1B74CD}" type="datetime3">
               <a:rPr lang="en-US" smtClean="0"/>
-              <a:t>23 April 2022</a:t>
+              <a:t>27 April 2022</a:t>
             </a:fld>
             <a:endParaRPr lang="en-US"/>
           </a:p>
@@ -4427,7 +4574,7 @@
           <a:p>
             <a:fld id="{00C05CC3-8230-4750-BEE6-66D4A1F33F0F}" type="datetime3">
               <a:rPr lang="en-US" smtClean="0"/>
-              <a:t>23 April 2022</a:t>
+              <a:t>27 April 2022</a:t>
             </a:fld>
             <a:endParaRPr lang="en-US"/>
           </a:p>
@@ -4663,7 +4810,7 @@
           <a:p>
             <a:fld id="{3DEBFD87-4EA2-4600-AB37-3AFC3D80519A}" type="datetime3">
               <a:rPr lang="en-US" smtClean="0"/>
-              <a:t>23 April 2022</a:t>
+              <a:t>27 April 2022</a:t>
             </a:fld>
             <a:endParaRPr lang="en-US"/>
           </a:p>
@@ -5034,7 +5181,7 @@
           <a:p>
             <a:fld id="{A72CEC32-E708-4316-8666-BA8BF9722CA0}" type="datetime3">
               <a:rPr lang="en-US" smtClean="0"/>
-              <a:t>23 April 2022</a:t>
+              <a:t>27 April 2022</a:t>
             </a:fld>
             <a:endParaRPr lang="en-US"/>
           </a:p>
@@ -5156,7 +5303,7 @@
           <a:p>
             <a:fld id="{7CF1C314-8D6F-4732-88D4-94FF05CBB104}" type="datetime3">
               <a:rPr lang="en-US" smtClean="0"/>
-              <a:t>23 April 2022</a:t>
+              <a:t>27 April 2022</a:t>
             </a:fld>
             <a:endParaRPr lang="en-US"/>
           </a:p>
@@ -5255,7 +5402,7 @@
           <a:p>
             <a:fld id="{47DA11E4-27AF-4B9F-BEF3-3CA15041E18E}" type="datetime3">
               <a:rPr lang="en-US" smtClean="0"/>
-              <a:t>23 April 2022</a:t>
+              <a:t>27 April 2022</a:t>
             </a:fld>
             <a:endParaRPr lang="en-US"/>
           </a:p>
@@ -5536,7 +5683,7 @@
           <a:p>
             <a:fld id="{E2C02590-7F59-421C-A745-32233A68051D}" type="datetime3">
               <a:rPr lang="en-US" smtClean="0"/>
-              <a:t>23 April 2022</a:t>
+              <a:t>27 April 2022</a:t>
             </a:fld>
             <a:endParaRPr lang="en-US"/>
           </a:p>
@@ -5793,7 +5940,7 @@
           <a:p>
             <a:fld id="{84AF07D1-C31F-46EF-9183-DC77B1A31FFA}" type="datetime3">
               <a:rPr lang="en-US" smtClean="0"/>
-              <a:t>23 April 2022</a:t>
+              <a:t>27 April 2022</a:t>
             </a:fld>
             <a:endParaRPr lang="en-US"/>
           </a:p>
@@ -6015,7 +6162,7 @@
           <a:p>
             <a:fld id="{9D694A8E-69FB-424F-BB61-8EE202972235}" type="datetime3">
               <a:rPr lang="en-US" smtClean="0"/>
-              <a:t>23 April 2022</a:t>
+              <a:t>27 April 2022</a:t>
             </a:fld>
             <a:endParaRPr lang="en-US"/>
           </a:p>
@@ -6739,7 +6886,7 @@
           <a:p>
             <a:fld id="{EE2F860A-D2E4-4785-9C60-B1A9A50464B3}" type="datetime3">
               <a:rPr lang="en-US" smtClean="0"/>
-              <a:t>23 April 2022</a:t>
+              <a:t>27 April 2022</a:t>
             </a:fld>
             <a:endParaRPr lang="en-US"/>
           </a:p>
@@ -6993,7 +7140,7 @@
           <a:p>
             <a:fld id="{859B4CCA-7A49-40BA-AA87-E36D3C1B74CD}" type="datetime3">
               <a:rPr lang="en-US" smtClean="0"/>
-              <a:t>23 April 2022</a:t>
+              <a:t>27 April 2022</a:t>
             </a:fld>
             <a:endParaRPr lang="en-US"/>
           </a:p>
@@ -7352,7 +7499,7 @@
           <a:p>
             <a:fld id="{A9402B09-ED4A-4B63-89C4-3E1E373D49A6}" type="datetime3">
               <a:rPr lang="en-US" smtClean="0"/>
-              <a:t>23 April 2022</a:t>
+              <a:t>27 April 2022</a:t>
             </a:fld>
             <a:endParaRPr lang="en-US"/>
           </a:p>
@@ -8020,7 +8167,7 @@
           <a:p>
             <a:fld id="{F14D243E-DB4A-407C-AFAE-0BC32BA45E9E}" type="datetime3">
               <a:rPr lang="en-US" smtClean="0"/>
-              <a:t>23 April 2022</a:t>
+              <a:t>27 April 2022</a:t>
             </a:fld>
             <a:endParaRPr lang="en-US"/>
           </a:p>
@@ -10274,7 +10421,7 @@
           <a:p>
             <a:fld id="{D1ADE0D0-F6AA-4072-9326-915F27F2EB27}" type="datetime3">
               <a:rPr lang="en-US" smtClean="0"/>
-              <a:t>23 April 2022</a:t>
+              <a:t>27 April 2022</a:t>
             </a:fld>
             <a:endParaRPr lang="en-US" dirty="0"/>
           </a:p>
@@ -10515,7 +10662,7 @@
           <a:p>
             <a:fld id="{C4DDBBDB-B7E6-470C-8F06-93D4F09ACFE1}" type="datetime3">
               <a:rPr lang="en-US" smtClean="0"/>
-              <a:t>23 April 2022</a:t>
+              <a:t>27 April 2022</a:t>
             </a:fld>
             <a:endParaRPr lang="en-US"/>
           </a:p>
@@ -11219,7 +11366,7 @@
           <a:p>
             <a:fld id="{859B4CCA-7A49-40BA-AA87-E36D3C1B74CD}" type="datetime3">
               <a:rPr lang="en-US" smtClean="0"/>
-              <a:t>23 April 2022</a:t>
+              <a:t>27 April 2022</a:t>
             </a:fld>
             <a:endParaRPr lang="en-US"/>
           </a:p>
@@ -11457,7 +11604,7 @@
           <a:p>
             <a:fld id="{859B4CCA-7A49-40BA-AA87-E36D3C1B74CD}" type="datetime3">
               <a:rPr lang="en-US" smtClean="0"/>
-              <a:t>23 April 2022</a:t>
+              <a:t>27 April 2022</a:t>
             </a:fld>
             <a:endParaRPr lang="en-US"/>
           </a:p>

</xml_diff>

<commit_message>
pptx chart plans, todo list saved
</commit_message>
<xml_diff>
--- a/plan/TaskTracingApp.pptx
+++ b/plan/TaskTracingApp.pptx
@@ -2763,7 +2763,7 @@
           <a:p>
             <a:fld id="{5EBE3839-043F-4D6A-BB69-1C2CEF42D310}" type="datetimeFigureOut">
               <a:rPr lang="en-US" smtClean="0"/>
-              <a:t>6/19/2022</a:t>
+              <a:t>6/30/2022</a:t>
             </a:fld>
             <a:endParaRPr lang="en-US"/>
           </a:p>
@@ -3488,11 +3488,7 @@
             </a:r>
             <a:r>
               <a:rPr lang="en-US" baseline="0" dirty="0" smtClean="0"/>
-              <a:t>(Basic</a:t>
-            </a:r>
-            <a:r>
-              <a:rPr lang="en-US" baseline="0" dirty="0" smtClean="0"/>
-              <a:t>, dark </a:t>
+              <a:t>(Basic, dark </a:t>
             </a:r>
             <a:r>
               <a:rPr lang="en-US" baseline="0" dirty="0" err="1" smtClean="0"/>
@@ -3607,9 +3603,210 @@
             </a:r>
             <a:r>
               <a:rPr lang="en-US" baseline="0" dirty="0" smtClean="0"/>
-              <a:t> time measuring =&gt; not ready yet</a:t>
-            </a:r>
-            <a:endParaRPr lang="en-US" dirty="0"/>
+              <a:t> time measuring =&gt; not ready </a:t>
+            </a:r>
+            <a:r>
+              <a:rPr lang="en-US" baseline="0" dirty="0" smtClean="0"/>
+              <a:t>yet</a:t>
+            </a:r>
+          </a:p>
+          <a:p>
+            <a:pPr marL="0" marR="0" indent="0" algn="l" defTabSz="914400" rtl="0" eaLnBrk="1" fontAlgn="auto" latinLnBrk="0" hangingPunct="1">
+              <a:lnSpc>
+                <a:spcPct val="100000"/>
+              </a:lnSpc>
+              <a:spcBef>
+                <a:spcPts val="0"/>
+              </a:spcBef>
+              <a:spcAft>
+                <a:spcPts val="0"/>
+              </a:spcAft>
+              <a:buClrTx/>
+              <a:buSzTx/>
+              <a:buFontTx/>
+              <a:buNone/>
+              <a:tabLst/>
+              <a:defRPr/>
+            </a:pPr>
+            <a:r>
+              <a:rPr lang="en-US" baseline="0" dirty="0" smtClean="0"/>
+              <a:t>New method </a:t>
+            </a:r>
+            <a:r>
+              <a:rPr lang="en-US" baseline="0" dirty="0" err="1" smtClean="0"/>
+              <a:t>initialTime</a:t>
+            </a:r>
+            <a:r>
+              <a:rPr lang="en-US" baseline="0" dirty="0" smtClean="0"/>
+              <a:t> =&gt; base on </a:t>
+            </a:r>
+            <a:r>
+              <a:rPr lang="en-US" baseline="0" dirty="0" err="1" smtClean="0"/>
+              <a:t>taskInMinutes</a:t>
+            </a:r>
+            <a:r>
+              <a:rPr lang="en-US" baseline="0" dirty="0" smtClean="0"/>
+              <a:t>, not modifying </a:t>
+            </a:r>
+            <a:r>
+              <a:rPr lang="en-US" baseline="0" dirty="0" err="1" smtClean="0"/>
+              <a:t>initialTime</a:t>
+            </a:r>
+            <a:r>
+              <a:rPr lang="en-US" baseline="0" dirty="0" smtClean="0"/>
+              <a:t>.</a:t>
+            </a:r>
+          </a:p>
+          <a:p>
+            <a:endParaRPr lang="en-US" baseline="0" dirty="0" smtClean="0"/>
+          </a:p>
+          <a:p>
+            <a:r>
+              <a:rPr lang="en-US" baseline="0" dirty="0" smtClean="0"/>
+              <a:t>Numbers of task status (done)</a:t>
+            </a:r>
+          </a:p>
+          <a:p>
+            <a:r>
+              <a:rPr lang="en-US" baseline="0" dirty="0" smtClean="0"/>
+              <a:t>Chart will be responsive: window resize (done)</a:t>
+            </a:r>
+          </a:p>
+          <a:p>
+            <a:endParaRPr lang="en-US" baseline="0" dirty="0" smtClean="0"/>
+          </a:p>
+          <a:p>
+            <a:r>
+              <a:rPr lang="en-US" baseline="0" dirty="0" smtClean="0"/>
+              <a:t>Daily</a:t>
+            </a:r>
+          </a:p>
+          <a:p>
+            <a:r>
+              <a:rPr lang="en-US" baseline="0" dirty="0" smtClean="0"/>
+              <a:t>Task count number – pie chart (done)</a:t>
+            </a:r>
+          </a:p>
+          <a:p>
+            <a:endParaRPr lang="en-US" baseline="0" dirty="0" smtClean="0"/>
+          </a:p>
+          <a:p>
+            <a:r>
+              <a:rPr lang="en-US" baseline="0" dirty="0" smtClean="0"/>
+              <a:t>Weekly</a:t>
+            </a:r>
+          </a:p>
+          <a:p>
+            <a:r>
+              <a:rPr lang="en-US" baseline="0" dirty="0" smtClean="0"/>
+              <a:t>Task count numbers – pie chart (done)</a:t>
+            </a:r>
+          </a:p>
+          <a:p>
+            <a:r>
+              <a:rPr lang="en-US" baseline="0" dirty="0" smtClean="0"/>
+              <a:t>Task spent Timer average(</a:t>
+            </a:r>
+            <a:r>
+              <a:rPr lang="en-US" baseline="0" dirty="0" err="1" smtClean="0"/>
+              <a:t>inProgress</a:t>
+            </a:r>
+            <a:r>
+              <a:rPr lang="en-US" baseline="0" dirty="0" smtClean="0"/>
+              <a:t>, completed) -&gt; line chart (done)</a:t>
+            </a:r>
+          </a:p>
+          <a:p>
+            <a:r>
+              <a:rPr lang="en-US" baseline="0" dirty="0" smtClean="0"/>
+              <a:t>How many task done -&gt; line chart (done)</a:t>
+            </a:r>
+          </a:p>
+          <a:p>
+            <a:r>
+              <a:rPr lang="en-US" baseline="0" dirty="0" smtClean="0"/>
+              <a:t>Unit tests (done)</a:t>
+            </a:r>
+          </a:p>
+          <a:p>
+            <a:endParaRPr lang="en-US" baseline="0" dirty="0" smtClean="0"/>
+          </a:p>
+          <a:p>
+            <a:r>
+              <a:rPr lang="en-US" baseline="0" dirty="0" smtClean="0"/>
+              <a:t>Bug fix </a:t>
+            </a:r>
+            <a:r>
+              <a:rPr lang="en-US" baseline="0" dirty="0" smtClean="0"/>
+              <a:t>Task </a:t>
+            </a:r>
+            <a:r>
+              <a:rPr lang="en-US" baseline="0" dirty="0" smtClean="0"/>
+              <a:t>side</a:t>
+            </a:r>
+          </a:p>
+          <a:p>
+            <a:pPr marL="171450" indent="-171450">
+              <a:buFontTx/>
+              <a:buChar char="-"/>
+            </a:pPr>
+            <a:r>
+              <a:rPr lang="en-US" baseline="0" dirty="0" smtClean="0"/>
+              <a:t>Yesterday task not be editable</a:t>
+            </a:r>
+          </a:p>
+          <a:p>
+            <a:pPr marL="171450" indent="-171450">
+              <a:buFontTx/>
+              <a:buChar char="-"/>
+            </a:pPr>
+            <a:r>
+              <a:rPr lang="en-US" baseline="0" dirty="0" smtClean="0"/>
+              <a:t>When task in progress not be editable</a:t>
+            </a:r>
+          </a:p>
+          <a:p>
+            <a:pPr marL="171450" indent="-171450">
+              <a:buFontTx/>
+              <a:buChar char="-"/>
+            </a:pPr>
+            <a:r>
+              <a:rPr lang="en-US" baseline="0" dirty="0" smtClean="0"/>
+              <a:t>Time filtering: only show yesterday task</a:t>
+            </a:r>
+          </a:p>
+          <a:p>
+            <a:pPr marL="171450" indent="-171450">
+              <a:buFontTx/>
+              <a:buChar char="-"/>
+            </a:pPr>
+            <a:r>
+              <a:rPr lang="en-US" baseline="0" dirty="0" smtClean="0"/>
+              <a:t>New filtering: this week, showing task without </a:t>
+            </a:r>
+            <a:r>
+              <a:rPr lang="en-US" baseline="0" dirty="0" err="1" smtClean="0"/>
+              <a:t>limitataion</a:t>
+            </a:r>
+            <a:r>
+              <a:rPr lang="en-US" baseline="0" dirty="0" smtClean="0"/>
+              <a:t>, not be </a:t>
+            </a:r>
+            <a:r>
+              <a:rPr lang="en-US" baseline="0" dirty="0" smtClean="0"/>
+              <a:t>changeable</a:t>
+            </a:r>
+          </a:p>
+          <a:p>
+            <a:pPr marL="171450" indent="-171450">
+              <a:buFontTx/>
+              <a:buChar char="-"/>
+            </a:pPr>
+            <a:r>
+              <a:rPr lang="en-US" baseline="0" dirty="0" smtClean="0"/>
+              <a:t>Timer: showing progress bar</a:t>
+            </a:r>
+            <a:endParaRPr lang="en-US" baseline="0" dirty="0" smtClean="0"/>
           </a:p>
         </p:txBody>
       </p:sp>
@@ -3864,7 +4061,7 @@
           <a:p>
             <a:fld id="{8E031A97-C5A4-4558-8890-FA2925244C4F}" type="datetime3">
               <a:rPr lang="en-US" smtClean="0"/>
-              <a:t>19 June 2022</a:t>
+              <a:t>30 June 2022</a:t>
             </a:fld>
             <a:endParaRPr lang="en-US"/>
           </a:p>
@@ -4038,7 +4235,7 @@
           <a:p>
             <a:fld id="{156D25A5-2131-4D11-8DF2-BFE448E0C6C4}" type="datetime3">
               <a:rPr lang="en-US" smtClean="0"/>
-              <a:t>19 June 2022</a:t>
+              <a:t>30 June 2022</a:t>
             </a:fld>
             <a:endParaRPr lang="en-US"/>
           </a:p>
@@ -4222,7 +4419,7 @@
           <a:p>
             <a:fld id="{741DCA71-90D2-471A-B4F6-D63D3144D802}" type="datetime3">
               <a:rPr lang="en-US" smtClean="0"/>
-              <a:t>19 June 2022</a:t>
+              <a:t>30 June 2022</a:t>
             </a:fld>
             <a:endParaRPr lang="en-US"/>
           </a:p>
@@ -4396,7 +4593,7 @@
           <a:p>
             <a:fld id="{859B4CCA-7A49-40BA-AA87-E36D3C1B74CD}" type="datetime3">
               <a:rPr lang="en-US" smtClean="0"/>
-              <a:t>19 June 2022</a:t>
+              <a:t>30 June 2022</a:t>
             </a:fld>
             <a:endParaRPr lang="en-US"/>
           </a:p>
@@ -4646,7 +4843,7 @@
           <a:p>
             <a:fld id="{00C05CC3-8230-4750-BEE6-66D4A1F33F0F}" type="datetime3">
               <a:rPr lang="en-US" smtClean="0"/>
-              <a:t>19 June 2022</a:t>
+              <a:t>30 June 2022</a:t>
             </a:fld>
             <a:endParaRPr lang="en-US"/>
           </a:p>
@@ -4882,7 +5079,7 @@
           <a:p>
             <a:fld id="{3DEBFD87-4EA2-4600-AB37-3AFC3D80519A}" type="datetime3">
               <a:rPr lang="en-US" smtClean="0"/>
-              <a:t>19 June 2022</a:t>
+              <a:t>30 June 2022</a:t>
             </a:fld>
             <a:endParaRPr lang="en-US"/>
           </a:p>
@@ -5253,7 +5450,7 @@
           <a:p>
             <a:fld id="{A72CEC32-E708-4316-8666-BA8BF9722CA0}" type="datetime3">
               <a:rPr lang="en-US" smtClean="0"/>
-              <a:t>19 June 2022</a:t>
+              <a:t>30 June 2022</a:t>
             </a:fld>
             <a:endParaRPr lang="en-US"/>
           </a:p>
@@ -5375,7 +5572,7 @@
           <a:p>
             <a:fld id="{7CF1C314-8D6F-4732-88D4-94FF05CBB104}" type="datetime3">
               <a:rPr lang="en-US" smtClean="0"/>
-              <a:t>19 June 2022</a:t>
+              <a:t>30 June 2022</a:t>
             </a:fld>
             <a:endParaRPr lang="en-US"/>
           </a:p>
@@ -5474,7 +5671,7 @@
           <a:p>
             <a:fld id="{47DA11E4-27AF-4B9F-BEF3-3CA15041E18E}" type="datetime3">
               <a:rPr lang="en-US" smtClean="0"/>
-              <a:t>19 June 2022</a:t>
+              <a:t>30 June 2022</a:t>
             </a:fld>
             <a:endParaRPr lang="en-US"/>
           </a:p>
@@ -5755,7 +5952,7 @@
           <a:p>
             <a:fld id="{E2C02590-7F59-421C-A745-32233A68051D}" type="datetime3">
               <a:rPr lang="en-US" smtClean="0"/>
-              <a:t>19 June 2022</a:t>
+              <a:t>30 June 2022</a:t>
             </a:fld>
             <a:endParaRPr lang="en-US"/>
           </a:p>
@@ -6012,7 +6209,7 @@
           <a:p>
             <a:fld id="{84AF07D1-C31F-46EF-9183-DC77B1A31FFA}" type="datetime3">
               <a:rPr lang="en-US" smtClean="0"/>
-              <a:t>19 June 2022</a:t>
+              <a:t>30 June 2022</a:t>
             </a:fld>
             <a:endParaRPr lang="en-US"/>
           </a:p>
@@ -6234,7 +6431,7 @@
           <a:p>
             <a:fld id="{9D694A8E-69FB-424F-BB61-8EE202972235}" type="datetime3">
               <a:rPr lang="en-US" smtClean="0"/>
-              <a:t>19 June 2022</a:t>
+              <a:t>30 June 2022</a:t>
             </a:fld>
             <a:endParaRPr lang="en-US"/>
           </a:p>
@@ -6789,8 +6986,13 @@
             </a:r>
             <a:r>
               <a:rPr lang="en-US" sz="2600" dirty="0" smtClean="0"/>
-              <a:t> – state management?</a:t>
-            </a:r>
+              <a:t> – state management</a:t>
+            </a:r>
+            <a:r>
+              <a:rPr lang="en-US" sz="2600" dirty="0" smtClean="0"/>
+              <a:t>???</a:t>
+            </a:r>
+            <a:endParaRPr lang="en-US" sz="2600" dirty="0" smtClean="0"/>
           </a:p>
           <a:p>
             <a:pPr marL="342900" indent="-342900" algn="l">
@@ -6862,7 +7064,11 @@
             </a:pPr>
             <a:r>
               <a:rPr lang="en-US" sz="2400" dirty="0" smtClean="0"/>
-              <a:t>Organizing </a:t>
+              <a:t>Shows</a:t>
+            </a:r>
+            <a:r>
+              <a:rPr lang="en-US" sz="2400" dirty="0" smtClean="0"/>
+              <a:t> </a:t>
             </a:r>
             <a:r>
               <a:rPr lang="en-US" sz="2400" u="sng" dirty="0" smtClean="0"/>
@@ -6870,8 +7076,13 @@
             </a:r>
             <a:r>
               <a:rPr lang="en-US" sz="2400" dirty="0" smtClean="0"/>
-              <a:t>, no more</a:t>
-            </a:r>
+              <a:t>, </a:t>
+            </a:r>
+            <a:r>
+              <a:rPr lang="en-US" sz="2400" dirty="0" smtClean="0"/>
+              <a:t>as completed state</a:t>
+            </a:r>
+            <a:endParaRPr lang="en-US" sz="2400" dirty="0" smtClean="0"/>
           </a:p>
           <a:p>
             <a:pPr marL="285750" indent="-285750">
@@ -6900,8 +7111,13 @@
             </a:pPr>
             <a:r>
               <a:rPr lang="en-US" sz="2400" dirty="0" smtClean="0"/>
-              <a:t>Tasks – done, overwhelmed(run out of the time),</a:t>
-            </a:r>
+              <a:t>Tasks – done, overwhelmed(run out of the time</a:t>
+            </a:r>
+            <a:r>
+              <a:rPr lang="en-US" sz="2400" dirty="0" smtClean="0"/>
+              <a:t>),</a:t>
+            </a:r>
+            <a:endParaRPr lang="en-US" sz="2400" dirty="0" smtClean="0"/>
           </a:p>
           <a:p>
             <a:pPr marL="285750" indent="-285750">
@@ -6910,7 +7126,7 @@
             </a:pPr>
             <a:r>
               <a:rPr lang="en-US" sz="2400" dirty="0" smtClean="0"/>
-              <a:t>Postponed task</a:t>
+              <a:t>Devices: mobile, desktop</a:t>
             </a:r>
           </a:p>
           <a:p>
@@ -6920,7 +7136,11 @@
             </a:pPr>
             <a:r>
               <a:rPr lang="en-US" sz="2400" dirty="0" smtClean="0"/>
-              <a:t>Devices: mobile, desktop</a:t>
+              <a:t>More language support</a:t>
+            </a:r>
+            <a:r>
+              <a:rPr lang="en-US" sz="2400" dirty="0" smtClean="0"/>
+              <a:t>?</a:t>
             </a:r>
           </a:p>
           <a:p>
@@ -6930,8 +7150,9 @@
             </a:pPr>
             <a:r>
               <a:rPr lang="en-US" sz="2400" dirty="0" smtClean="0"/>
-              <a:t>More language support?</a:t>
-            </a:r>
+              <a:t>Skin changing</a:t>
+            </a:r>
+            <a:endParaRPr lang="en-US" sz="2400" dirty="0" smtClean="0"/>
           </a:p>
           <a:p>
             <a:pPr marL="285750" indent="-285750">
@@ -6966,7 +7187,7 @@
           <a:p>
             <a:fld id="{EE2F860A-D2E4-4785-9C60-B1A9A50464B3}" type="datetime3">
               <a:rPr lang="en-US" smtClean="0"/>
-              <a:t>19 June 2022</a:t>
+              <a:t>30 June 2022</a:t>
             </a:fld>
             <a:endParaRPr lang="en-US"/>
           </a:p>
@@ -7142,7 +7363,11 @@
           <a:p>
             <a:r>
               <a:rPr lang="en-US" dirty="0" smtClean="0"/>
-              <a:t>Ng2-chart, chart.js</a:t>
+              <a:t>Ng2-chart, </a:t>
+            </a:r>
+            <a:r>
+              <a:rPr lang="en-US" dirty="0" smtClean="0"/>
+              <a:t>chart.js (done)</a:t>
             </a:r>
             <a:endParaRPr lang="en-US" dirty="0" smtClean="0"/>
           </a:p>
@@ -7214,7 +7439,7 @@
           <a:p>
             <a:fld id="{859B4CCA-7A49-40BA-AA87-E36D3C1B74CD}" type="datetime3">
               <a:rPr lang="en-US" smtClean="0"/>
-              <a:t>19 June 2022</a:t>
+              <a:t>30 June 2022</a:t>
             </a:fld>
             <a:endParaRPr lang="en-US"/>
           </a:p>
@@ -7573,7 +7798,7 @@
           <a:p>
             <a:fld id="{A9402B09-ED4A-4B63-89C4-3E1E373D49A6}" type="datetime3">
               <a:rPr lang="en-US" smtClean="0"/>
-              <a:t>19 June 2022</a:t>
+              <a:t>30 June 2022</a:t>
             </a:fld>
             <a:endParaRPr lang="en-US"/>
           </a:p>
@@ -8241,7 +8466,7 @@
           <a:p>
             <a:fld id="{F14D243E-DB4A-407C-AFAE-0BC32BA45E9E}" type="datetime3">
               <a:rPr lang="en-US" smtClean="0"/>
-              <a:t>19 June 2022</a:t>
+              <a:t>30 June 2022</a:t>
             </a:fld>
             <a:endParaRPr lang="en-US"/>
           </a:p>
@@ -10495,7 +10720,7 @@
           <a:p>
             <a:fld id="{D1ADE0D0-F6AA-4072-9326-915F27F2EB27}" type="datetime3">
               <a:rPr lang="en-US" smtClean="0"/>
-              <a:t>19 June 2022</a:t>
+              <a:t>30 June 2022</a:t>
             </a:fld>
             <a:endParaRPr lang="en-US" dirty="0"/>
           </a:p>
@@ -10667,11 +10892,7 @@
           <a:p>
             <a:r>
               <a:rPr lang="en-US" dirty="0" smtClean="0"/>
-              <a:t>Statistic </a:t>
-            </a:r>
-            <a:r>
-              <a:rPr lang="en-US" dirty="0" smtClean="0"/>
-              <a:t>– chart.js, ng-chart</a:t>
+              <a:t>Statistic – chart.js, ng-chart</a:t>
             </a:r>
             <a:endParaRPr lang="en-US" dirty="0"/>
           </a:p>
@@ -10740,7 +10961,7 @@
           <a:p>
             <a:fld id="{C4DDBBDB-B7E6-470C-8F06-93D4F09ACFE1}" type="datetime3">
               <a:rPr lang="en-US" smtClean="0"/>
-              <a:t>19 June 2022</a:t>
+              <a:t>30 June 2022</a:t>
             </a:fld>
             <a:endParaRPr lang="en-US"/>
           </a:p>
@@ -11186,11 +11407,7 @@
           <a:p>
             <a:r>
               <a:rPr lang="en-US" dirty="0" smtClean="0"/>
-              <a:t>Efficient chart </a:t>
-            </a:r>
-            <a:r>
-              <a:rPr lang="en-US" dirty="0" smtClean="0"/>
-              <a:t>(solving task time </a:t>
+              <a:t>Efficient chart (solving task time </a:t>
             </a:r>
             <a:r>
               <a:rPr lang="en-US" dirty="0" err="1" smtClean="0"/>
@@ -11200,27 +11417,25 @@
               <a:rPr lang="en-US" dirty="0" smtClean="0"/>
               <a:t>)</a:t>
             </a:r>
-            <a:endParaRPr lang="en-US" dirty="0" smtClean="0"/>
           </a:p>
           <a:p>
             <a:r>
               <a:rPr lang="en-US" dirty="0" smtClean="0"/>
-              <a:t>Amounts of task done </a:t>
-            </a:r>
+              <a:t>Amounts of task done in weekly</a:t>
+            </a:r>
+          </a:p>
+          <a:p>
             <a:r>
               <a:rPr lang="en-US" dirty="0" smtClean="0"/>
-              <a:t>in </a:t>
+              <a:t>Given timer </a:t>
+            </a:r>
+            <a:r>
+              <a:rPr lang="en-US" dirty="0" err="1" smtClean="0"/>
+              <a:t>avg</a:t>
             </a:r>
             <a:r>
               <a:rPr lang="en-US" dirty="0" smtClean="0"/>
-              <a:t>weekly</a:t>
-            </a:r>
-            <a:endParaRPr lang="en-US" dirty="0" smtClean="0"/>
-          </a:p>
-          <a:p>
-            <a:r>
-              <a:rPr lang="en-US" dirty="0" smtClean="0"/>
-              <a:t>Showing timer calculation, efficient workflow</a:t>
+              <a:t>, efficient workflow</a:t>
             </a:r>
             <a:endParaRPr lang="en-US" dirty="0"/>
           </a:p>
@@ -11390,13 +11605,10 @@
           <a:p>
             <a:pPr lvl="1"/>
             <a:r>
-              <a:rPr lang="en-US" dirty="0"/>
-              <a:t>Swagger for Task, </a:t>
-            </a:r>
-            <a:r>
               <a:rPr lang="en-US" dirty="0" smtClean="0"/>
-              <a:t>path</a:t>
-            </a:r>
+              <a:t>Routing</a:t>
+            </a:r>
+            <a:endParaRPr lang="en-US" dirty="0" smtClean="0"/>
           </a:p>
           <a:p>
             <a:r>
@@ -11469,7 +11681,7 @@
           <a:p>
             <a:fld id="{859B4CCA-7A49-40BA-AA87-E36D3C1B74CD}" type="datetime3">
               <a:rPr lang="en-US" smtClean="0"/>
-              <a:t>19 June 2022</a:t>
+              <a:t>30 June 2022</a:t>
             </a:fld>
             <a:endParaRPr lang="en-US"/>
           </a:p>
@@ -11728,7 +11940,7 @@
           <a:p>
             <a:fld id="{859B4CCA-7A49-40BA-AA87-E36D3C1B74CD}" type="datetime3">
               <a:rPr lang="en-US" smtClean="0"/>
-              <a:t>19 June 2022</a:t>
+              <a:t>30 June 2022</a:t>
             </a:fld>
             <a:endParaRPr lang="en-US"/>
           </a:p>
@@ -11896,7 +12108,7 @@
           <a:p>
             <a:fld id="{859B4CCA-7A49-40BA-AA87-E36D3C1B74CD}" type="datetime3">
               <a:rPr lang="en-US" smtClean="0"/>
-              <a:t>19 June 2022</a:t>
+              <a:t>30 June 2022</a:t>
             </a:fld>
             <a:endParaRPr lang="en-US"/>
           </a:p>

</xml_diff>

<commit_message>
pptx, task side issue plans are done
</commit_message>
<xml_diff>
--- a/plan/TaskTracingApp.pptx
+++ b/plan/TaskTracingApp.pptx
@@ -2763,7 +2763,7 @@
           <a:p>
             <a:fld id="{5EBE3839-043F-4D6A-BB69-1C2CEF42D310}" type="datetimeFigureOut">
               <a:rPr lang="en-US" smtClean="0"/>
-              <a:t>6/30/2022</a:t>
+              <a:t>7/2/2022</a:t>
             </a:fld>
             <a:endParaRPr lang="en-US"/>
           </a:p>
@@ -3603,11 +3603,7 @@
             </a:r>
             <a:r>
               <a:rPr lang="en-US" baseline="0" dirty="0" smtClean="0"/>
-              <a:t> time measuring =&gt; not ready </a:t>
-            </a:r>
-            <a:r>
-              <a:rPr lang="en-US" baseline="0" dirty="0" smtClean="0"/>
-              <a:t>yet</a:t>
+              <a:t> time measuring =&gt; not ready yet</a:t>
             </a:r>
           </a:p>
           <a:p>
@@ -3654,7 +3650,7 @@
             </a:r>
             <a:r>
               <a:rPr lang="en-US" baseline="0" dirty="0" smtClean="0"/>
-              <a:t>.</a:t>
+              <a:t> (done)</a:t>
             </a:r>
           </a:p>
           <a:p>
@@ -3734,15 +3730,7 @@
           <a:p>
             <a:r>
               <a:rPr lang="en-US" baseline="0" dirty="0" smtClean="0"/>
-              <a:t>Bug fix </a:t>
-            </a:r>
-            <a:r>
-              <a:rPr lang="en-US" baseline="0" dirty="0" smtClean="0"/>
-              <a:t>Task </a:t>
-            </a:r>
-            <a:r>
-              <a:rPr lang="en-US" baseline="0" dirty="0" smtClean="0"/>
-              <a:t>side</a:t>
+              <a:t>Bug fix Task side</a:t>
             </a:r>
           </a:p>
           <a:p>
@@ -3752,7 +3740,7 @@
             </a:pPr>
             <a:r>
               <a:rPr lang="en-US" baseline="0" dirty="0" smtClean="0"/>
-              <a:t>Yesterday task not be editable</a:t>
+              <a:t>Yesterday task not be editable (done)</a:t>
             </a:r>
           </a:p>
           <a:p>
@@ -3762,7 +3750,7 @@
             </a:pPr>
             <a:r>
               <a:rPr lang="en-US" baseline="0" dirty="0" smtClean="0"/>
-              <a:t>When task in progress not be editable</a:t>
+              <a:t>When task in progress not be editable (done)</a:t>
             </a:r>
           </a:p>
           <a:p>
@@ -3772,7 +3760,7 @@
             </a:pPr>
             <a:r>
               <a:rPr lang="en-US" baseline="0" dirty="0" smtClean="0"/>
-              <a:t>Time filtering: only show yesterday task</a:t>
+              <a:t>Time filtering: only show yesterday task (done)</a:t>
             </a:r>
           </a:p>
           <a:p>
@@ -3790,11 +3778,7 @@
             </a:r>
             <a:r>
               <a:rPr lang="en-US" baseline="0" dirty="0" smtClean="0"/>
-              <a:t>, not be </a:t>
-            </a:r>
-            <a:r>
-              <a:rPr lang="en-US" baseline="0" dirty="0" smtClean="0"/>
-              <a:t>changeable</a:t>
+              <a:t>, not be changeable (done)</a:t>
             </a:r>
           </a:p>
           <a:p>
@@ -3804,7 +3788,34 @@
             </a:pPr>
             <a:r>
               <a:rPr lang="en-US" baseline="0" dirty="0" smtClean="0"/>
-              <a:t>Timer: showing progress bar</a:t>
+              <a:t>Timer: showing progress </a:t>
+            </a:r>
+            <a:r>
+              <a:rPr lang="en-US" baseline="0" dirty="0" smtClean="0"/>
+              <a:t>bar (done)</a:t>
+            </a:r>
+            <a:endParaRPr lang="en-US" baseline="0" dirty="0" smtClean="0"/>
+          </a:p>
+          <a:p>
+            <a:pPr marL="171450" indent="-171450">
+              <a:buFontTx/>
+              <a:buChar char="-"/>
+            </a:pPr>
+            <a:r>
+              <a:rPr lang="en-US" baseline="0" dirty="0" smtClean="0"/>
+              <a:t>Checking properties which will be </a:t>
+            </a:r>
+            <a:r>
+              <a:rPr lang="en-US" baseline="0" dirty="0" err="1" smtClean="0"/>
+              <a:t>readonly</a:t>
+            </a:r>
+            <a:r>
+              <a:rPr lang="en-US" baseline="0" dirty="0" smtClean="0"/>
+              <a:t>, not get new </a:t>
+            </a:r>
+            <a:r>
+              <a:rPr lang="en-US" baseline="0" dirty="0" smtClean="0"/>
+              <a:t>value (done)</a:t>
             </a:r>
             <a:endParaRPr lang="en-US" baseline="0" dirty="0" smtClean="0"/>
           </a:p>
@@ -4061,7 +4072,7 @@
           <a:p>
             <a:fld id="{8E031A97-C5A4-4558-8890-FA2925244C4F}" type="datetime3">
               <a:rPr lang="en-US" smtClean="0"/>
-              <a:t>30 June 2022</a:t>
+              <a:t>2 July 2022</a:t>
             </a:fld>
             <a:endParaRPr lang="en-US"/>
           </a:p>
@@ -4235,7 +4246,7 @@
           <a:p>
             <a:fld id="{156D25A5-2131-4D11-8DF2-BFE448E0C6C4}" type="datetime3">
               <a:rPr lang="en-US" smtClean="0"/>
-              <a:t>30 June 2022</a:t>
+              <a:t>2 July 2022</a:t>
             </a:fld>
             <a:endParaRPr lang="en-US"/>
           </a:p>
@@ -4419,7 +4430,7 @@
           <a:p>
             <a:fld id="{741DCA71-90D2-471A-B4F6-D63D3144D802}" type="datetime3">
               <a:rPr lang="en-US" smtClean="0"/>
-              <a:t>30 June 2022</a:t>
+              <a:t>2 July 2022</a:t>
             </a:fld>
             <a:endParaRPr lang="en-US"/>
           </a:p>
@@ -4593,7 +4604,7 @@
           <a:p>
             <a:fld id="{859B4CCA-7A49-40BA-AA87-E36D3C1B74CD}" type="datetime3">
               <a:rPr lang="en-US" smtClean="0"/>
-              <a:t>30 June 2022</a:t>
+              <a:t>2 July 2022</a:t>
             </a:fld>
             <a:endParaRPr lang="en-US"/>
           </a:p>
@@ -4843,7 +4854,7 @@
           <a:p>
             <a:fld id="{00C05CC3-8230-4750-BEE6-66D4A1F33F0F}" type="datetime3">
               <a:rPr lang="en-US" smtClean="0"/>
-              <a:t>30 June 2022</a:t>
+              <a:t>2 July 2022</a:t>
             </a:fld>
             <a:endParaRPr lang="en-US"/>
           </a:p>
@@ -5079,7 +5090,7 @@
           <a:p>
             <a:fld id="{3DEBFD87-4EA2-4600-AB37-3AFC3D80519A}" type="datetime3">
               <a:rPr lang="en-US" smtClean="0"/>
-              <a:t>30 June 2022</a:t>
+              <a:t>2 July 2022</a:t>
             </a:fld>
             <a:endParaRPr lang="en-US"/>
           </a:p>
@@ -5450,7 +5461,7 @@
           <a:p>
             <a:fld id="{A72CEC32-E708-4316-8666-BA8BF9722CA0}" type="datetime3">
               <a:rPr lang="en-US" smtClean="0"/>
-              <a:t>30 June 2022</a:t>
+              <a:t>2 July 2022</a:t>
             </a:fld>
             <a:endParaRPr lang="en-US"/>
           </a:p>
@@ -5572,7 +5583,7 @@
           <a:p>
             <a:fld id="{7CF1C314-8D6F-4732-88D4-94FF05CBB104}" type="datetime3">
               <a:rPr lang="en-US" smtClean="0"/>
-              <a:t>30 June 2022</a:t>
+              <a:t>2 July 2022</a:t>
             </a:fld>
             <a:endParaRPr lang="en-US"/>
           </a:p>
@@ -5671,7 +5682,7 @@
           <a:p>
             <a:fld id="{47DA11E4-27AF-4B9F-BEF3-3CA15041E18E}" type="datetime3">
               <a:rPr lang="en-US" smtClean="0"/>
-              <a:t>30 June 2022</a:t>
+              <a:t>2 July 2022</a:t>
             </a:fld>
             <a:endParaRPr lang="en-US"/>
           </a:p>
@@ -5952,7 +5963,7 @@
           <a:p>
             <a:fld id="{E2C02590-7F59-421C-A745-32233A68051D}" type="datetime3">
               <a:rPr lang="en-US" smtClean="0"/>
-              <a:t>30 June 2022</a:t>
+              <a:t>2 July 2022</a:t>
             </a:fld>
             <a:endParaRPr lang="en-US"/>
           </a:p>
@@ -6209,7 +6220,7 @@
           <a:p>
             <a:fld id="{84AF07D1-C31F-46EF-9183-DC77B1A31FFA}" type="datetime3">
               <a:rPr lang="en-US" smtClean="0"/>
-              <a:t>30 June 2022</a:t>
+              <a:t>2 July 2022</a:t>
             </a:fld>
             <a:endParaRPr lang="en-US"/>
           </a:p>
@@ -6431,7 +6442,7 @@
           <a:p>
             <a:fld id="{9D694A8E-69FB-424F-BB61-8EE202972235}" type="datetime3">
               <a:rPr lang="en-US" smtClean="0"/>
-              <a:t>30 June 2022</a:t>
+              <a:t>2 July 2022</a:t>
             </a:fld>
             <a:endParaRPr lang="en-US"/>
           </a:p>
@@ -6986,13 +6997,8 @@
             </a:r>
             <a:r>
               <a:rPr lang="en-US" sz="2600" dirty="0" smtClean="0"/>
-              <a:t> – state management</a:t>
-            </a:r>
-            <a:r>
-              <a:rPr lang="en-US" sz="2600" dirty="0" smtClean="0"/>
-              <a:t>???</a:t>
-            </a:r>
-            <a:endParaRPr lang="en-US" sz="2600" dirty="0" smtClean="0"/>
+              <a:t> – state management???</a:t>
+            </a:r>
           </a:p>
           <a:p>
             <a:pPr marL="342900" indent="-342900" algn="l">
@@ -7064,11 +7070,7 @@
             </a:pPr>
             <a:r>
               <a:rPr lang="en-US" sz="2400" dirty="0" smtClean="0"/>
-              <a:t>Shows</a:t>
-            </a:r>
-            <a:r>
-              <a:rPr lang="en-US" sz="2400" dirty="0" smtClean="0"/>
-              <a:t> </a:t>
+              <a:t>Shows </a:t>
             </a:r>
             <a:r>
               <a:rPr lang="en-US" sz="2400" u="sng" dirty="0" smtClean="0"/>
@@ -7076,13 +7078,8 @@
             </a:r>
             <a:r>
               <a:rPr lang="en-US" sz="2400" dirty="0" smtClean="0"/>
-              <a:t>, </a:t>
-            </a:r>
-            <a:r>
-              <a:rPr lang="en-US" sz="2400" dirty="0" smtClean="0"/>
-              <a:t>as completed state</a:t>
-            </a:r>
-            <a:endParaRPr lang="en-US" sz="2400" dirty="0" smtClean="0"/>
+              <a:t>, as completed state</a:t>
+            </a:r>
           </a:p>
           <a:p>
             <a:pPr marL="285750" indent="-285750">
@@ -7111,13 +7108,8 @@
             </a:pPr>
             <a:r>
               <a:rPr lang="en-US" sz="2400" dirty="0" smtClean="0"/>
-              <a:t>Tasks – done, overwhelmed(run out of the time</a:t>
-            </a:r>
-            <a:r>
-              <a:rPr lang="en-US" sz="2400" dirty="0" smtClean="0"/>
-              <a:t>),</a:t>
-            </a:r>
-            <a:endParaRPr lang="en-US" sz="2400" dirty="0" smtClean="0"/>
+              <a:t>Tasks – done, overwhelmed(run out of the time),</a:t>
+            </a:r>
           </a:p>
           <a:p>
             <a:pPr marL="285750" indent="-285750">
@@ -7136,11 +7128,7 @@
             </a:pPr>
             <a:r>
               <a:rPr lang="en-US" sz="2400" dirty="0" smtClean="0"/>
-              <a:t>More language support</a:t>
-            </a:r>
-            <a:r>
-              <a:rPr lang="en-US" sz="2400" dirty="0" smtClean="0"/>
-              <a:t>?</a:t>
+              <a:t>More language support?</a:t>
             </a:r>
           </a:p>
           <a:p>
@@ -7152,7 +7140,6 @@
               <a:rPr lang="en-US" sz="2400" dirty="0" smtClean="0"/>
               <a:t>Skin changing</a:t>
             </a:r>
-            <a:endParaRPr lang="en-US" sz="2400" dirty="0" smtClean="0"/>
           </a:p>
           <a:p>
             <a:pPr marL="285750" indent="-285750">
@@ -7187,7 +7174,7 @@
           <a:p>
             <a:fld id="{EE2F860A-D2E4-4785-9C60-B1A9A50464B3}" type="datetime3">
               <a:rPr lang="en-US" smtClean="0"/>
-              <a:t>30 June 2022</a:t>
+              <a:t>2 July 2022</a:t>
             </a:fld>
             <a:endParaRPr lang="en-US"/>
           </a:p>
@@ -7363,13 +7350,8 @@
           <a:p>
             <a:r>
               <a:rPr lang="en-US" dirty="0" smtClean="0"/>
-              <a:t>Ng2-chart, </a:t>
-            </a:r>
-            <a:r>
-              <a:rPr lang="en-US" dirty="0" smtClean="0"/>
-              <a:t>chart.js (done)</a:t>
-            </a:r>
-            <a:endParaRPr lang="en-US" dirty="0" smtClean="0"/>
+              <a:t>Ng2-chart, chart.js (done)</a:t>
+            </a:r>
           </a:p>
           <a:p>
             <a:r>
@@ -7439,7 +7421,7 @@
           <a:p>
             <a:fld id="{859B4CCA-7A49-40BA-AA87-E36D3C1B74CD}" type="datetime3">
               <a:rPr lang="en-US" smtClean="0"/>
-              <a:t>30 June 2022</a:t>
+              <a:t>2 July 2022</a:t>
             </a:fld>
             <a:endParaRPr lang="en-US"/>
           </a:p>
@@ -7798,7 +7780,7 @@
           <a:p>
             <a:fld id="{A9402B09-ED4A-4B63-89C4-3E1E373D49A6}" type="datetime3">
               <a:rPr lang="en-US" smtClean="0"/>
-              <a:t>30 June 2022</a:t>
+              <a:t>2 July 2022</a:t>
             </a:fld>
             <a:endParaRPr lang="en-US"/>
           </a:p>
@@ -8466,7 +8448,7 @@
           <a:p>
             <a:fld id="{F14D243E-DB4A-407C-AFAE-0BC32BA45E9E}" type="datetime3">
               <a:rPr lang="en-US" smtClean="0"/>
-              <a:t>30 June 2022</a:t>
+              <a:t>2 July 2022</a:t>
             </a:fld>
             <a:endParaRPr lang="en-US"/>
           </a:p>
@@ -10720,7 +10702,7 @@
           <a:p>
             <a:fld id="{D1ADE0D0-F6AA-4072-9326-915F27F2EB27}" type="datetime3">
               <a:rPr lang="en-US" smtClean="0"/>
-              <a:t>30 June 2022</a:t>
+              <a:t>2 July 2022</a:t>
             </a:fld>
             <a:endParaRPr lang="en-US" dirty="0"/>
           </a:p>
@@ -10961,7 +10943,7 @@
           <a:p>
             <a:fld id="{C4DDBBDB-B7E6-470C-8F06-93D4F09ACFE1}" type="datetime3">
               <a:rPr lang="en-US" smtClean="0"/>
-              <a:t>30 June 2022</a:t>
+              <a:t>2 July 2022</a:t>
             </a:fld>
             <a:endParaRPr lang="en-US"/>
           </a:p>
@@ -11608,7 +11590,6 @@
               <a:rPr lang="en-US" dirty="0" smtClean="0"/>
               <a:t>Routing</a:t>
             </a:r>
-            <a:endParaRPr lang="en-US" dirty="0" smtClean="0"/>
           </a:p>
           <a:p>
             <a:r>
@@ -11681,7 +11662,7 @@
           <a:p>
             <a:fld id="{859B4CCA-7A49-40BA-AA87-E36D3C1B74CD}" type="datetime3">
               <a:rPr lang="en-US" smtClean="0"/>
-              <a:t>30 June 2022</a:t>
+              <a:t>2 July 2022</a:t>
             </a:fld>
             <a:endParaRPr lang="en-US"/>
           </a:p>
@@ -11940,7 +11921,7 @@
           <a:p>
             <a:fld id="{859B4CCA-7A49-40BA-AA87-E36D3C1B74CD}" type="datetime3">
               <a:rPr lang="en-US" smtClean="0"/>
-              <a:t>30 June 2022</a:t>
+              <a:t>2 July 2022</a:t>
             </a:fld>
             <a:endParaRPr lang="en-US"/>
           </a:p>
@@ -12108,7 +12089,7 @@
           <a:p>
             <a:fld id="{859B4CCA-7A49-40BA-AA87-E36D3C1B74CD}" type="datetime3">
               <a:rPr lang="en-US" smtClean="0"/>
-              <a:t>30 June 2022</a:t>
+              <a:t>2 July 2022</a:t>
             </a:fld>
             <a:endParaRPr lang="en-US"/>
           </a:p>

</xml_diff>

<commit_message>
changing theme plan saved, done
</commit_message>
<xml_diff>
--- a/plan/TaskTracingApp.pptx
+++ b/plan/TaskTracingApp.pptx
@@ -2763,7 +2763,7 @@
           <a:p>
             <a:fld id="{5EBE3839-043F-4D6A-BB69-1C2CEF42D310}" type="datetimeFigureOut">
               <a:rPr lang="en-US" smtClean="0"/>
-              <a:t>7/2/2022</a:t>
+              <a:t>7/17/2022</a:t>
             </a:fld>
             <a:endParaRPr lang="en-US"/>
           </a:p>
@@ -3075,29 +3075,7 @@
           <a:bodyPr/>
           <a:lstStyle/>
           <a:p>
-            <a:r>
-              <a:rPr lang="en-US" dirty="0" err="1" smtClean="0"/>
-              <a:t>AlertWindow</a:t>
-            </a:r>
-            <a:r>
-              <a:rPr lang="en-US" dirty="0" smtClean="0"/>
-              <a:t>, with service with test (done)</a:t>
-            </a:r>
-          </a:p>
-          <a:p>
-            <a:r>
-              <a:rPr lang="en-US" baseline="0" dirty="0" smtClean="0"/>
-              <a:t>Validators test by reactive form, </a:t>
-            </a:r>
-            <a:r>
-              <a:rPr lang="en-US" baseline="0" dirty="0" err="1" smtClean="0"/>
-              <a:t>formGroup</a:t>
-            </a:r>
-            <a:r>
-              <a:rPr lang="en-US" baseline="0" dirty="0" smtClean="0"/>
-              <a:t> (done)</a:t>
-            </a:r>
-            <a:endParaRPr lang="en-US" dirty="0" smtClean="0"/>
+            <a:endParaRPr lang="en-US" dirty="0"/>
           </a:p>
         </p:txBody>
       </p:sp>
@@ -3118,7 +3096,7 @@
           <a:p>
             <a:fld id="{7E7CBEC1-F5FB-4BFE-AF15-5C1A6E9B4F82}" type="slidenum">
               <a:rPr lang="en-US" smtClean="0"/>
-              <a:t>3</a:t>
+              <a:t>1</a:t>
             </a:fld>
             <a:endParaRPr lang="en-US"/>
           </a:p>
@@ -3127,7 +3105,7 @@
     </p:spTree>
     <p:extLst>
       <p:ext uri="{BB962C8B-B14F-4D97-AF65-F5344CB8AC3E}">
-        <p14:creationId xmlns:p14="http://schemas.microsoft.com/office/powerpoint/2010/main" val="1522419581"/>
+        <p14:creationId xmlns:p14="http://schemas.microsoft.com/office/powerpoint/2010/main" val="3944017014"/>
       </p:ext>
     </p:extLst>
   </p:cSld>
@@ -3182,211 +3160,28 @@
           <a:lstStyle/>
           <a:p>
             <a:r>
+              <a:rPr lang="en-US" dirty="0" err="1" smtClean="0"/>
+              <a:t>AlertWindow</a:t>
+            </a:r>
+            <a:r>
               <a:rPr lang="en-US" dirty="0" smtClean="0"/>
-              <a:t>Each</a:t>
-            </a:r>
+              <a:t>, with service with test (done)</a:t>
+            </a:r>
+          </a:p>
+          <a:p>
             <a:r>
               <a:rPr lang="en-US" baseline="0" dirty="0" smtClean="0"/>
-              <a:t> menu item: contains the icon and text</a:t>
-            </a:r>
-          </a:p>
-          <a:p>
-            <a:r>
-              <a:rPr lang="en-US" baseline="0" dirty="0" smtClean="0"/>
-              <a:t>Task service, test (done)</a:t>
-            </a:r>
-          </a:p>
-          <a:p>
-            <a:r>
-              <a:rPr lang="en-US" baseline="0" dirty="0" smtClean="0"/>
-              <a:t>Task-card selection: highlight with directive, test (done)</a:t>
-            </a:r>
-          </a:p>
-          <a:p>
-            <a:r>
-              <a:rPr lang="en-US" baseline="0" dirty="0" smtClean="0"/>
-              <a:t>---</a:t>
-            </a:r>
-          </a:p>
-          <a:p>
-            <a:r>
-              <a:rPr lang="en-US" baseline="0" dirty="0" smtClean="0"/>
-              <a:t>Limit: 10 tasks (done)</a:t>
-            </a:r>
-          </a:p>
-          <a:p>
-            <a:r>
-              <a:rPr lang="en-US" baseline="0" dirty="0" smtClean="0"/>
-              <a:t>Task edit, new form (done)</a:t>
-            </a:r>
-          </a:p>
-          <a:p>
-            <a:r>
-              <a:rPr lang="en-US" baseline="0" dirty="0" smtClean="0"/>
-              <a:t>Directive: edit -&gt; close button (done)</a:t>
-            </a:r>
-          </a:p>
-          <a:p>
-            <a:r>
-              <a:rPr lang="en-US" baseline="0" dirty="0" smtClean="0"/>
-              <a:t>Saving bug fixed (done)</a:t>
-            </a:r>
-          </a:p>
-          <a:p>
-            <a:r>
-              <a:rPr lang="en-US" baseline="0" dirty="0" smtClean="0"/>
-              <a:t>Date, status filtering (done)</a:t>
-            </a:r>
-          </a:p>
-          <a:p>
-            <a:r>
-              <a:rPr lang="en-US" baseline="0" dirty="0" smtClean="0"/>
-              <a:t>-----</a:t>
-            </a:r>
-          </a:p>
-          <a:p>
-            <a:pPr marL="0" marR="0" indent="0" algn="l" defTabSz="914400" rtl="0" eaLnBrk="1" fontAlgn="auto" latinLnBrk="0" hangingPunct="1">
-              <a:lnSpc>
-                <a:spcPct val="100000"/>
-              </a:lnSpc>
-              <a:spcBef>
-                <a:spcPts val="0"/>
-              </a:spcBef>
-              <a:spcAft>
-                <a:spcPts val="0"/>
-              </a:spcAft>
-              <a:buClrTx/>
-              <a:buSzTx/>
-              <a:buFontTx/>
-              <a:buNone/>
-              <a:tabLst/>
-              <a:defRPr/>
-            </a:pPr>
-            <a:r>
-              <a:rPr lang="en-US" baseline="0" dirty="0" smtClean="0"/>
-              <a:t>Highlight directive test (done)</a:t>
-            </a:r>
-          </a:p>
-          <a:p>
-            <a:pPr marL="0" marR="0" indent="0" algn="l" defTabSz="914400" rtl="0" eaLnBrk="1" fontAlgn="auto" latinLnBrk="0" hangingPunct="1">
-              <a:lnSpc>
-                <a:spcPct val="100000"/>
-              </a:lnSpc>
-              <a:spcBef>
-                <a:spcPts val="0"/>
-              </a:spcBef>
-              <a:spcAft>
-                <a:spcPts val="0"/>
-              </a:spcAft>
-              <a:buClrTx/>
-              <a:buSzTx/>
-              <a:buFontTx/>
-              <a:buNone/>
-              <a:tabLst/>
-              <a:defRPr/>
-            </a:pPr>
-            <a:r>
-              <a:rPr lang="en-US" baseline="0" dirty="0" smtClean="0"/>
-              <a:t>Input-border directive test (done)</a:t>
-            </a:r>
-          </a:p>
-          <a:p>
-            <a:pPr marL="0" marR="0" indent="0" algn="l" defTabSz="914400" rtl="0" eaLnBrk="1" fontAlgn="auto" latinLnBrk="0" hangingPunct="1">
-              <a:lnSpc>
-                <a:spcPct val="100000"/>
-              </a:lnSpc>
-              <a:spcBef>
-                <a:spcPts val="0"/>
-              </a:spcBef>
-              <a:spcAft>
-                <a:spcPts val="0"/>
-              </a:spcAft>
-              <a:buClrTx/>
-              <a:buSzTx/>
-              <a:buFontTx/>
-              <a:buNone/>
-              <a:tabLst/>
-              <a:defRPr/>
-            </a:pPr>
-            <a:r>
-              <a:rPr lang="en-US" baseline="0" dirty="0" smtClean="0"/>
-              <a:t>Saving process </a:t>
+              <a:t>Validators test by reactive form, </a:t>
             </a:r>
             <a:r>
               <a:rPr lang="en-US" baseline="0" dirty="0" err="1" smtClean="0"/>
-              <a:t>def</a:t>
-            </a:r>
-            <a:r>
-              <a:rPr lang="en-US" baseline="0" dirty="0" smtClean="0"/>
-              <a:t> </a:t>
-            </a:r>
-            <a:r>
-              <a:rPr lang="en-US" baseline="0" dirty="0" smtClean="0">
-                <a:sym typeface="Wingdings" panose="05000000000000000000" pitchFamily="2" charset="2"/>
-              </a:rPr>
-              <a:t> </a:t>
-            </a:r>
-            <a:r>
-              <a:rPr lang="en-US" baseline="0" dirty="0" err="1" smtClean="0">
-                <a:sym typeface="Wingdings" panose="05000000000000000000" pitchFamily="2" charset="2"/>
-              </a:rPr>
-              <a:t>exhaustedMap</a:t>
-            </a:r>
-            <a:r>
-              <a:rPr lang="en-US" baseline="0" dirty="0" smtClean="0">
-                <a:sym typeface="Wingdings" panose="05000000000000000000" pitchFamily="2" charset="2"/>
-              </a:rPr>
-              <a:t> (done)</a:t>
-            </a:r>
-          </a:p>
-          <a:p>
-            <a:pPr marL="0" marR="0" indent="0" algn="l" defTabSz="914400" rtl="0" eaLnBrk="1" fontAlgn="auto" latinLnBrk="0" hangingPunct="1">
-              <a:lnSpc>
-                <a:spcPct val="100000"/>
-              </a:lnSpc>
-              <a:spcBef>
-                <a:spcPts val="0"/>
-              </a:spcBef>
-              <a:spcAft>
-                <a:spcPts val="0"/>
-              </a:spcAft>
-              <a:buClrTx/>
-              <a:buSzTx/>
-              <a:buFontTx/>
-              <a:buNone/>
-              <a:tabLst/>
-              <a:defRPr/>
-            </a:pPr>
-            <a:r>
-              <a:rPr lang="en-US" baseline="0" dirty="0" smtClean="0"/>
-              <a:t>-------------------------------</a:t>
-            </a:r>
-          </a:p>
-          <a:p>
-            <a:r>
-              <a:rPr lang="en-US" baseline="0" dirty="0" smtClean="0"/>
-              <a:t>Measuring time, </a:t>
-            </a:r>
-            <a:r>
-              <a:rPr lang="en-US" baseline="0" dirty="0" err="1" smtClean="0"/>
-              <a:t>setInterval</a:t>
+              <a:t>formGroup</a:t>
             </a:r>
             <a:r>
               <a:rPr lang="en-US" baseline="0" dirty="0" smtClean="0"/>
               <a:t> (done)</a:t>
             </a:r>
-          </a:p>
-          <a:p>
-            <a:r>
-              <a:rPr lang="en-US" baseline="0" dirty="0" smtClean="0"/>
-              <a:t>Threading – calculate rest time (done)</a:t>
-            </a:r>
-          </a:p>
-          <a:p>
-            <a:r>
-              <a:rPr lang="en-US" baseline="0" dirty="0" smtClean="0"/>
-              <a:t>Timer test (done)</a:t>
-            </a:r>
+            <a:endParaRPr lang="en-US" dirty="0" smtClean="0"/>
           </a:p>
         </p:txBody>
       </p:sp>
@@ -3407,7 +3202,7 @@
           <a:p>
             <a:fld id="{7E7CBEC1-F5FB-4BFE-AF15-5C1A6E9B4F82}" type="slidenum">
               <a:rPr lang="en-US" smtClean="0"/>
-              <a:t>4</a:t>
+              <a:t>3</a:t>
             </a:fld>
             <a:endParaRPr lang="en-US"/>
           </a:p>
@@ -3416,7 +3211,7 @@
     </p:spTree>
     <p:extLst>
       <p:ext uri="{BB962C8B-B14F-4D97-AF65-F5344CB8AC3E}">
-        <p14:creationId xmlns:p14="http://schemas.microsoft.com/office/powerpoint/2010/main" val="2516751226"/>
+        <p14:creationId xmlns:p14="http://schemas.microsoft.com/office/powerpoint/2010/main" val="1522419581"/>
       </p:ext>
     </p:extLst>
   </p:cSld>
@@ -3471,49 +3266,211 @@
           <a:lstStyle/>
           <a:p>
             <a:r>
-              <a:rPr lang="en-US" dirty="0" err="1" smtClean="0"/>
-              <a:t>Thema</a:t>
-            </a:r>
-            <a:r>
               <a:rPr lang="en-US" dirty="0" smtClean="0"/>
-              <a:t>,</a:t>
+              <a:t>Each</a:t>
+            </a:r>
+            <a:r>
+              <a:rPr lang="en-US" baseline="0" dirty="0" smtClean="0"/>
+              <a:t> menu item: contains the icon and text</a:t>
+            </a:r>
+          </a:p>
+          <a:p>
+            <a:r>
+              <a:rPr lang="en-US" baseline="0" dirty="0" smtClean="0"/>
+              <a:t>Task service, test (done)</a:t>
+            </a:r>
+          </a:p>
+          <a:p>
+            <a:r>
+              <a:rPr lang="en-US" baseline="0" dirty="0" smtClean="0"/>
+              <a:t>Task-card selection: highlight with directive, test (done)</a:t>
+            </a:r>
+          </a:p>
+          <a:p>
+            <a:r>
+              <a:rPr lang="en-US" baseline="0" dirty="0" smtClean="0"/>
+              <a:t>---</a:t>
+            </a:r>
+          </a:p>
+          <a:p>
+            <a:r>
+              <a:rPr lang="en-US" baseline="0" dirty="0" smtClean="0"/>
+              <a:t>Limit: 10 tasks (done)</a:t>
+            </a:r>
+          </a:p>
+          <a:p>
+            <a:r>
+              <a:rPr lang="en-US" baseline="0" dirty="0" smtClean="0"/>
+              <a:t>Task edit, new form (done)</a:t>
+            </a:r>
+          </a:p>
+          <a:p>
+            <a:r>
+              <a:rPr lang="en-US" baseline="0" dirty="0" smtClean="0"/>
+              <a:t>Directive: edit -&gt; close button (done)</a:t>
+            </a:r>
+          </a:p>
+          <a:p>
+            <a:r>
+              <a:rPr lang="en-US" baseline="0" dirty="0" smtClean="0"/>
+              <a:t>Saving bug fixed (done)</a:t>
+            </a:r>
+          </a:p>
+          <a:p>
+            <a:r>
+              <a:rPr lang="en-US" baseline="0" dirty="0" smtClean="0"/>
+              <a:t>Date, status filtering (done)</a:t>
+            </a:r>
+          </a:p>
+          <a:p>
+            <a:r>
+              <a:rPr lang="en-US" baseline="0" dirty="0" smtClean="0"/>
+              <a:t>-----</a:t>
+            </a:r>
+          </a:p>
+          <a:p>
+            <a:pPr marL="0" marR="0" indent="0" algn="l" defTabSz="914400" rtl="0" eaLnBrk="1" fontAlgn="auto" latinLnBrk="0" hangingPunct="1">
+              <a:lnSpc>
+                <a:spcPct val="100000"/>
+              </a:lnSpc>
+              <a:spcBef>
+                <a:spcPts val="0"/>
+              </a:spcBef>
+              <a:spcAft>
+                <a:spcPts val="0"/>
+              </a:spcAft>
+              <a:buClrTx/>
+              <a:buSzTx/>
+              <a:buFontTx/>
+              <a:buNone/>
+              <a:tabLst/>
+              <a:defRPr/>
+            </a:pPr>
+            <a:r>
+              <a:rPr lang="en-US" baseline="0" dirty="0" smtClean="0"/>
+              <a:t>Highlight directive test (done)</a:t>
+            </a:r>
+          </a:p>
+          <a:p>
+            <a:pPr marL="0" marR="0" indent="0" algn="l" defTabSz="914400" rtl="0" eaLnBrk="1" fontAlgn="auto" latinLnBrk="0" hangingPunct="1">
+              <a:lnSpc>
+                <a:spcPct val="100000"/>
+              </a:lnSpc>
+              <a:spcBef>
+                <a:spcPts val="0"/>
+              </a:spcBef>
+              <a:spcAft>
+                <a:spcPts val="0"/>
+              </a:spcAft>
+              <a:buClrTx/>
+              <a:buSzTx/>
+              <a:buFontTx/>
+              <a:buNone/>
+              <a:tabLst/>
+              <a:defRPr/>
+            </a:pPr>
+            <a:r>
+              <a:rPr lang="en-US" baseline="0" dirty="0" smtClean="0"/>
+              <a:t>Input-border directive test (done)</a:t>
+            </a:r>
+          </a:p>
+          <a:p>
+            <a:pPr marL="0" marR="0" indent="0" algn="l" defTabSz="914400" rtl="0" eaLnBrk="1" fontAlgn="auto" latinLnBrk="0" hangingPunct="1">
+              <a:lnSpc>
+                <a:spcPct val="100000"/>
+              </a:lnSpc>
+              <a:spcBef>
+                <a:spcPts val="0"/>
+              </a:spcBef>
+              <a:spcAft>
+                <a:spcPts val="0"/>
+              </a:spcAft>
+              <a:buClrTx/>
+              <a:buSzTx/>
+              <a:buFontTx/>
+              <a:buNone/>
+              <a:tabLst/>
+              <a:defRPr/>
+            </a:pPr>
+            <a:r>
+              <a:rPr lang="en-US" baseline="0" dirty="0" smtClean="0"/>
+              <a:t>Saving process </a:t>
+            </a:r>
+            <a:r>
+              <a:rPr lang="en-US" baseline="0" dirty="0" err="1" smtClean="0"/>
+              <a:t>def</a:t>
             </a:r>
             <a:r>
               <a:rPr lang="en-US" baseline="0" dirty="0" smtClean="0"/>
               <a:t> </a:t>
             </a:r>
             <a:r>
+              <a:rPr lang="en-US" baseline="0" dirty="0" smtClean="0">
+                <a:sym typeface="Wingdings" panose="05000000000000000000" pitchFamily="2" charset="2"/>
+              </a:rPr>
+              <a:t> </a:t>
+            </a:r>
+            <a:r>
+              <a:rPr lang="en-US" baseline="0" dirty="0" err="1" smtClean="0">
+                <a:sym typeface="Wingdings" panose="05000000000000000000" pitchFamily="2" charset="2"/>
+              </a:rPr>
+              <a:t>exhaustedMap</a:t>
+            </a:r>
+            <a:r>
+              <a:rPr lang="en-US" baseline="0" dirty="0" smtClean="0">
+                <a:sym typeface="Wingdings" panose="05000000000000000000" pitchFamily="2" charset="2"/>
+              </a:rPr>
+              <a:t> (done)</a:t>
+            </a:r>
+          </a:p>
+          <a:p>
+            <a:pPr marL="0" marR="0" indent="0" algn="l" defTabSz="914400" rtl="0" eaLnBrk="1" fontAlgn="auto" latinLnBrk="0" hangingPunct="1">
+              <a:lnSpc>
+                <a:spcPct val="100000"/>
+              </a:lnSpc>
+              <a:spcBef>
+                <a:spcPts val="0"/>
+              </a:spcBef>
+              <a:spcAft>
+                <a:spcPts val="0"/>
+              </a:spcAft>
+              <a:buClrTx/>
+              <a:buSzTx/>
+              <a:buFontTx/>
+              <a:buNone/>
+              <a:tabLst/>
+              <a:defRPr/>
+            </a:pPr>
+            <a:r>
+              <a:rPr lang="en-US" baseline="0" dirty="0" smtClean="0"/>
+              <a:t>-------------------------------</a:t>
+            </a:r>
+          </a:p>
+          <a:p>
+            <a:r>
+              <a:rPr lang="en-US" baseline="0" dirty="0" smtClean="0"/>
+              <a:t>Measuring time, </a:t>
+            </a:r>
+            <a:r>
               <a:rPr lang="en-US" baseline="0" dirty="0" err="1" smtClean="0"/>
-              <a:t>css</a:t>
+              <a:t>setInterval</a:t>
             </a:r>
             <a:r>
               <a:rPr lang="en-US" baseline="0" dirty="0" smtClean="0"/>
-              <a:t>(Basic, dark </a:t>
-            </a:r>
-            <a:r>
-              <a:rPr lang="en-US" baseline="0" dirty="0" err="1" smtClean="0"/>
-              <a:t>colour</a:t>
-            </a:r>
+              <a:t> (done)</a:t>
+            </a:r>
+          </a:p>
+          <a:p>
             <a:r>
               <a:rPr lang="en-US" baseline="0" dirty="0" smtClean="0"/>
-              <a:t>)</a:t>
+              <a:t>Threading – calculate rest time (done)</a:t>
             </a:r>
           </a:p>
           <a:p>
             <a:r>
               <a:rPr lang="en-US" baseline="0" dirty="0" smtClean="0"/>
-              <a:t>Apply CSP rules on the app, &lt;meta&gt; tag!!!!!!!</a:t>
-            </a:r>
-          </a:p>
-          <a:p>
-            <a:endParaRPr lang="en-US" baseline="0" dirty="0" smtClean="0"/>
-          </a:p>
-          <a:p>
-            <a:r>
-              <a:rPr lang="en-US" baseline="0" dirty="0" smtClean="0"/>
-              <a:t>Task sorting in the task container component.</a:t>
-            </a:r>
-            <a:endParaRPr lang="en-US" dirty="0"/>
+              <a:t>Timer test (done)</a:t>
+            </a:r>
           </a:p>
         </p:txBody>
       </p:sp>
@@ -3534,7 +3491,7 @@
           <a:p>
             <a:fld id="{7E7CBEC1-F5FB-4BFE-AF15-5C1A6E9B4F82}" type="slidenum">
               <a:rPr lang="en-US" smtClean="0"/>
-              <a:t>5</a:t>
+              <a:t>4</a:t>
             </a:fld>
             <a:endParaRPr lang="en-US"/>
           </a:p>
@@ -3543,7 +3500,7 @@
     </p:spTree>
     <p:extLst>
       <p:ext uri="{BB962C8B-B14F-4D97-AF65-F5344CB8AC3E}">
-        <p14:creationId xmlns:p14="http://schemas.microsoft.com/office/powerpoint/2010/main" val="2477214928"/>
+        <p14:creationId xmlns:p14="http://schemas.microsoft.com/office/powerpoint/2010/main" val="2516751226"/>
       </p:ext>
     </p:extLst>
   </p:cSld>
@@ -3598,6 +3555,210 @@
           <a:lstStyle/>
           <a:p>
             <a:r>
+              <a:rPr lang="en-US" dirty="0" err="1" smtClean="0"/>
+              <a:t>Thema</a:t>
+            </a:r>
+            <a:r>
+              <a:rPr lang="en-US" dirty="0" smtClean="0"/>
+              <a:t>,</a:t>
+            </a:r>
+            <a:r>
+              <a:rPr lang="en-US" baseline="0" dirty="0" smtClean="0"/>
+              <a:t> </a:t>
+            </a:r>
+            <a:r>
+              <a:rPr lang="en-US" baseline="0" dirty="0" err="1" smtClean="0"/>
+              <a:t>css</a:t>
+            </a:r>
+            <a:r>
+              <a:rPr lang="en-US" baseline="0" dirty="0" smtClean="0"/>
+              <a:t>(Basic, dark </a:t>
+            </a:r>
+            <a:r>
+              <a:rPr lang="en-US" baseline="0" dirty="0" err="1" smtClean="0"/>
+              <a:t>colour</a:t>
+            </a:r>
+            <a:r>
+              <a:rPr lang="en-US" baseline="0" dirty="0" smtClean="0"/>
+              <a:t>) – sass-</a:t>
+            </a:r>
+            <a:r>
+              <a:rPr lang="en-US" baseline="0" dirty="0" err="1" smtClean="0"/>
+              <a:t>css</a:t>
+            </a:r>
+            <a:endParaRPr lang="en-US" baseline="0" dirty="0" smtClean="0"/>
+          </a:p>
+          <a:p>
+            <a:r>
+              <a:rPr lang="en-US" baseline="0" dirty="0" smtClean="0"/>
+              <a:t>*   Radio button (done)</a:t>
+            </a:r>
+          </a:p>
+          <a:p>
+            <a:pPr marL="171450" indent="-171450">
+              <a:buFont typeface="Arial" panose="020B0604020202020204" pitchFamily="34" charset="0"/>
+              <a:buChar char="•"/>
+            </a:pPr>
+            <a:r>
+              <a:rPr lang="en-US" baseline="0" dirty="0" smtClean="0"/>
+              <a:t>Default: light (done)</a:t>
+            </a:r>
+          </a:p>
+          <a:p>
+            <a:pPr marL="171450" indent="-171450">
+              <a:buFont typeface="Arial" panose="020B0604020202020204" pitchFamily="34" charset="0"/>
+              <a:buChar char="•"/>
+            </a:pPr>
+            <a:r>
+              <a:rPr lang="en-US" baseline="0" dirty="0" smtClean="0"/>
+              <a:t>Dark (done)</a:t>
+            </a:r>
+          </a:p>
+          <a:p>
+            <a:pPr marL="171450" indent="-171450">
+              <a:buFont typeface="Arial" panose="020B0604020202020204" pitchFamily="34" charset="0"/>
+              <a:buChar char="•"/>
+            </a:pPr>
+            <a:r>
+              <a:rPr lang="en-US" baseline="0" dirty="0" err="1" smtClean="0"/>
+              <a:t>BlueDragon</a:t>
+            </a:r>
+            <a:r>
+              <a:rPr lang="en-US" baseline="0" dirty="0" smtClean="0"/>
+              <a:t> (done)</a:t>
+            </a:r>
+            <a:endParaRPr lang="en-US" baseline="0" dirty="0" smtClean="0"/>
+          </a:p>
+          <a:p>
+            <a:pPr marL="171450" indent="-171450">
+              <a:buFont typeface="Arial" panose="020B0604020202020204" pitchFamily="34" charset="0"/>
+              <a:buChar char="•"/>
+            </a:pPr>
+            <a:r>
+              <a:rPr lang="en-US" baseline="0" dirty="0" smtClean="0"/>
+              <a:t>Test cases (done</a:t>
+            </a:r>
+            <a:r>
+              <a:rPr lang="en-US" baseline="0" dirty="0" smtClean="0"/>
+              <a:t>)</a:t>
+            </a:r>
+          </a:p>
+          <a:p>
+            <a:pPr marL="171450" indent="-171450">
+              <a:buFont typeface="Arial" panose="020B0604020202020204" pitchFamily="34" charset="0"/>
+              <a:buChar char="•"/>
+            </a:pPr>
+            <a:endParaRPr lang="en-US" baseline="0" dirty="0" smtClean="0"/>
+          </a:p>
+          <a:p>
+            <a:pPr marL="171450" indent="-171450">
+              <a:buFont typeface="Arial" panose="020B0604020202020204" pitchFamily="34" charset="0"/>
+              <a:buChar char="•"/>
+            </a:pPr>
+            <a:r>
+              <a:rPr lang="en-US" baseline="0" dirty="0" smtClean="0"/>
+              <a:t>Style </a:t>
+            </a:r>
+            <a:r>
+              <a:rPr lang="en-US" baseline="0" smtClean="0"/>
+              <a:t>manger service (done)</a:t>
+            </a:r>
+            <a:endParaRPr lang="en-US" baseline="0" dirty="0" smtClean="0"/>
+          </a:p>
+          <a:p>
+            <a:pPr marL="171450" indent="-171450">
+              <a:buFont typeface="Arial" panose="020B0604020202020204" pitchFamily="34" charset="0"/>
+              <a:buChar char="•"/>
+            </a:pPr>
+            <a:r>
+              <a:rPr lang="en-US" baseline="0" dirty="0" smtClean="0"/>
+              <a:t>Unit test cases (done)</a:t>
+            </a:r>
+            <a:endParaRPr lang="en-US" baseline="0" dirty="0" smtClean="0"/>
+          </a:p>
+        </p:txBody>
+      </p:sp>
+      <p:sp>
+        <p:nvSpPr>
+          <p:cNvPr id="4" name="Dia számának helye 3"/>
+          <p:cNvSpPr>
+            <a:spLocks noGrp="1"/>
+          </p:cNvSpPr>
+          <p:nvPr>
+            <p:ph type="sldNum" sz="quarter" idx="10"/>
+          </p:nvPr>
+        </p:nvSpPr>
+        <p:spPr/>
+        <p:txBody>
+          <a:bodyPr/>
+          <a:lstStyle/>
+          <a:p>
+            <a:fld id="{7E7CBEC1-F5FB-4BFE-AF15-5C1A6E9B4F82}" type="slidenum">
+              <a:rPr lang="en-US" smtClean="0"/>
+              <a:t>5</a:t>
+            </a:fld>
+            <a:endParaRPr lang="en-US"/>
+          </a:p>
+        </p:txBody>
+      </p:sp>
+    </p:spTree>
+    <p:extLst>
+      <p:ext uri="{BB962C8B-B14F-4D97-AF65-F5344CB8AC3E}">
+        <p14:creationId xmlns:p14="http://schemas.microsoft.com/office/powerpoint/2010/main" val="2477214928"/>
+      </p:ext>
+    </p:extLst>
+  </p:cSld>
+  <p:clrMapOvr>
+    <a:masterClrMapping/>
+  </p:clrMapOvr>
+</p:notes>
+</file>
+
+<file path=ppt/notesSlides/notesSlide5.xml><?xml version="1.0" encoding="utf-8"?>
+<p:notes xmlns:a="http://schemas.openxmlformats.org/drawingml/2006/main" xmlns:r="http://schemas.openxmlformats.org/officeDocument/2006/relationships" xmlns:p="http://schemas.openxmlformats.org/presentationml/2006/main">
+  <p:cSld>
+    <p:spTree>
+      <p:nvGrpSpPr>
+        <p:cNvPr id="1" name=""/>
+        <p:cNvGrpSpPr/>
+        <p:nvPr/>
+      </p:nvGrpSpPr>
+      <p:grpSpPr>
+        <a:xfrm>
+          <a:off x="0" y="0"/>
+          <a:ext cx="0" cy="0"/>
+          <a:chOff x="0" y="0"/>
+          <a:chExt cx="0" cy="0"/>
+        </a:xfrm>
+      </p:grpSpPr>
+      <p:sp>
+        <p:nvSpPr>
+          <p:cNvPr id="2" name="Diakép helye 1"/>
+          <p:cNvSpPr>
+            <a:spLocks noGrp="1" noRot="1" noChangeAspect="1"/>
+          </p:cNvSpPr>
+          <p:nvPr>
+            <p:ph type="sldImg"/>
+          </p:nvPr>
+        </p:nvSpPr>
+        <p:spPr/>
+      </p:sp>
+      <p:sp>
+        <p:nvSpPr>
+          <p:cNvPr id="3" name="Jegyzetek helye 2"/>
+          <p:cNvSpPr>
+            <a:spLocks noGrp="1"/>
+          </p:cNvSpPr>
+          <p:nvPr>
+            <p:ph type="body" idx="1"/>
+          </p:nvPr>
+        </p:nvSpPr>
+        <p:spPr/>
+        <p:txBody>
+          <a:bodyPr/>
+          <a:lstStyle/>
+          <a:p>
+            <a:r>
               <a:rPr lang="en-US" dirty="0" smtClean="0"/>
               <a:t>Overwhelmed</a:t>
             </a:r>
@@ -3788,13 +3949,8 @@
             </a:pPr>
             <a:r>
               <a:rPr lang="en-US" baseline="0" dirty="0" smtClean="0"/>
-              <a:t>Timer: showing progress </a:t>
-            </a:r>
-            <a:r>
-              <a:rPr lang="en-US" baseline="0" dirty="0" smtClean="0"/>
-              <a:t>bar (done)</a:t>
-            </a:r>
-            <a:endParaRPr lang="en-US" baseline="0" dirty="0" smtClean="0"/>
+              <a:t>Timer: showing progress bar (done)</a:t>
+            </a:r>
           </a:p>
           <a:p>
             <a:pPr marL="171450" indent="-171450">
@@ -3811,13 +3967,8 @@
             </a:r>
             <a:r>
               <a:rPr lang="en-US" baseline="0" dirty="0" smtClean="0"/>
-              <a:t>, not get new </a:t>
-            </a:r>
-            <a:r>
-              <a:rPr lang="en-US" baseline="0" dirty="0" smtClean="0"/>
-              <a:t>value (done)</a:t>
-            </a:r>
-            <a:endParaRPr lang="en-US" baseline="0" dirty="0" smtClean="0"/>
+              <a:t>, not get new value (done)</a:t>
+            </a:r>
           </a:p>
         </p:txBody>
       </p:sp>
@@ -3857,7 +4008,7 @@
 </p:notes>
 </file>
 
-<file path=ppt/notesSlides/notesSlide5.xml><?xml version="1.0" encoding="utf-8"?>
+<file path=ppt/notesSlides/notesSlide6.xml><?xml version="1.0" encoding="utf-8"?>
 <p:notes xmlns:a="http://schemas.openxmlformats.org/drawingml/2006/main" xmlns:r="http://schemas.openxmlformats.org/officeDocument/2006/relationships" xmlns:p="http://schemas.openxmlformats.org/presentationml/2006/main">
   <p:cSld>
     <p:spTree>
@@ -4072,7 +4223,7 @@
           <a:p>
             <a:fld id="{8E031A97-C5A4-4558-8890-FA2925244C4F}" type="datetime3">
               <a:rPr lang="en-US" smtClean="0"/>
-              <a:t>2 July 2022</a:t>
+              <a:t>17 July 2022</a:t>
             </a:fld>
             <a:endParaRPr lang="en-US"/>
           </a:p>
@@ -4246,7 +4397,7 @@
           <a:p>
             <a:fld id="{156D25A5-2131-4D11-8DF2-BFE448E0C6C4}" type="datetime3">
               <a:rPr lang="en-US" smtClean="0"/>
-              <a:t>2 July 2022</a:t>
+              <a:t>17 July 2022</a:t>
             </a:fld>
             <a:endParaRPr lang="en-US"/>
           </a:p>
@@ -4430,7 +4581,7 @@
           <a:p>
             <a:fld id="{741DCA71-90D2-471A-B4F6-D63D3144D802}" type="datetime3">
               <a:rPr lang="en-US" smtClean="0"/>
-              <a:t>2 July 2022</a:t>
+              <a:t>17 July 2022</a:t>
             </a:fld>
             <a:endParaRPr lang="en-US"/>
           </a:p>
@@ -4604,7 +4755,7 @@
           <a:p>
             <a:fld id="{859B4CCA-7A49-40BA-AA87-E36D3C1B74CD}" type="datetime3">
               <a:rPr lang="en-US" smtClean="0"/>
-              <a:t>2 July 2022</a:t>
+              <a:t>17 July 2022</a:t>
             </a:fld>
             <a:endParaRPr lang="en-US"/>
           </a:p>
@@ -4854,7 +5005,7 @@
           <a:p>
             <a:fld id="{00C05CC3-8230-4750-BEE6-66D4A1F33F0F}" type="datetime3">
               <a:rPr lang="en-US" smtClean="0"/>
-              <a:t>2 July 2022</a:t>
+              <a:t>17 July 2022</a:t>
             </a:fld>
             <a:endParaRPr lang="en-US"/>
           </a:p>
@@ -5090,7 +5241,7 @@
           <a:p>
             <a:fld id="{3DEBFD87-4EA2-4600-AB37-3AFC3D80519A}" type="datetime3">
               <a:rPr lang="en-US" smtClean="0"/>
-              <a:t>2 July 2022</a:t>
+              <a:t>17 July 2022</a:t>
             </a:fld>
             <a:endParaRPr lang="en-US"/>
           </a:p>
@@ -5461,7 +5612,7 @@
           <a:p>
             <a:fld id="{A72CEC32-E708-4316-8666-BA8BF9722CA0}" type="datetime3">
               <a:rPr lang="en-US" smtClean="0"/>
-              <a:t>2 July 2022</a:t>
+              <a:t>17 July 2022</a:t>
             </a:fld>
             <a:endParaRPr lang="en-US"/>
           </a:p>
@@ -5583,7 +5734,7 @@
           <a:p>
             <a:fld id="{7CF1C314-8D6F-4732-88D4-94FF05CBB104}" type="datetime3">
               <a:rPr lang="en-US" smtClean="0"/>
-              <a:t>2 July 2022</a:t>
+              <a:t>17 July 2022</a:t>
             </a:fld>
             <a:endParaRPr lang="en-US"/>
           </a:p>
@@ -5682,7 +5833,7 @@
           <a:p>
             <a:fld id="{47DA11E4-27AF-4B9F-BEF3-3CA15041E18E}" type="datetime3">
               <a:rPr lang="en-US" smtClean="0"/>
-              <a:t>2 July 2022</a:t>
+              <a:t>17 July 2022</a:t>
             </a:fld>
             <a:endParaRPr lang="en-US"/>
           </a:p>
@@ -5963,7 +6114,7 @@
           <a:p>
             <a:fld id="{E2C02590-7F59-421C-A745-32233A68051D}" type="datetime3">
               <a:rPr lang="en-US" smtClean="0"/>
-              <a:t>2 July 2022</a:t>
+              <a:t>17 July 2022</a:t>
             </a:fld>
             <a:endParaRPr lang="en-US"/>
           </a:p>
@@ -6220,7 +6371,7 @@
           <a:p>
             <a:fld id="{84AF07D1-C31F-46EF-9183-DC77B1A31FFA}" type="datetime3">
               <a:rPr lang="en-US" smtClean="0"/>
-              <a:t>2 July 2022</a:t>
+              <a:t>17 July 2022</a:t>
             </a:fld>
             <a:endParaRPr lang="en-US"/>
           </a:p>
@@ -6442,7 +6593,7 @@
           <a:p>
             <a:fld id="{9D694A8E-69FB-424F-BB61-8EE202972235}" type="datetime3">
               <a:rPr lang="en-US" smtClean="0"/>
-              <a:t>2 July 2022</a:t>
+              <a:t>17 July 2022</a:t>
             </a:fld>
             <a:endParaRPr lang="en-US"/>
           </a:p>
@@ -6892,13 +7043,13 @@
         </p:nvSpPr>
         <p:spPr>
           <a:xfrm>
-            <a:off x="388238" y="2447875"/>
-            <a:ext cx="5060061" cy="3771950"/>
+            <a:off x="388238" y="2447874"/>
+            <a:ext cx="5060061" cy="3908475"/>
           </a:xfrm>
         </p:spPr>
         <p:txBody>
           <a:bodyPr>
-            <a:normAutofit fontScale="92500" lnSpcReduction="20000"/>
+            <a:normAutofit fontScale="85000" lnSpcReduction="10000"/>
           </a:bodyPr>
           <a:lstStyle/>
           <a:p>
@@ -6969,8 +7120,27 @@
             </a:r>
             <a:r>
               <a:rPr lang="en-US" sz="2600" dirty="0" smtClean="0"/>
-              <a:t>– responsive site(Mobile, pc)</a:t>
-            </a:r>
+              <a:t>– responsive site(Mobile, pc</a:t>
+            </a:r>
+            <a:r>
+              <a:rPr lang="en-US" sz="2600" dirty="0" smtClean="0"/>
+              <a:t>)</a:t>
+            </a:r>
+          </a:p>
+          <a:p>
+            <a:pPr marL="342900" indent="-342900" algn="l">
+              <a:buFont typeface="Arial" panose="020B0604020202020204" pitchFamily="34" charset="0"/>
+              <a:buChar char="•"/>
+            </a:pPr>
+            <a:r>
+              <a:rPr lang="en-US" sz="2600" dirty="0" smtClean="0"/>
+              <a:t>Sass </a:t>
+            </a:r>
+            <a:r>
+              <a:rPr lang="en-US" sz="2600" dirty="0" err="1" smtClean="0"/>
+              <a:t>css</a:t>
+            </a:r>
+            <a:endParaRPr lang="en-US" sz="2600" dirty="0" smtClean="0"/>
           </a:p>
           <a:p>
             <a:pPr marL="342900" indent="-342900" algn="l">
@@ -7174,7 +7344,7 @@
           <a:p>
             <a:fld id="{EE2F860A-D2E4-4785-9C60-B1A9A50464B3}" type="datetime3">
               <a:rPr lang="en-US" smtClean="0"/>
-              <a:t>2 July 2022</a:t>
+              <a:t>17 July 2022</a:t>
             </a:fld>
             <a:endParaRPr lang="en-US"/>
           </a:p>
@@ -7421,7 +7591,7 @@
           <a:p>
             <a:fld id="{859B4CCA-7A49-40BA-AA87-E36D3C1B74CD}" type="datetime3">
               <a:rPr lang="en-US" smtClean="0"/>
-              <a:t>2 July 2022</a:t>
+              <a:t>17 July 2022</a:t>
             </a:fld>
             <a:endParaRPr lang="en-US"/>
           </a:p>
@@ -7780,7 +7950,7 @@
           <a:p>
             <a:fld id="{A9402B09-ED4A-4B63-89C4-3E1E373D49A6}" type="datetime3">
               <a:rPr lang="en-US" smtClean="0"/>
-              <a:t>2 July 2022</a:t>
+              <a:t>17 July 2022</a:t>
             </a:fld>
             <a:endParaRPr lang="en-US"/>
           </a:p>
@@ -8448,7 +8618,7 @@
           <a:p>
             <a:fld id="{F14D243E-DB4A-407C-AFAE-0BC32BA45E9E}" type="datetime3">
               <a:rPr lang="en-US" smtClean="0"/>
-              <a:t>2 July 2022</a:t>
+              <a:t>17 July 2022</a:t>
             </a:fld>
             <a:endParaRPr lang="en-US"/>
           </a:p>
@@ -10702,7 +10872,7 @@
           <a:p>
             <a:fld id="{D1ADE0D0-F6AA-4072-9326-915F27F2EB27}" type="datetime3">
               <a:rPr lang="en-US" smtClean="0"/>
-              <a:t>2 July 2022</a:t>
+              <a:t>17 July 2022</a:t>
             </a:fld>
             <a:endParaRPr lang="en-US" dirty="0"/>
           </a:p>
@@ -10943,7 +11113,7 @@
           <a:p>
             <a:fld id="{C4DDBBDB-B7E6-470C-8F06-93D4F09ACFE1}" type="datetime3">
               <a:rPr lang="en-US" smtClean="0"/>
-              <a:t>2 July 2022</a:t>
+              <a:t>17 July 2022</a:t>
             </a:fld>
             <a:endParaRPr lang="en-US"/>
           </a:p>
@@ -11662,7 +11832,7 @@
           <a:p>
             <a:fld id="{859B4CCA-7A49-40BA-AA87-E36D3C1B74CD}" type="datetime3">
               <a:rPr lang="en-US" smtClean="0"/>
-              <a:t>2 July 2022</a:t>
+              <a:t>17 July 2022</a:t>
             </a:fld>
             <a:endParaRPr lang="en-US"/>
           </a:p>
@@ -11921,7 +12091,7 @@
           <a:p>
             <a:fld id="{859B4CCA-7A49-40BA-AA87-E36D3C1B74CD}" type="datetime3">
               <a:rPr lang="en-US" smtClean="0"/>
-              <a:t>2 July 2022</a:t>
+              <a:t>17 July 2022</a:t>
             </a:fld>
             <a:endParaRPr lang="en-US"/>
           </a:p>
@@ -12058,15 +12228,7 @@
             </a:pPr>
             <a:r>
               <a:rPr lang="en-US" dirty="0" smtClean="0"/>
-              <a:t>* Worker: service-worker, proxy </a:t>
-            </a:r>
-            <a:r>
-              <a:rPr lang="en-US" dirty="0" err="1" smtClean="0"/>
-              <a:t>connetciton</a:t>
-            </a:r>
-            <a:r>
-              <a:rPr lang="en-US" dirty="0" smtClean="0"/>
-              <a:t> between app and API</a:t>
+              <a:t>* Worker: service-worker, proxy connection between app and API</a:t>
             </a:r>
             <a:endParaRPr lang="en-US" dirty="0"/>
           </a:p>
@@ -12089,7 +12251,7 @@
           <a:p>
             <a:fld id="{859B4CCA-7A49-40BA-AA87-E36D3C1B74CD}" type="datetime3">
               <a:rPr lang="en-US" smtClean="0"/>
-              <a:t>2 July 2022</a:t>
+              <a:t>17 July 2022</a:t>
             </a:fld>
             <a:endParaRPr lang="en-US"/>
           </a:p>

</xml_diff>

<commit_message>
ppt plan updated, dev is done
</commit_message>
<xml_diff>
--- a/plan/TaskTracingApp.pptx
+++ b/plan/TaskTracingApp.pptx
@@ -2763,7 +2763,7 @@
           <a:p>
             <a:fld id="{5EBE3839-043F-4D6A-BB69-1C2CEF42D310}" type="datetimeFigureOut">
               <a:rPr lang="en-US" smtClean="0"/>
-              <a:t>7/17/2022</a:t>
+              <a:t>7/22/2022</a:t>
             </a:fld>
             <a:endParaRPr lang="en-US"/>
           </a:p>
@@ -3160,28 +3160,18 @@
           <a:lstStyle/>
           <a:p>
             <a:r>
-              <a:rPr lang="en-US" dirty="0" err="1" smtClean="0"/>
-              <a:t>AlertWindow</a:t>
-            </a:r>
-            <a:r>
-              <a:rPr lang="en-US" dirty="0" smtClean="0"/>
-              <a:t>, with service with test (done)</a:t>
-            </a:r>
-          </a:p>
-          <a:p>
-            <a:r>
               <a:rPr lang="en-US" baseline="0" dirty="0" smtClean="0"/>
-              <a:t>Validators test by reactive form, </a:t>
+              <a:t>Duplication </a:t>
             </a:r>
             <a:r>
               <a:rPr lang="en-US" baseline="0" dirty="0" err="1" smtClean="0"/>
-              <a:t>formGroup</a:t>
+              <a:t>scss</a:t>
             </a:r>
             <a:r>
               <a:rPr lang="en-US" baseline="0" dirty="0" smtClean="0"/>
-              <a:t> (done)</a:t>
-            </a:r>
-            <a:endParaRPr lang="en-US" dirty="0" smtClean="0"/>
+              <a:t> problem via build</a:t>
+            </a:r>
+            <a:endParaRPr lang="en-US" dirty="0"/>
           </a:p>
         </p:txBody>
       </p:sp>
@@ -3202,7 +3192,7 @@
           <a:p>
             <a:fld id="{7E7CBEC1-F5FB-4BFE-AF15-5C1A6E9B4F82}" type="slidenum">
               <a:rPr lang="en-US" smtClean="0"/>
-              <a:t>3</a:t>
+              <a:t>2</a:t>
             </a:fld>
             <a:endParaRPr lang="en-US"/>
           </a:p>
@@ -3211,7 +3201,7 @@
     </p:spTree>
     <p:extLst>
       <p:ext uri="{BB962C8B-B14F-4D97-AF65-F5344CB8AC3E}">
-        <p14:creationId xmlns:p14="http://schemas.microsoft.com/office/powerpoint/2010/main" val="1522419581"/>
+        <p14:creationId xmlns:p14="http://schemas.microsoft.com/office/powerpoint/2010/main" val="396412539"/>
       </p:ext>
     </p:extLst>
   </p:cSld>
@@ -3266,210 +3256,104 @@
           <a:lstStyle/>
           <a:p>
             <a:r>
+              <a:rPr lang="en-US" dirty="0" err="1" smtClean="0"/>
+              <a:t>AlertWindow</a:t>
+            </a:r>
+            <a:r>
               <a:rPr lang="en-US" dirty="0" smtClean="0"/>
-              <a:t>Each</a:t>
-            </a:r>
+              <a:t>, with service with test (done)</a:t>
+            </a:r>
+          </a:p>
+          <a:p>
             <a:r>
               <a:rPr lang="en-US" baseline="0" dirty="0" smtClean="0"/>
-              <a:t> menu item: contains the icon and text</a:t>
-            </a:r>
-          </a:p>
-          <a:p>
+              <a:t>Validators test by reactive form, </a:t>
+            </a:r>
+            <a:r>
+              <a:rPr lang="en-US" baseline="0" dirty="0" err="1" smtClean="0"/>
+              <a:t>formGroup</a:t>
+            </a:r>
             <a:r>
               <a:rPr lang="en-US" baseline="0" dirty="0" smtClean="0"/>
-              <a:t>Task service, test (done)</a:t>
-            </a:r>
-          </a:p>
-          <a:p>
+              <a:t> (done</a:t>
+            </a:r>
             <a:r>
               <a:rPr lang="en-US" baseline="0" dirty="0" smtClean="0"/>
-              <a:t>Task-card selection: highlight with directive, test (done)</a:t>
-            </a:r>
-          </a:p>
-          <a:p>
-            <a:r>
-              <a:rPr lang="en-US" baseline="0" dirty="0" smtClean="0"/>
-              <a:t>---</a:t>
-            </a:r>
-          </a:p>
-          <a:p>
-            <a:r>
-              <a:rPr lang="en-US" baseline="0" dirty="0" smtClean="0"/>
-              <a:t>Limit: 10 tasks (done)</a:t>
-            </a:r>
-          </a:p>
-          <a:p>
-            <a:r>
-              <a:rPr lang="en-US" baseline="0" dirty="0" smtClean="0"/>
-              <a:t>Task edit, new form (done)</a:t>
-            </a:r>
-          </a:p>
-          <a:p>
-            <a:r>
-              <a:rPr lang="en-US" baseline="0" dirty="0" smtClean="0"/>
-              <a:t>Directive: edit -&gt; close button (done)</a:t>
-            </a:r>
-          </a:p>
-          <a:p>
-            <a:r>
-              <a:rPr lang="en-US" baseline="0" dirty="0" smtClean="0"/>
-              <a:t>Saving bug fixed (done)</a:t>
-            </a:r>
-          </a:p>
-          <a:p>
-            <a:r>
-              <a:rPr lang="en-US" baseline="0" dirty="0" smtClean="0"/>
-              <a:t>Date, status filtering (done)</a:t>
-            </a:r>
-          </a:p>
-          <a:p>
-            <a:r>
-              <a:rPr lang="en-US" baseline="0" dirty="0" smtClean="0"/>
-              <a:t>-----</a:t>
-            </a:r>
-          </a:p>
-          <a:p>
-            <a:pPr marL="0" marR="0" indent="0" algn="l" defTabSz="914400" rtl="0" eaLnBrk="1" fontAlgn="auto" latinLnBrk="0" hangingPunct="1">
-              <a:lnSpc>
-                <a:spcPct val="100000"/>
-              </a:lnSpc>
-              <a:spcBef>
-                <a:spcPts val="0"/>
-              </a:spcBef>
-              <a:spcAft>
-                <a:spcPts val="0"/>
-              </a:spcAft>
-              <a:buClrTx/>
-              <a:buSzTx/>
+              <a:t>)</a:t>
+            </a:r>
+          </a:p>
+          <a:p>
+            <a:endParaRPr lang="en-US" baseline="0" dirty="0" smtClean="0"/>
+          </a:p>
+          <a:p>
+            <a:pPr marL="0" indent="0">
               <a:buFontTx/>
               <a:buNone/>
-              <a:tabLst/>
-              <a:defRPr/>
             </a:pPr>
             <a:r>
               <a:rPr lang="en-US" baseline="0" dirty="0" smtClean="0"/>
-              <a:t>Highlight directive test (done)</a:t>
-            </a:r>
-          </a:p>
-          <a:p>
-            <a:pPr marL="0" marR="0" indent="0" algn="l" defTabSz="914400" rtl="0" eaLnBrk="1" fontAlgn="auto" latinLnBrk="0" hangingPunct="1">
-              <a:lnSpc>
-                <a:spcPct val="100000"/>
-              </a:lnSpc>
-              <a:spcBef>
-                <a:spcPts val="0"/>
-              </a:spcBef>
-              <a:spcAft>
-                <a:spcPts val="0"/>
-              </a:spcAft>
-              <a:buClrTx/>
-              <a:buSzTx/>
+              <a:t>“Where would you like to store data?”</a:t>
+            </a:r>
+          </a:p>
+          <a:p>
+            <a:pPr marL="0" indent="0">
               <a:buFontTx/>
               <a:buNone/>
-              <a:tabLst/>
-              <a:defRPr/>
             </a:pPr>
             <a:r>
               <a:rPr lang="en-US" baseline="0" dirty="0" smtClean="0"/>
-              <a:t>Input-border directive test (done)</a:t>
-            </a:r>
-          </a:p>
-          <a:p>
-            <a:pPr marL="0" marR="0" indent="0" algn="l" defTabSz="914400" rtl="0" eaLnBrk="1" fontAlgn="auto" latinLnBrk="0" hangingPunct="1">
-              <a:lnSpc>
-                <a:spcPct val="100000"/>
-              </a:lnSpc>
-              <a:spcBef>
-                <a:spcPts val="0"/>
-              </a:spcBef>
-              <a:spcAft>
-                <a:spcPts val="0"/>
-              </a:spcAft>
-              <a:buClrTx/>
-              <a:buSzTx/>
+              <a:t>   - It means </a:t>
+            </a:r>
+            <a:r>
+              <a:rPr lang="en-US" baseline="0" dirty="0" err="1" smtClean="0"/>
+              <a:t>task.json</a:t>
+            </a:r>
+            <a:r>
+              <a:rPr lang="en-US" baseline="0" dirty="0" smtClean="0"/>
+              <a:t> </a:t>
+            </a:r>
+            <a:r>
+              <a:rPr lang="en-US" baseline="0" dirty="0" err="1" smtClean="0"/>
+              <a:t>struct</a:t>
+            </a:r>
+            <a:r>
+              <a:rPr lang="en-US" baseline="0" dirty="0" smtClean="0"/>
+              <a:t> in one week.</a:t>
+            </a:r>
+          </a:p>
+          <a:p>
+            <a:pPr marL="0" lvl="0" indent="0">
               <a:buFontTx/>
               <a:buNone/>
-              <a:tabLst/>
-              <a:defRPr/>
             </a:pPr>
-            <a:r>
-              <a:rPr lang="en-US" baseline="0" dirty="0" smtClean="0"/>
-              <a:t>Saving process </a:t>
-            </a:r>
-            <a:r>
-              <a:rPr lang="en-US" baseline="0" dirty="0" err="1" smtClean="0"/>
-              <a:t>def</a:t>
-            </a:r>
-            <a:r>
-              <a:rPr lang="en-US" baseline="0" dirty="0" smtClean="0"/>
-              <a:t> </a:t>
-            </a:r>
-            <a:r>
-              <a:rPr lang="en-US" baseline="0" dirty="0" smtClean="0">
-                <a:sym typeface="Wingdings" panose="05000000000000000000" pitchFamily="2" charset="2"/>
-              </a:rPr>
-              <a:t> </a:t>
-            </a:r>
-            <a:r>
-              <a:rPr lang="en-US" baseline="0" dirty="0" err="1" smtClean="0">
-                <a:sym typeface="Wingdings" panose="05000000000000000000" pitchFamily="2" charset="2"/>
-              </a:rPr>
-              <a:t>exhaustedMap</a:t>
-            </a:r>
-            <a:r>
-              <a:rPr lang="en-US" baseline="0" dirty="0" smtClean="0">
-                <a:sym typeface="Wingdings" panose="05000000000000000000" pitchFamily="2" charset="2"/>
-              </a:rPr>
-              <a:t> (done)</a:t>
-            </a:r>
-          </a:p>
-          <a:p>
-            <a:pPr marL="0" marR="0" indent="0" algn="l" defTabSz="914400" rtl="0" eaLnBrk="1" fontAlgn="auto" latinLnBrk="0" hangingPunct="1">
-              <a:lnSpc>
-                <a:spcPct val="100000"/>
-              </a:lnSpc>
-              <a:spcBef>
-                <a:spcPts val="0"/>
-              </a:spcBef>
-              <a:spcAft>
-                <a:spcPts val="0"/>
-              </a:spcAft>
-              <a:buClrTx/>
-              <a:buSzTx/>
+            <a:endParaRPr lang="en-US" baseline="0" dirty="0" smtClean="0"/>
+          </a:p>
+          <a:p>
+            <a:pPr marL="0" lvl="0" indent="0">
               <a:buFontTx/>
               <a:buNone/>
-              <a:tabLst/>
-              <a:defRPr/>
             </a:pPr>
             <a:r>
               <a:rPr lang="en-US" baseline="0" dirty="0" smtClean="0"/>
-              <a:t>-------------------------------</a:t>
-            </a:r>
-          </a:p>
-          <a:p>
+              <a:t>“Where would you like to store App settings?”</a:t>
+            </a:r>
+          </a:p>
+          <a:p>
+            <a:pPr marL="0" lvl="0" indent="0">
+              <a:buFontTx/>
+              <a:buNone/>
+            </a:pPr>
             <a:r>
               <a:rPr lang="en-US" baseline="0" dirty="0" smtClean="0"/>
-              <a:t>Measuring time, </a:t>
+              <a:t> - </a:t>
             </a:r>
             <a:r>
               <a:rPr lang="en-US" baseline="0" dirty="0" err="1" smtClean="0"/>
-              <a:t>setInterval</a:t>
+              <a:t>Config</a:t>
             </a:r>
             <a:r>
               <a:rPr lang="en-US" baseline="0" dirty="0" smtClean="0"/>
-              <a:t> (done)</a:t>
-            </a:r>
-          </a:p>
-          <a:p>
-            <a:r>
-              <a:rPr lang="en-US" baseline="0" dirty="0" smtClean="0"/>
-              <a:t>Threading – calculate rest time (done)</a:t>
-            </a:r>
-          </a:p>
-          <a:p>
-            <a:r>
-              <a:rPr lang="en-US" baseline="0" dirty="0" smtClean="0"/>
-              <a:t>Timer test (done)</a:t>
+              <a:t> file, theme changes(local app) of App</a:t>
             </a:r>
           </a:p>
         </p:txBody>
@@ -3491,7 +3375,7 @@
           <a:p>
             <a:fld id="{7E7CBEC1-F5FB-4BFE-AF15-5C1A6E9B4F82}" type="slidenum">
               <a:rPr lang="en-US" smtClean="0"/>
-              <a:t>4</a:t>
+              <a:t>3</a:t>
             </a:fld>
             <a:endParaRPr lang="en-US"/>
           </a:p>
@@ -3500,7 +3384,7 @@
     </p:spTree>
     <p:extLst>
       <p:ext uri="{BB962C8B-B14F-4D97-AF65-F5344CB8AC3E}">
-        <p14:creationId xmlns:p14="http://schemas.microsoft.com/office/powerpoint/2010/main" val="2516751226"/>
+        <p14:creationId xmlns:p14="http://schemas.microsoft.com/office/powerpoint/2010/main" val="1522419581"/>
       </p:ext>
     </p:extLst>
   </p:cSld>
@@ -3555,126 +3439,211 @@
           <a:lstStyle/>
           <a:p>
             <a:r>
-              <a:rPr lang="en-US" dirty="0" err="1" smtClean="0"/>
-              <a:t>Thema</a:t>
-            </a:r>
-            <a:r>
               <a:rPr lang="en-US" dirty="0" smtClean="0"/>
-              <a:t>,</a:t>
+              <a:t>Each</a:t>
+            </a:r>
+            <a:r>
+              <a:rPr lang="en-US" baseline="0" dirty="0" smtClean="0"/>
+              <a:t> menu item: contains the icon and text</a:t>
+            </a:r>
+          </a:p>
+          <a:p>
+            <a:r>
+              <a:rPr lang="en-US" baseline="0" dirty="0" smtClean="0"/>
+              <a:t>Task service, test (done)</a:t>
+            </a:r>
+          </a:p>
+          <a:p>
+            <a:r>
+              <a:rPr lang="en-US" baseline="0" dirty="0" smtClean="0"/>
+              <a:t>Task-card selection: highlight with directive, test (done)</a:t>
+            </a:r>
+          </a:p>
+          <a:p>
+            <a:r>
+              <a:rPr lang="en-US" baseline="0" dirty="0" smtClean="0"/>
+              <a:t>---</a:t>
+            </a:r>
+          </a:p>
+          <a:p>
+            <a:r>
+              <a:rPr lang="en-US" baseline="0" dirty="0" smtClean="0"/>
+              <a:t>Limit: 10 tasks (done)</a:t>
+            </a:r>
+          </a:p>
+          <a:p>
+            <a:r>
+              <a:rPr lang="en-US" baseline="0" dirty="0" smtClean="0"/>
+              <a:t>Task edit, new form (done)</a:t>
+            </a:r>
+          </a:p>
+          <a:p>
+            <a:r>
+              <a:rPr lang="en-US" baseline="0" dirty="0" smtClean="0"/>
+              <a:t>Directive: edit -&gt; close button (done)</a:t>
+            </a:r>
+          </a:p>
+          <a:p>
+            <a:r>
+              <a:rPr lang="en-US" baseline="0" dirty="0" smtClean="0"/>
+              <a:t>Saving bug fixed (done)</a:t>
+            </a:r>
+          </a:p>
+          <a:p>
+            <a:r>
+              <a:rPr lang="en-US" baseline="0" dirty="0" smtClean="0"/>
+              <a:t>Date, status filtering (done)</a:t>
+            </a:r>
+          </a:p>
+          <a:p>
+            <a:r>
+              <a:rPr lang="en-US" baseline="0" dirty="0" smtClean="0"/>
+              <a:t>-----</a:t>
+            </a:r>
+          </a:p>
+          <a:p>
+            <a:pPr marL="0" marR="0" indent="0" algn="l" defTabSz="914400" rtl="0" eaLnBrk="1" fontAlgn="auto" latinLnBrk="0" hangingPunct="1">
+              <a:lnSpc>
+                <a:spcPct val="100000"/>
+              </a:lnSpc>
+              <a:spcBef>
+                <a:spcPts val="0"/>
+              </a:spcBef>
+              <a:spcAft>
+                <a:spcPts val="0"/>
+              </a:spcAft>
+              <a:buClrTx/>
+              <a:buSzTx/>
+              <a:buFontTx/>
+              <a:buNone/>
+              <a:tabLst/>
+              <a:defRPr/>
+            </a:pPr>
+            <a:r>
+              <a:rPr lang="en-US" baseline="0" dirty="0" smtClean="0"/>
+              <a:t>Highlight directive test (done)</a:t>
+            </a:r>
+          </a:p>
+          <a:p>
+            <a:pPr marL="0" marR="0" indent="0" algn="l" defTabSz="914400" rtl="0" eaLnBrk="1" fontAlgn="auto" latinLnBrk="0" hangingPunct="1">
+              <a:lnSpc>
+                <a:spcPct val="100000"/>
+              </a:lnSpc>
+              <a:spcBef>
+                <a:spcPts val="0"/>
+              </a:spcBef>
+              <a:spcAft>
+                <a:spcPts val="0"/>
+              </a:spcAft>
+              <a:buClrTx/>
+              <a:buSzTx/>
+              <a:buFontTx/>
+              <a:buNone/>
+              <a:tabLst/>
+              <a:defRPr/>
+            </a:pPr>
+            <a:r>
+              <a:rPr lang="en-US" baseline="0" dirty="0" smtClean="0"/>
+              <a:t>Input-border directive test (done)</a:t>
+            </a:r>
+          </a:p>
+          <a:p>
+            <a:pPr marL="0" marR="0" indent="0" algn="l" defTabSz="914400" rtl="0" eaLnBrk="1" fontAlgn="auto" latinLnBrk="0" hangingPunct="1">
+              <a:lnSpc>
+                <a:spcPct val="100000"/>
+              </a:lnSpc>
+              <a:spcBef>
+                <a:spcPts val="0"/>
+              </a:spcBef>
+              <a:spcAft>
+                <a:spcPts val="0"/>
+              </a:spcAft>
+              <a:buClrTx/>
+              <a:buSzTx/>
+              <a:buFontTx/>
+              <a:buNone/>
+              <a:tabLst/>
+              <a:defRPr/>
+            </a:pPr>
+            <a:r>
+              <a:rPr lang="en-US" baseline="0" dirty="0" smtClean="0"/>
+              <a:t>Saving process </a:t>
+            </a:r>
+            <a:r>
+              <a:rPr lang="en-US" baseline="0" dirty="0" err="1" smtClean="0"/>
+              <a:t>def</a:t>
             </a:r>
             <a:r>
               <a:rPr lang="en-US" baseline="0" dirty="0" smtClean="0"/>
               <a:t> </a:t>
             </a:r>
             <a:r>
+              <a:rPr lang="en-US" baseline="0" dirty="0" smtClean="0">
+                <a:sym typeface="Wingdings" panose="05000000000000000000" pitchFamily="2" charset="2"/>
+              </a:rPr>
+              <a:t> </a:t>
+            </a:r>
+            <a:r>
+              <a:rPr lang="en-US" baseline="0" dirty="0" err="1" smtClean="0">
+                <a:sym typeface="Wingdings" panose="05000000000000000000" pitchFamily="2" charset="2"/>
+              </a:rPr>
+              <a:t>exhaustedMap</a:t>
+            </a:r>
+            <a:r>
+              <a:rPr lang="en-US" baseline="0" dirty="0" smtClean="0">
+                <a:sym typeface="Wingdings" panose="05000000000000000000" pitchFamily="2" charset="2"/>
+              </a:rPr>
+              <a:t> (done)</a:t>
+            </a:r>
+          </a:p>
+          <a:p>
+            <a:pPr marL="0" marR="0" indent="0" algn="l" defTabSz="914400" rtl="0" eaLnBrk="1" fontAlgn="auto" latinLnBrk="0" hangingPunct="1">
+              <a:lnSpc>
+                <a:spcPct val="100000"/>
+              </a:lnSpc>
+              <a:spcBef>
+                <a:spcPts val="0"/>
+              </a:spcBef>
+              <a:spcAft>
+                <a:spcPts val="0"/>
+              </a:spcAft>
+              <a:buClrTx/>
+              <a:buSzTx/>
+              <a:buFontTx/>
+              <a:buNone/>
+              <a:tabLst/>
+              <a:defRPr/>
+            </a:pPr>
+            <a:r>
+              <a:rPr lang="en-US" baseline="0" dirty="0" smtClean="0"/>
+              <a:t>-------------------------------</a:t>
+            </a:r>
+          </a:p>
+          <a:p>
+            <a:r>
+              <a:rPr lang="en-US" baseline="0" dirty="0" smtClean="0"/>
+              <a:t>Measuring time, </a:t>
+            </a:r>
+            <a:r>
               <a:rPr lang="en-US" baseline="0" dirty="0" err="1" smtClean="0"/>
-              <a:t>css</a:t>
-            </a:r>
-            <a:r>
-              <a:rPr lang="en-US" baseline="0" dirty="0" smtClean="0"/>
-              <a:t>(Basic, dark </a:t>
-            </a:r>
-            <a:r>
-              <a:rPr lang="en-US" baseline="0" dirty="0" err="1" smtClean="0"/>
-              <a:t>colour</a:t>
-            </a:r>
-            <a:r>
-              <a:rPr lang="en-US" baseline="0" dirty="0" smtClean="0"/>
-              <a:t>) – sass-</a:t>
-            </a:r>
-            <a:r>
-              <a:rPr lang="en-US" baseline="0" dirty="0" err="1" smtClean="0"/>
-              <a:t>css</a:t>
-            </a:r>
-            <a:endParaRPr lang="en-US" baseline="0" dirty="0" smtClean="0"/>
-          </a:p>
-          <a:p>
-            <a:r>
-              <a:rPr lang="en-US" baseline="0" dirty="0" smtClean="0"/>
-              <a:t>*   Radio button (done)</a:t>
-            </a:r>
-          </a:p>
-          <a:p>
-            <a:pPr marL="171450" indent="-171450">
-              <a:buFont typeface="Arial" panose="020B0604020202020204" pitchFamily="34" charset="0"/>
-              <a:buChar char="•"/>
-            </a:pPr>
-            <a:r>
-              <a:rPr lang="en-US" baseline="0" dirty="0" smtClean="0"/>
-              <a:t>Default: light (done)</a:t>
-            </a:r>
-          </a:p>
-          <a:p>
-            <a:pPr marL="171450" indent="-171450">
-              <a:buFont typeface="Arial" panose="020B0604020202020204" pitchFamily="34" charset="0"/>
-              <a:buChar char="•"/>
-            </a:pPr>
-            <a:r>
-              <a:rPr lang="en-US" baseline="0" dirty="0" smtClean="0"/>
-              <a:t>Dark (done)</a:t>
-            </a:r>
-          </a:p>
-          <a:p>
-            <a:pPr marL="171450" indent="-171450">
-              <a:buFont typeface="Arial" panose="020B0604020202020204" pitchFamily="34" charset="0"/>
-              <a:buChar char="•"/>
-            </a:pPr>
-            <a:r>
-              <a:rPr lang="en-US" baseline="0" dirty="0" err="1" smtClean="0"/>
-              <a:t>BlueDragon</a:t>
+              <a:t>setInterval</a:t>
             </a:r>
             <a:r>
               <a:rPr lang="en-US" baseline="0" dirty="0" smtClean="0"/>
               <a:t> (done)</a:t>
             </a:r>
-            <a:endParaRPr lang="en-US" baseline="0" dirty="0" smtClean="0"/>
-          </a:p>
-          <a:p>
-            <a:pPr marL="171450" indent="-171450">
-              <a:buFont typeface="Arial" panose="020B0604020202020204" pitchFamily="34" charset="0"/>
-              <a:buChar char="•"/>
-            </a:pPr>
+          </a:p>
+          <a:p>
             <a:r>
               <a:rPr lang="en-US" baseline="0" dirty="0" smtClean="0"/>
-              <a:t>Test cases (done</a:t>
-            </a:r>
+              <a:t>Threading – calculate rest time (done)</a:t>
+            </a:r>
+          </a:p>
+          <a:p>
             <a:r>
               <a:rPr lang="en-US" baseline="0" dirty="0" smtClean="0"/>
-              <a:t>)</a:t>
-            </a:r>
-          </a:p>
-          <a:p>
-            <a:pPr marL="171450" indent="-171450">
-              <a:buFont typeface="Arial" panose="020B0604020202020204" pitchFamily="34" charset="0"/>
-              <a:buChar char="•"/>
-            </a:pPr>
-            <a:endParaRPr lang="en-US" baseline="0" dirty="0" smtClean="0"/>
-          </a:p>
-          <a:p>
-            <a:pPr marL="171450" indent="-171450">
-              <a:buFont typeface="Arial" panose="020B0604020202020204" pitchFamily="34" charset="0"/>
-              <a:buChar char="•"/>
-            </a:pPr>
-            <a:r>
-              <a:rPr lang="en-US" baseline="0" dirty="0" smtClean="0"/>
-              <a:t>Style </a:t>
-            </a:r>
-            <a:r>
-              <a:rPr lang="en-US" baseline="0" smtClean="0"/>
-              <a:t>manger service (done)</a:t>
-            </a:r>
-            <a:endParaRPr lang="en-US" baseline="0" dirty="0" smtClean="0"/>
-          </a:p>
-          <a:p>
-            <a:pPr marL="171450" indent="-171450">
-              <a:buFont typeface="Arial" panose="020B0604020202020204" pitchFamily="34" charset="0"/>
-              <a:buChar char="•"/>
-            </a:pPr>
-            <a:r>
-              <a:rPr lang="en-US" baseline="0" dirty="0" smtClean="0"/>
-              <a:t>Unit test cases (done)</a:t>
-            </a:r>
-            <a:endParaRPr lang="en-US" baseline="0" dirty="0" smtClean="0"/>
+              <a:t>Timer test (done)</a:t>
+            </a:r>
           </a:p>
         </p:txBody>
       </p:sp>
@@ -3695,7 +3664,7 @@
           <a:p>
             <a:fld id="{7E7CBEC1-F5FB-4BFE-AF15-5C1A6E9B4F82}" type="slidenum">
               <a:rPr lang="en-US" smtClean="0"/>
-              <a:t>5</a:t>
+              <a:t>4</a:t>
             </a:fld>
             <a:endParaRPr lang="en-US"/>
           </a:p>
@@ -3704,7 +3673,7 @@
     </p:spTree>
     <p:extLst>
       <p:ext uri="{BB962C8B-B14F-4D97-AF65-F5344CB8AC3E}">
-        <p14:creationId xmlns:p14="http://schemas.microsoft.com/office/powerpoint/2010/main" val="2477214928"/>
+        <p14:creationId xmlns:p14="http://schemas.microsoft.com/office/powerpoint/2010/main" val="2516751226"/>
       </p:ext>
     </p:extLst>
   </p:cSld>
@@ -3759,6 +3728,216 @@
           <a:lstStyle/>
           <a:p>
             <a:r>
+              <a:rPr lang="en-US" dirty="0" err="1" smtClean="0"/>
+              <a:t>Thema</a:t>
+            </a:r>
+            <a:r>
+              <a:rPr lang="en-US" dirty="0" smtClean="0"/>
+              <a:t>,</a:t>
+            </a:r>
+            <a:r>
+              <a:rPr lang="en-US" baseline="0" dirty="0" smtClean="0"/>
+              <a:t> </a:t>
+            </a:r>
+            <a:r>
+              <a:rPr lang="en-US" baseline="0" dirty="0" err="1" smtClean="0"/>
+              <a:t>css</a:t>
+            </a:r>
+            <a:r>
+              <a:rPr lang="en-US" baseline="0" dirty="0" smtClean="0"/>
+              <a:t>(Basic, dark </a:t>
+            </a:r>
+            <a:r>
+              <a:rPr lang="en-US" baseline="0" dirty="0" err="1" smtClean="0"/>
+              <a:t>colour</a:t>
+            </a:r>
+            <a:r>
+              <a:rPr lang="en-US" baseline="0" dirty="0" smtClean="0"/>
+              <a:t>) – sass-</a:t>
+            </a:r>
+            <a:r>
+              <a:rPr lang="en-US" baseline="0" dirty="0" err="1" smtClean="0"/>
+              <a:t>css</a:t>
+            </a:r>
+            <a:endParaRPr lang="en-US" baseline="0" dirty="0" smtClean="0"/>
+          </a:p>
+          <a:p>
+            <a:r>
+              <a:rPr lang="en-US" baseline="0" dirty="0" smtClean="0"/>
+              <a:t>*   Radio button (done)</a:t>
+            </a:r>
+          </a:p>
+          <a:p>
+            <a:pPr marL="171450" indent="-171450">
+              <a:buFont typeface="Arial" panose="020B0604020202020204" pitchFamily="34" charset="0"/>
+              <a:buChar char="•"/>
+            </a:pPr>
+            <a:r>
+              <a:rPr lang="en-US" baseline="0" dirty="0" smtClean="0"/>
+              <a:t>Default: light (done)</a:t>
+            </a:r>
+          </a:p>
+          <a:p>
+            <a:pPr marL="171450" indent="-171450">
+              <a:buFont typeface="Arial" panose="020B0604020202020204" pitchFamily="34" charset="0"/>
+              <a:buChar char="•"/>
+            </a:pPr>
+            <a:r>
+              <a:rPr lang="en-US" baseline="0" dirty="0" smtClean="0"/>
+              <a:t>Dark (done)</a:t>
+            </a:r>
+          </a:p>
+          <a:p>
+            <a:pPr marL="171450" indent="-171450">
+              <a:buFont typeface="Arial" panose="020B0604020202020204" pitchFamily="34" charset="0"/>
+              <a:buChar char="•"/>
+            </a:pPr>
+            <a:r>
+              <a:rPr lang="en-US" baseline="0" dirty="0" err="1" smtClean="0"/>
+              <a:t>BlueDragon</a:t>
+            </a:r>
+            <a:r>
+              <a:rPr lang="en-US" baseline="0" dirty="0" smtClean="0"/>
+              <a:t> (done)</a:t>
+            </a:r>
+          </a:p>
+          <a:p>
+            <a:pPr marL="171450" indent="-171450">
+              <a:buFont typeface="Arial" panose="020B0604020202020204" pitchFamily="34" charset="0"/>
+              <a:buChar char="•"/>
+            </a:pPr>
+            <a:r>
+              <a:rPr lang="en-US" baseline="0" dirty="0" smtClean="0"/>
+              <a:t>Test cases (done)</a:t>
+            </a:r>
+          </a:p>
+          <a:p>
+            <a:pPr marL="171450" indent="-171450">
+              <a:buFont typeface="Arial" panose="020B0604020202020204" pitchFamily="34" charset="0"/>
+              <a:buChar char="•"/>
+            </a:pPr>
+            <a:endParaRPr lang="en-US" baseline="0" dirty="0" smtClean="0"/>
+          </a:p>
+          <a:p>
+            <a:pPr marL="171450" indent="-171450">
+              <a:buFont typeface="Arial" panose="020B0604020202020204" pitchFamily="34" charset="0"/>
+              <a:buChar char="•"/>
+            </a:pPr>
+            <a:r>
+              <a:rPr lang="en-US" baseline="0" dirty="0" smtClean="0"/>
+              <a:t>Style manger service (done)</a:t>
+            </a:r>
+          </a:p>
+          <a:p>
+            <a:pPr marL="171450" indent="-171450">
+              <a:buFont typeface="Arial" panose="020B0604020202020204" pitchFamily="34" charset="0"/>
+              <a:buChar char="•"/>
+            </a:pPr>
+            <a:r>
+              <a:rPr lang="en-US" baseline="0" dirty="0" smtClean="0"/>
+              <a:t>Unit test cases (done)</a:t>
+            </a:r>
+          </a:p>
+          <a:p>
+            <a:pPr marL="171450" indent="-171450">
+              <a:buFont typeface="Arial" panose="020B0604020202020204" pitchFamily="34" charset="0"/>
+              <a:buChar char="•"/>
+            </a:pPr>
+            <a:endParaRPr lang="en-US" baseline="0" dirty="0" smtClean="0"/>
+          </a:p>
+          <a:p>
+            <a:pPr marL="0" indent="0">
+              <a:buFont typeface="Arial" panose="020B0604020202020204" pitchFamily="34" charset="0"/>
+              <a:buNone/>
+            </a:pPr>
+            <a:r>
+              <a:rPr lang="en-US" baseline="0" dirty="0" smtClean="0"/>
+              <a:t>Task sorting, display changes – not implemented</a:t>
+            </a:r>
+          </a:p>
+        </p:txBody>
+      </p:sp>
+      <p:sp>
+        <p:nvSpPr>
+          <p:cNvPr id="4" name="Dia számának helye 3"/>
+          <p:cNvSpPr>
+            <a:spLocks noGrp="1"/>
+          </p:cNvSpPr>
+          <p:nvPr>
+            <p:ph type="sldNum" sz="quarter" idx="10"/>
+          </p:nvPr>
+        </p:nvSpPr>
+        <p:spPr/>
+        <p:txBody>
+          <a:bodyPr/>
+          <a:lstStyle/>
+          <a:p>
+            <a:fld id="{7E7CBEC1-F5FB-4BFE-AF15-5C1A6E9B4F82}" type="slidenum">
+              <a:rPr lang="en-US" smtClean="0"/>
+              <a:t>5</a:t>
+            </a:fld>
+            <a:endParaRPr lang="en-US"/>
+          </a:p>
+        </p:txBody>
+      </p:sp>
+    </p:spTree>
+    <p:extLst>
+      <p:ext uri="{BB962C8B-B14F-4D97-AF65-F5344CB8AC3E}">
+        <p14:creationId xmlns:p14="http://schemas.microsoft.com/office/powerpoint/2010/main" val="2477214928"/>
+      </p:ext>
+    </p:extLst>
+  </p:cSld>
+  <p:clrMapOvr>
+    <a:masterClrMapping/>
+  </p:clrMapOvr>
+</p:notes>
+</file>
+
+<file path=ppt/notesSlides/notesSlide6.xml><?xml version="1.0" encoding="utf-8"?>
+<p:notes xmlns:a="http://schemas.openxmlformats.org/drawingml/2006/main" xmlns:r="http://schemas.openxmlformats.org/officeDocument/2006/relationships" xmlns:p="http://schemas.openxmlformats.org/presentationml/2006/main">
+  <p:cSld>
+    <p:spTree>
+      <p:nvGrpSpPr>
+        <p:cNvPr id="1" name=""/>
+        <p:cNvGrpSpPr/>
+        <p:nvPr/>
+      </p:nvGrpSpPr>
+      <p:grpSpPr>
+        <a:xfrm>
+          <a:off x="0" y="0"/>
+          <a:ext cx="0" cy="0"/>
+          <a:chOff x="0" y="0"/>
+          <a:chExt cx="0" cy="0"/>
+        </a:xfrm>
+      </p:grpSpPr>
+      <p:sp>
+        <p:nvSpPr>
+          <p:cNvPr id="2" name="Diakép helye 1"/>
+          <p:cNvSpPr>
+            <a:spLocks noGrp="1" noRot="1" noChangeAspect="1"/>
+          </p:cNvSpPr>
+          <p:nvPr>
+            <p:ph type="sldImg"/>
+          </p:nvPr>
+        </p:nvSpPr>
+        <p:spPr/>
+      </p:sp>
+      <p:sp>
+        <p:nvSpPr>
+          <p:cNvPr id="3" name="Jegyzetek helye 2"/>
+          <p:cNvSpPr>
+            <a:spLocks noGrp="1"/>
+          </p:cNvSpPr>
+          <p:nvPr>
+            <p:ph type="body" idx="1"/>
+          </p:nvPr>
+        </p:nvSpPr>
+        <p:spPr/>
+        <p:txBody>
+          <a:bodyPr/>
+          <a:lstStyle/>
+          <a:p>
+            <a:r>
               <a:rPr lang="en-US" dirty="0" smtClean="0"/>
               <a:t>Overwhelmed</a:t>
             </a:r>
@@ -4008,7 +4187,7 @@
 </p:notes>
 </file>
 
-<file path=ppt/notesSlides/notesSlide6.xml><?xml version="1.0" encoding="utf-8"?>
+<file path=ppt/notesSlides/notesSlide7.xml><?xml version="1.0" encoding="utf-8"?>
 <p:notes xmlns:a="http://schemas.openxmlformats.org/drawingml/2006/main" xmlns:r="http://schemas.openxmlformats.org/officeDocument/2006/relationships" xmlns:p="http://schemas.openxmlformats.org/presentationml/2006/main">
   <p:cSld>
     <p:spTree>
@@ -4223,7 +4402,7 @@
           <a:p>
             <a:fld id="{8E031A97-C5A4-4558-8890-FA2925244C4F}" type="datetime3">
               <a:rPr lang="en-US" smtClean="0"/>
-              <a:t>17 July 2022</a:t>
+              <a:t>22 July 2022</a:t>
             </a:fld>
             <a:endParaRPr lang="en-US"/>
           </a:p>
@@ -4397,7 +4576,7 @@
           <a:p>
             <a:fld id="{156D25A5-2131-4D11-8DF2-BFE448E0C6C4}" type="datetime3">
               <a:rPr lang="en-US" smtClean="0"/>
-              <a:t>17 July 2022</a:t>
+              <a:t>22 July 2022</a:t>
             </a:fld>
             <a:endParaRPr lang="en-US"/>
           </a:p>
@@ -4581,7 +4760,7 @@
           <a:p>
             <a:fld id="{741DCA71-90D2-471A-B4F6-D63D3144D802}" type="datetime3">
               <a:rPr lang="en-US" smtClean="0"/>
-              <a:t>17 July 2022</a:t>
+              <a:t>22 July 2022</a:t>
             </a:fld>
             <a:endParaRPr lang="en-US"/>
           </a:p>
@@ -4755,7 +4934,7 @@
           <a:p>
             <a:fld id="{859B4CCA-7A49-40BA-AA87-E36D3C1B74CD}" type="datetime3">
               <a:rPr lang="en-US" smtClean="0"/>
-              <a:t>17 July 2022</a:t>
+              <a:t>22 July 2022</a:t>
             </a:fld>
             <a:endParaRPr lang="en-US"/>
           </a:p>
@@ -5005,7 +5184,7 @@
           <a:p>
             <a:fld id="{00C05CC3-8230-4750-BEE6-66D4A1F33F0F}" type="datetime3">
               <a:rPr lang="en-US" smtClean="0"/>
-              <a:t>17 July 2022</a:t>
+              <a:t>22 July 2022</a:t>
             </a:fld>
             <a:endParaRPr lang="en-US"/>
           </a:p>
@@ -5241,7 +5420,7 @@
           <a:p>
             <a:fld id="{3DEBFD87-4EA2-4600-AB37-3AFC3D80519A}" type="datetime3">
               <a:rPr lang="en-US" smtClean="0"/>
-              <a:t>17 July 2022</a:t>
+              <a:t>22 July 2022</a:t>
             </a:fld>
             <a:endParaRPr lang="en-US"/>
           </a:p>
@@ -5612,7 +5791,7 @@
           <a:p>
             <a:fld id="{A72CEC32-E708-4316-8666-BA8BF9722CA0}" type="datetime3">
               <a:rPr lang="en-US" smtClean="0"/>
-              <a:t>17 July 2022</a:t>
+              <a:t>22 July 2022</a:t>
             </a:fld>
             <a:endParaRPr lang="en-US"/>
           </a:p>
@@ -5734,7 +5913,7 @@
           <a:p>
             <a:fld id="{7CF1C314-8D6F-4732-88D4-94FF05CBB104}" type="datetime3">
               <a:rPr lang="en-US" smtClean="0"/>
-              <a:t>17 July 2022</a:t>
+              <a:t>22 July 2022</a:t>
             </a:fld>
             <a:endParaRPr lang="en-US"/>
           </a:p>
@@ -5833,7 +6012,7 @@
           <a:p>
             <a:fld id="{47DA11E4-27AF-4B9F-BEF3-3CA15041E18E}" type="datetime3">
               <a:rPr lang="en-US" smtClean="0"/>
-              <a:t>17 July 2022</a:t>
+              <a:t>22 July 2022</a:t>
             </a:fld>
             <a:endParaRPr lang="en-US"/>
           </a:p>
@@ -6114,7 +6293,7 @@
           <a:p>
             <a:fld id="{E2C02590-7F59-421C-A745-32233A68051D}" type="datetime3">
               <a:rPr lang="en-US" smtClean="0"/>
-              <a:t>17 July 2022</a:t>
+              <a:t>22 July 2022</a:t>
             </a:fld>
             <a:endParaRPr lang="en-US"/>
           </a:p>
@@ -6371,7 +6550,7 @@
           <a:p>
             <a:fld id="{84AF07D1-C31F-46EF-9183-DC77B1A31FFA}" type="datetime3">
               <a:rPr lang="en-US" smtClean="0"/>
-              <a:t>17 July 2022</a:t>
+              <a:t>22 July 2022</a:t>
             </a:fld>
             <a:endParaRPr lang="en-US"/>
           </a:p>
@@ -6593,7 +6772,7 @@
           <a:p>
             <a:fld id="{9D694A8E-69FB-424F-BB61-8EE202972235}" type="datetime3">
               <a:rPr lang="en-US" smtClean="0"/>
-              <a:t>17 July 2022</a:t>
+              <a:t>22 July 2022</a:t>
             </a:fld>
             <a:endParaRPr lang="en-US"/>
           </a:p>
@@ -7084,7 +7263,7 @@
             </a:r>
             <a:r>
               <a:rPr lang="en-US" sz="2600" dirty="0" smtClean="0"/>
-              <a:t> – progress bar, loading</a:t>
+              <a:t> – data stream, loading</a:t>
             </a:r>
           </a:p>
           <a:p>
@@ -7120,11 +7299,7 @@
             </a:r>
             <a:r>
               <a:rPr lang="en-US" sz="2600" dirty="0" smtClean="0"/>
-              <a:t>– responsive site(Mobile, pc</a:t>
-            </a:r>
-            <a:r>
-              <a:rPr lang="en-US" sz="2600" dirty="0" smtClean="0"/>
-              <a:t>)</a:t>
+              <a:t>– responsive site(Mobile, pc)</a:t>
             </a:r>
           </a:p>
           <a:p>
@@ -7140,7 +7315,10 @@
               <a:rPr lang="en-US" sz="2600" dirty="0" err="1" smtClean="0"/>
               <a:t>css</a:t>
             </a:r>
-            <a:endParaRPr lang="en-US" sz="2600" dirty="0" smtClean="0"/>
+            <a:r>
+              <a:rPr lang="en-US" sz="2600" dirty="0" smtClean="0"/>
+              <a:t> - more themes</a:t>
+            </a:r>
           </a:p>
           <a:p>
             <a:pPr marL="342900" indent="-342900" algn="l">
@@ -7344,7 +7522,7 @@
           <a:p>
             <a:fld id="{EE2F860A-D2E4-4785-9C60-B1A9A50464B3}" type="datetime3">
               <a:rPr lang="en-US" smtClean="0"/>
-              <a:t>17 July 2022</a:t>
+              <a:t>22 July 2022</a:t>
             </a:fld>
             <a:endParaRPr lang="en-US"/>
           </a:p>
@@ -7462,7 +7640,7 @@
         <p:spPr/>
         <p:txBody>
           <a:bodyPr>
-            <a:normAutofit fontScale="92500" lnSpcReduction="10000"/>
+            <a:normAutofit fontScale="92500" lnSpcReduction="20000"/>
           </a:bodyPr>
           <a:lstStyle/>
           <a:p>
@@ -7505,15 +7683,22 @@
             <a:pPr lvl="1"/>
             <a:r>
               <a:rPr lang="en-US" dirty="0">
-                <a:hlinkClick r:id="rId2"/>
+                <a:hlinkClick r:id="rId3"/>
               </a:rPr>
               <a:t>https://www.angular.love/en/2021/12/13/angular-electron-2</a:t>
             </a:r>
             <a:r>
               <a:rPr lang="en-US" dirty="0" smtClean="0">
-                <a:hlinkClick r:id="rId2"/>
+                <a:hlinkClick r:id="rId3"/>
               </a:rPr>
               <a:t>/</a:t>
+            </a:r>
+            <a:endParaRPr lang="en-US" dirty="0"/>
+          </a:p>
+          <a:p>
+            <a:r>
+              <a:rPr lang="en-US" dirty="0" smtClean="0"/>
+              <a:t>Angular universal – Server Side Rendering</a:t>
             </a:r>
             <a:endParaRPr lang="en-US" dirty="0"/>
           </a:p>
@@ -7591,7 +7776,7 @@
           <a:p>
             <a:fld id="{859B4CCA-7A49-40BA-AA87-E36D3C1B74CD}" type="datetime3">
               <a:rPr lang="en-US" smtClean="0"/>
-              <a:t>17 July 2022</a:t>
+              <a:t>22 July 2022</a:t>
             </a:fld>
             <a:endParaRPr lang="en-US"/>
           </a:p>
@@ -7831,8 +8016,12 @@
             <a:lstStyle/>
             <a:p>
               <a:r>
+                <a:rPr lang="en-US" dirty="0"/>
+                <a:t>Where would you like to store App </a:t>
+              </a:r>
+              <a:r>
                 <a:rPr lang="en-US" dirty="0" smtClean="0"/>
-                <a:t>Default app settings data</a:t>
+                <a:t>settings?</a:t>
               </a:r>
               <a:endParaRPr lang="en-US" dirty="0"/>
             </a:p>
@@ -7950,7 +8139,7 @@
           <a:p>
             <a:fld id="{A9402B09-ED4A-4B63-89C4-3E1E373D49A6}" type="datetime3">
               <a:rPr lang="en-US" smtClean="0"/>
-              <a:t>17 July 2022</a:t>
+              <a:t>22 July 2022</a:t>
             </a:fld>
             <a:endParaRPr lang="en-US"/>
           </a:p>
@@ -8618,7 +8807,7 @@
           <a:p>
             <a:fld id="{F14D243E-DB4A-407C-AFAE-0BC32BA45E9E}" type="datetime3">
               <a:rPr lang="en-US" smtClean="0"/>
-              <a:t>17 July 2022</a:t>
+              <a:t>22 July 2022</a:t>
             </a:fld>
             <a:endParaRPr lang="en-US"/>
           </a:p>
@@ -10872,7 +11061,7 @@
           <a:p>
             <a:fld id="{D1ADE0D0-F6AA-4072-9326-915F27F2EB27}" type="datetime3">
               <a:rPr lang="en-US" smtClean="0"/>
-              <a:t>17 July 2022</a:t>
+              <a:t>22 July 2022</a:t>
             </a:fld>
             <a:endParaRPr lang="en-US" dirty="0"/>
           </a:p>
@@ -11113,7 +11302,7 @@
           <a:p>
             <a:fld id="{C4DDBBDB-B7E6-470C-8F06-93D4F09ACFE1}" type="datetime3">
               <a:rPr lang="en-US" smtClean="0"/>
-              <a:t>17 July 2022</a:t>
+              <a:t>22 July 2022</a:t>
             </a:fld>
             <a:endParaRPr lang="en-US"/>
           </a:p>
@@ -11744,6 +11933,13 @@
             <a:pPr lvl="1"/>
             <a:r>
               <a:rPr lang="en-US" dirty="0" smtClean="0"/>
+              <a:t>Authentication service, serves its own emitted request.</a:t>
+            </a:r>
+          </a:p>
+          <a:p>
+            <a:pPr lvl="1"/>
+            <a:r>
+              <a:rPr lang="en-US" dirty="0" smtClean="0"/>
               <a:t>Task: Get, post, put, delete</a:t>
             </a:r>
           </a:p>
@@ -11832,7 +12028,7 @@
           <a:p>
             <a:fld id="{859B4CCA-7A49-40BA-AA87-E36D3C1B74CD}" type="datetime3">
               <a:rPr lang="en-US" smtClean="0"/>
-              <a:t>17 July 2022</a:t>
+              <a:t>22 July 2022</a:t>
             </a:fld>
             <a:endParaRPr lang="en-US"/>
           </a:p>
@@ -12091,7 +12287,7 @@
           <a:p>
             <a:fld id="{859B4CCA-7A49-40BA-AA87-E36D3C1B74CD}" type="datetime3">
               <a:rPr lang="en-US" smtClean="0"/>
-              <a:t>17 July 2022</a:t>
+              <a:t>22 July 2022</a:t>
             </a:fld>
             <a:endParaRPr lang="en-US"/>
           </a:p>
@@ -12251,7 +12447,7 @@
           <a:p>
             <a:fld id="{859B4CCA-7A49-40BA-AA87-E36D3C1B74CD}" type="datetime3">
               <a:rPr lang="en-US" smtClean="0"/>
-              <a:t>17 July 2022</a:t>
+              <a:t>22 July 2022</a:t>
             </a:fld>
             <a:endParaRPr lang="en-US"/>
           </a:p>

</xml_diff>

<commit_message>
ppt plan is refeshed, more features are done
</commit_message>
<xml_diff>
--- a/plan/TaskTracingApp.pptx
+++ b/plan/TaskTracingApp.pptx
@@ -2763,7 +2763,7 @@
           <a:p>
             <a:fld id="{5EBE3839-043F-4D6A-BB69-1C2CEF42D310}" type="datetimeFigureOut">
               <a:rPr lang="en-US" smtClean="0"/>
-              <a:t>7/22/2022</a:t>
+              <a:t>9/21/2022</a:t>
             </a:fld>
             <a:endParaRPr lang="en-US"/>
           </a:p>
@@ -3169,7 +3169,17 @@
             </a:r>
             <a:r>
               <a:rPr lang="en-US" baseline="0" dirty="0" smtClean="0"/>
-              <a:t> problem via build</a:t>
+              <a:t> problem via </a:t>
+            </a:r>
+            <a:r>
+              <a:rPr lang="en-US" baseline="0" dirty="0" smtClean="0"/>
+              <a:t>build </a:t>
+            </a:r>
+            <a:r>
+              <a:rPr lang="en-US" baseline="0" dirty="0" smtClean="0">
+                <a:sym typeface="Wingdings" panose="05000000000000000000" pitchFamily="2" charset="2"/>
+              </a:rPr>
+              <a:t> solved</a:t>
             </a:r>
             <a:endParaRPr lang="en-US" dirty="0"/>
           </a:p>
@@ -3275,11 +3285,7 @@
             </a:r>
             <a:r>
               <a:rPr lang="en-US" baseline="0" dirty="0" smtClean="0"/>
-              <a:t> (done</a:t>
-            </a:r>
-            <a:r>
-              <a:rPr lang="en-US" baseline="0" dirty="0" smtClean="0"/>
-              <a:t>)</a:t>
+              <a:t> (done)</a:t>
             </a:r>
           </a:p>
           <a:p>
@@ -3839,21 +3845,11 @@
             </a:r>
           </a:p>
           <a:p>
-            <a:pPr marL="171450" indent="-171450">
-              <a:buFont typeface="Arial" panose="020B0604020202020204" pitchFamily="34" charset="0"/>
-              <a:buChar char="•"/>
-            </a:pPr>
-            <a:endParaRPr lang="en-US" baseline="0" dirty="0" smtClean="0"/>
-          </a:p>
-          <a:p>
             <a:pPr marL="0" indent="0">
               <a:buFont typeface="Arial" panose="020B0604020202020204" pitchFamily="34" charset="0"/>
               <a:buNone/>
             </a:pPr>
-            <a:r>
-              <a:rPr lang="en-US" baseline="0" dirty="0" smtClean="0"/>
-              <a:t>Task sorting, display changes – not implemented</a:t>
-            </a:r>
+            <a:endParaRPr lang="en-US" baseline="0" dirty="0" smtClean="0"/>
           </a:p>
         </p:txBody>
       </p:sp>
@@ -3943,7 +3939,11 @@
             </a:r>
             <a:r>
               <a:rPr lang="en-US" baseline="0" dirty="0" smtClean="0"/>
-              <a:t> time measuring =&gt; not ready yet</a:t>
+              <a:t> time measuring =&gt; </a:t>
+            </a:r>
+            <a:r>
+              <a:rPr lang="en-US" baseline="0" dirty="0" smtClean="0"/>
+              <a:t>not ready yet</a:t>
             </a:r>
           </a:p>
           <a:p>
@@ -4402,7 +4402,7 @@
           <a:p>
             <a:fld id="{8E031A97-C5A4-4558-8890-FA2925244C4F}" type="datetime3">
               <a:rPr lang="en-US" smtClean="0"/>
-              <a:t>22 July 2022</a:t>
+              <a:t>21 September 2022</a:t>
             </a:fld>
             <a:endParaRPr lang="en-US"/>
           </a:p>
@@ -4576,7 +4576,7 @@
           <a:p>
             <a:fld id="{156D25A5-2131-4D11-8DF2-BFE448E0C6C4}" type="datetime3">
               <a:rPr lang="en-US" smtClean="0"/>
-              <a:t>22 July 2022</a:t>
+              <a:t>21 September 2022</a:t>
             </a:fld>
             <a:endParaRPr lang="en-US"/>
           </a:p>
@@ -4760,7 +4760,7 @@
           <a:p>
             <a:fld id="{741DCA71-90D2-471A-B4F6-D63D3144D802}" type="datetime3">
               <a:rPr lang="en-US" smtClean="0"/>
-              <a:t>22 July 2022</a:t>
+              <a:t>21 September 2022</a:t>
             </a:fld>
             <a:endParaRPr lang="en-US"/>
           </a:p>
@@ -4934,7 +4934,7 @@
           <a:p>
             <a:fld id="{859B4CCA-7A49-40BA-AA87-E36D3C1B74CD}" type="datetime3">
               <a:rPr lang="en-US" smtClean="0"/>
-              <a:t>22 July 2022</a:t>
+              <a:t>21 September 2022</a:t>
             </a:fld>
             <a:endParaRPr lang="en-US"/>
           </a:p>
@@ -5184,7 +5184,7 @@
           <a:p>
             <a:fld id="{00C05CC3-8230-4750-BEE6-66D4A1F33F0F}" type="datetime3">
               <a:rPr lang="en-US" smtClean="0"/>
-              <a:t>22 July 2022</a:t>
+              <a:t>21 September 2022</a:t>
             </a:fld>
             <a:endParaRPr lang="en-US"/>
           </a:p>
@@ -5420,7 +5420,7 @@
           <a:p>
             <a:fld id="{3DEBFD87-4EA2-4600-AB37-3AFC3D80519A}" type="datetime3">
               <a:rPr lang="en-US" smtClean="0"/>
-              <a:t>22 July 2022</a:t>
+              <a:t>21 September 2022</a:t>
             </a:fld>
             <a:endParaRPr lang="en-US"/>
           </a:p>
@@ -5791,7 +5791,7 @@
           <a:p>
             <a:fld id="{A72CEC32-E708-4316-8666-BA8BF9722CA0}" type="datetime3">
               <a:rPr lang="en-US" smtClean="0"/>
-              <a:t>22 July 2022</a:t>
+              <a:t>21 September 2022</a:t>
             </a:fld>
             <a:endParaRPr lang="en-US"/>
           </a:p>
@@ -5913,7 +5913,7 @@
           <a:p>
             <a:fld id="{7CF1C314-8D6F-4732-88D4-94FF05CBB104}" type="datetime3">
               <a:rPr lang="en-US" smtClean="0"/>
-              <a:t>22 July 2022</a:t>
+              <a:t>21 September 2022</a:t>
             </a:fld>
             <a:endParaRPr lang="en-US"/>
           </a:p>
@@ -6012,7 +6012,7 @@
           <a:p>
             <a:fld id="{47DA11E4-27AF-4B9F-BEF3-3CA15041E18E}" type="datetime3">
               <a:rPr lang="en-US" smtClean="0"/>
-              <a:t>22 July 2022</a:t>
+              <a:t>21 September 2022</a:t>
             </a:fld>
             <a:endParaRPr lang="en-US"/>
           </a:p>
@@ -6293,7 +6293,7 @@
           <a:p>
             <a:fld id="{E2C02590-7F59-421C-A745-32233A68051D}" type="datetime3">
               <a:rPr lang="en-US" smtClean="0"/>
-              <a:t>22 July 2022</a:t>
+              <a:t>21 September 2022</a:t>
             </a:fld>
             <a:endParaRPr lang="en-US"/>
           </a:p>
@@ -6550,7 +6550,7 @@
           <a:p>
             <a:fld id="{84AF07D1-C31F-46EF-9183-DC77B1A31FFA}" type="datetime3">
               <a:rPr lang="en-US" smtClean="0"/>
-              <a:t>22 July 2022</a:t>
+              <a:t>21 September 2022</a:t>
             </a:fld>
             <a:endParaRPr lang="en-US"/>
           </a:p>
@@ -6772,7 +6772,7 @@
           <a:p>
             <a:fld id="{9D694A8E-69FB-424F-BB61-8EE202972235}" type="datetime3">
               <a:rPr lang="en-US" smtClean="0"/>
-              <a:t>22 July 2022</a:t>
+              <a:t>21 September 2022</a:t>
             </a:fld>
             <a:endParaRPr lang="en-US"/>
           </a:p>
@@ -7359,8 +7359,13 @@
             </a:r>
             <a:r>
               <a:rPr lang="en-US" sz="2600" dirty="0" smtClean="0"/>
-              <a:t>: cross-platform</a:t>
-            </a:r>
+              <a:t>: </a:t>
+            </a:r>
+            <a:r>
+              <a:rPr lang="en-US" sz="2600" dirty="0" smtClean="0"/>
+              <a:t>cross-platform (done)</a:t>
+            </a:r>
+            <a:endParaRPr lang="en-US" sz="2600" dirty="0" smtClean="0"/>
           </a:p>
           <a:p>
             <a:pPr marL="342900" indent="-342900" algn="l">
@@ -7522,7 +7527,7 @@
           <a:p>
             <a:fld id="{EE2F860A-D2E4-4785-9C60-B1A9A50464B3}" type="datetime3">
               <a:rPr lang="en-US" smtClean="0"/>
-              <a:t>22 July 2022</a:t>
+              <a:t>21 September 2022</a:t>
             </a:fld>
             <a:endParaRPr lang="en-US"/>
           </a:p>
@@ -7753,7 +7758,11 @@
           <a:p>
             <a:r>
               <a:rPr lang="en-US" b="1" dirty="0" smtClean="0"/>
-              <a:t>CSP – Content Security Police</a:t>
+              <a:t>CSP – Content Security </a:t>
+            </a:r>
+            <a:r>
+              <a:rPr lang="en-US" b="1" dirty="0" smtClean="0"/>
+              <a:t>Police(done)</a:t>
             </a:r>
             <a:endParaRPr lang="en-US" b="1" dirty="0"/>
           </a:p>
@@ -7776,7 +7785,7 @@
           <a:p>
             <a:fld id="{859B4CCA-7A49-40BA-AA87-E36D3C1B74CD}" type="datetime3">
               <a:rPr lang="en-US" smtClean="0"/>
-              <a:t>22 July 2022</a:t>
+              <a:t>21 September 2022</a:t>
             </a:fld>
             <a:endParaRPr lang="en-US"/>
           </a:p>
@@ -8139,7 +8148,7 @@
           <a:p>
             <a:fld id="{A9402B09-ED4A-4B63-89C4-3E1E373D49A6}" type="datetime3">
               <a:rPr lang="en-US" smtClean="0"/>
-              <a:t>22 July 2022</a:t>
+              <a:t>21 September 2022</a:t>
             </a:fld>
             <a:endParaRPr lang="en-US"/>
           </a:p>
@@ -8807,7 +8816,7 @@
           <a:p>
             <a:fld id="{F14D243E-DB4A-407C-AFAE-0BC32BA45E9E}" type="datetime3">
               <a:rPr lang="en-US" smtClean="0"/>
-              <a:t>22 July 2022</a:t>
+              <a:t>21 September 2022</a:t>
             </a:fld>
             <a:endParaRPr lang="en-US"/>
           </a:p>
@@ -11061,7 +11070,7 @@
           <a:p>
             <a:fld id="{D1ADE0D0-F6AA-4072-9326-915F27F2EB27}" type="datetime3">
               <a:rPr lang="en-US" smtClean="0"/>
-              <a:t>22 July 2022</a:t>
+              <a:t>21 September 2022</a:t>
             </a:fld>
             <a:endParaRPr lang="en-US" dirty="0"/>
           </a:p>
@@ -11302,7 +11311,7 @@
           <a:p>
             <a:fld id="{C4DDBBDB-B7E6-470C-8F06-93D4F09ACFE1}" type="datetime3">
               <a:rPr lang="en-US" smtClean="0"/>
-              <a:t>22 July 2022</a:t>
+              <a:t>21 September 2022</a:t>
             </a:fld>
             <a:endParaRPr lang="en-US"/>
           </a:p>
@@ -12028,7 +12037,7 @@
           <a:p>
             <a:fld id="{859B4CCA-7A49-40BA-AA87-E36D3C1B74CD}" type="datetime3">
               <a:rPr lang="en-US" smtClean="0"/>
-              <a:t>22 July 2022</a:t>
+              <a:t>21 September 2022</a:t>
             </a:fld>
             <a:endParaRPr lang="en-US"/>
           </a:p>
@@ -12127,7 +12136,11 @@
           <a:p>
             <a:r>
               <a:rPr lang="en-US" dirty="0" smtClean="0"/>
-              <a:t>Penetration test</a:t>
+              <a:t>Server side: Penetration </a:t>
+            </a:r>
+            <a:r>
+              <a:rPr lang="en-US" dirty="0" smtClean="0"/>
+              <a:t>test</a:t>
             </a:r>
             <a:endParaRPr lang="en-US" dirty="0"/>
           </a:p>
@@ -12287,7 +12300,7 @@
           <a:p>
             <a:fld id="{859B4CCA-7A49-40BA-AA87-E36D3C1B74CD}" type="datetime3">
               <a:rPr lang="en-US" smtClean="0"/>
-              <a:t>22 July 2022</a:t>
+              <a:t>21 September 2022</a:t>
             </a:fld>
             <a:endParaRPr lang="en-US"/>
           </a:p>
@@ -12415,8 +12428,35 @@
           <a:p>
             <a:r>
               <a:rPr lang="en-US" dirty="0" smtClean="0"/>
-              <a:t>Storing and request in the queue, sync in background</a:t>
-            </a:r>
+              <a:t>Storing and request in the queue, sync in </a:t>
+            </a:r>
+            <a:r>
+              <a:rPr lang="en-US" dirty="0" smtClean="0"/>
+              <a:t>background later when the net is available</a:t>
+            </a:r>
+          </a:p>
+          <a:p>
+            <a:pPr lvl="1"/>
+            <a:r>
+              <a:rPr lang="en-US" dirty="0" smtClean="0"/>
+              <a:t>Storing API in the stack</a:t>
+            </a:r>
+          </a:p>
+          <a:p>
+            <a:pPr lvl="1"/>
+            <a:r>
+              <a:rPr lang="en-US" dirty="0" smtClean="0"/>
+              <a:t>Saving data in local </a:t>
+            </a:r>
+            <a:r>
+              <a:rPr lang="en-US" dirty="0" err="1" smtClean="0"/>
+              <a:t>Strorage</a:t>
+            </a:r>
+            <a:r>
+              <a:rPr lang="en-US" dirty="0" smtClean="0"/>
+              <a:t>, temp preserving data</a:t>
+            </a:r>
+            <a:endParaRPr lang="en-US" dirty="0" smtClean="0"/>
           </a:p>
           <a:p>
             <a:pPr marL="0" indent="0">
@@ -12447,7 +12487,7 @@
           <a:p>
             <a:fld id="{859B4CCA-7A49-40BA-AA87-E36D3C1B74CD}" type="datetime3">
               <a:rPr lang="en-US" smtClean="0"/>
-              <a:t>22 July 2022</a:t>
+              <a:t>21 September 2022</a:t>
             </a:fld>
             <a:endParaRPr lang="en-US"/>
           </a:p>

</xml_diff>